<commit_message>
add sendup time histogram & update powerpoint
</commit_message>
<xml_diff>
--- a/doc/Submit time - ivy 2.01.00.pptx
+++ b/doc/Submit time - ivy 2.01.00.pptx
@@ -5,10 +5,10 @@
     <p:sldMasterId id="2147483792" r:id="rId1"/>
   </p:sldMasterIdLst>
   <p:notesMasterIdLst>
-    <p:notesMasterId r:id="rId9"/>
+    <p:notesMasterId r:id="rId10"/>
   </p:notesMasterIdLst>
   <p:handoutMasterIdLst>
-    <p:handoutMasterId r:id="rId10"/>
+    <p:handoutMasterId r:id="rId11"/>
   </p:handoutMasterIdLst>
   <p:sldIdLst>
     <p:sldId id="351" r:id="rId2"/>
@@ -16,13 +16,14 @@
     <p:sldId id="377" r:id="rId4"/>
     <p:sldId id="381" r:id="rId5"/>
     <p:sldId id="382" r:id="rId6"/>
-    <p:sldId id="376" r:id="rId7"/>
-    <p:sldId id="373" r:id="rId8"/>
+    <p:sldId id="383" r:id="rId7"/>
+    <p:sldId id="376" r:id="rId8"/>
+    <p:sldId id="373" r:id="rId9"/>
   </p:sldIdLst>
   <p:sldSz cx="9144000" cy="5143500" type="screen16x9"/>
   <p:notesSz cx="6858000" cy="9144000"/>
   <p:custDataLst>
-    <p:tags r:id="rId11"/>
+    <p:tags r:id="rId12"/>
   </p:custDataLst>
   <p:defaultTextStyle>
     <a:defPPr>
@@ -923,7 +924,7 @@
         <c:title>
           <c:tx>
             <c:rich>
-              <a:bodyPr rot="0" spcFirstLastPara="1" vertOverflow="ellipsis" vert="horz" wrap="square" anchor="ctr" anchorCtr="1"/>
+              <a:bodyPr rot="0" spcFirstLastPara="1" vertOverflow="ellipsis" wrap="square" anchor="ctr" anchorCtr="1"/>
               <a:lstStyle/>
               <a:p>
                 <a:pPr>
@@ -964,7 +965,7 @@
             <a:effectLst/>
           </c:spPr>
           <c:txPr>
-            <a:bodyPr rot="0" spcFirstLastPara="1" vertOverflow="ellipsis" vert="horz" wrap="square" anchor="ctr" anchorCtr="1"/>
+            <a:bodyPr rot="0" spcFirstLastPara="1" vertOverflow="ellipsis" wrap="square" anchor="ctr" anchorCtr="1"/>
             <a:lstStyle/>
             <a:p>
               <a:pPr>
@@ -2228,7 +2229,7 @@
             <a:fld id="{08B3F974-BB90-4059-9901-8147A3A63439}" type="datetimeFigureOut">
               <a:rPr lang="en-US" smtClean="0"/>
               <a:pPr/>
-              <a:t>6/18/2018</a:t>
+              <a:t>6/19/2018</a:t>
             </a:fld>
             <a:endParaRPr lang="en-US" dirty="0"/>
           </a:p>
@@ -3445,7 +3446,7 @@
             <a:effectLst/>
             <a:extLst>
               <a:ext uri="{91240B29-F687-4f45-9708-019B960494DF}">
-                <a14:hiddenLine xmlns:a14="http://schemas.microsoft.com/office/drawing/2010/main" xmlns="" w="9525" cap="flat">
+                <a14:hiddenLine xmlns="" xmlns:a14="http://schemas.microsoft.com/office/drawing/2010/main" w="9525" cap="flat">
                   <a:solidFill>
                     <a:srgbClr val="808080"/>
                   </a:solidFill>
@@ -3455,7 +3456,7 @@
                 </a14:hiddenLine>
               </a:ext>
               <a:ext uri="{AF507438-7753-43e0-B8FC-AC1667EBCBE1}">
-                <a14:hiddenEffects xmlns:a14="http://schemas.microsoft.com/office/drawing/2010/main" xmlns="">
+                <a14:hiddenEffects xmlns="" xmlns:a14="http://schemas.microsoft.com/office/drawing/2010/main">
                   <a:effectLst>
                     <a:outerShdw blurRad="63500" dist="38099" dir="2700000" algn="ctr" rotWithShape="0">
                       <a:srgbClr val="000000">
@@ -3587,7 +3588,7 @@
             <a:effectLst/>
             <a:extLst>
               <a:ext uri="{91240B29-F687-4f45-9708-019B960494DF}">
-                <a14:hiddenLine xmlns:a14="http://schemas.microsoft.com/office/drawing/2010/main" xmlns="" w="9525" cap="flat">
+                <a14:hiddenLine xmlns="" xmlns:a14="http://schemas.microsoft.com/office/drawing/2010/main" w="9525" cap="flat">
                   <a:solidFill>
                     <a:srgbClr val="808080"/>
                   </a:solidFill>
@@ -3597,7 +3598,7 @@
                 </a14:hiddenLine>
               </a:ext>
               <a:ext uri="{AF507438-7753-43e0-B8FC-AC1667EBCBE1}">
-                <a14:hiddenEffects xmlns:a14="http://schemas.microsoft.com/office/drawing/2010/main" xmlns="">
+                <a14:hiddenEffects xmlns="" xmlns:a14="http://schemas.microsoft.com/office/drawing/2010/main">
                   <a:effectLst>
                     <a:outerShdw blurRad="63500" dist="38099" dir="2700000" algn="ctr" rotWithShape="0">
                       <a:srgbClr val="000000">
@@ -3765,7 +3766,7 @@
             <a:effectLst/>
             <a:extLst>
               <a:ext uri="{91240B29-F687-4f45-9708-019B960494DF}">
-                <a14:hiddenLine xmlns:a14="http://schemas.microsoft.com/office/drawing/2010/main" xmlns="" w="9525" cap="flat">
+                <a14:hiddenLine xmlns="" xmlns:a14="http://schemas.microsoft.com/office/drawing/2010/main" w="9525" cap="flat">
                   <a:solidFill>
                     <a:srgbClr val="808080"/>
                   </a:solidFill>
@@ -3775,7 +3776,7 @@
                 </a14:hiddenLine>
               </a:ext>
               <a:ext uri="{AF507438-7753-43e0-B8FC-AC1667EBCBE1}">
-                <a14:hiddenEffects xmlns:a14="http://schemas.microsoft.com/office/drawing/2010/main" xmlns="">
+                <a14:hiddenEffects xmlns="" xmlns:a14="http://schemas.microsoft.com/office/drawing/2010/main">
                   <a:effectLst>
                     <a:outerShdw blurRad="63500" dist="38099" dir="2700000" algn="ctr" rotWithShape="0">
                       <a:srgbClr val="000000">
@@ -3881,7 +3882,7 @@
             <a:effectLst/>
             <a:extLst>
               <a:ext uri="{91240B29-F687-4f45-9708-019B960494DF}">
-                <a14:hiddenLine xmlns:a14="http://schemas.microsoft.com/office/drawing/2010/main" xmlns="" w="9525" cap="flat">
+                <a14:hiddenLine xmlns="" xmlns:a14="http://schemas.microsoft.com/office/drawing/2010/main" w="9525" cap="flat">
                   <a:solidFill>
                     <a:srgbClr val="808080"/>
                   </a:solidFill>
@@ -3891,7 +3892,7 @@
                 </a14:hiddenLine>
               </a:ext>
               <a:ext uri="{AF507438-7753-43e0-B8FC-AC1667EBCBE1}">
-                <a14:hiddenEffects xmlns:a14="http://schemas.microsoft.com/office/drawing/2010/main" xmlns="">
+                <a14:hiddenEffects xmlns="" xmlns:a14="http://schemas.microsoft.com/office/drawing/2010/main">
                   <a:effectLst>
                     <a:outerShdw blurRad="63500" dist="38099" dir="2700000" algn="ctr" rotWithShape="0">
                       <a:srgbClr val="000000">
@@ -4069,7 +4070,7 @@
             <a:effectLst/>
             <a:extLst>
               <a:ext uri="{91240B29-F687-4f45-9708-019B960494DF}">
-                <a14:hiddenLine xmlns:a14="http://schemas.microsoft.com/office/drawing/2010/main" xmlns="" w="9525" cap="flat">
+                <a14:hiddenLine xmlns="" xmlns:a14="http://schemas.microsoft.com/office/drawing/2010/main" w="9525" cap="flat">
                   <a:solidFill>
                     <a:srgbClr val="808080"/>
                   </a:solidFill>
@@ -4079,7 +4080,7 @@
                 </a14:hiddenLine>
               </a:ext>
               <a:ext uri="{AF507438-7753-43e0-B8FC-AC1667EBCBE1}">
-                <a14:hiddenEffects xmlns:a14="http://schemas.microsoft.com/office/drawing/2010/main" xmlns="">
+                <a14:hiddenEffects xmlns="" xmlns:a14="http://schemas.microsoft.com/office/drawing/2010/main">
                   <a:effectLst>
                     <a:outerShdw blurRad="63500" dist="38099" dir="2700000" algn="ctr" rotWithShape="0">
                       <a:srgbClr val="000000">
@@ -4185,7 +4186,7 @@
             <a:effectLst/>
             <a:extLst>
               <a:ext uri="{91240B29-F687-4f45-9708-019B960494DF}">
-                <a14:hiddenLine xmlns:a14="http://schemas.microsoft.com/office/drawing/2010/main" xmlns="" w="9525" cap="flat">
+                <a14:hiddenLine xmlns="" xmlns:a14="http://schemas.microsoft.com/office/drawing/2010/main" w="9525" cap="flat">
                   <a:solidFill>
                     <a:srgbClr val="808080"/>
                   </a:solidFill>
@@ -4195,7 +4196,7 @@
                 </a14:hiddenLine>
               </a:ext>
               <a:ext uri="{AF507438-7753-43e0-B8FC-AC1667EBCBE1}">
-                <a14:hiddenEffects xmlns:a14="http://schemas.microsoft.com/office/drawing/2010/main" xmlns="">
+                <a14:hiddenEffects xmlns="" xmlns:a14="http://schemas.microsoft.com/office/drawing/2010/main">
                   <a:effectLst>
                     <a:outerShdw blurRad="63500" dist="38099" dir="2700000" algn="ctr" rotWithShape="0">
                       <a:srgbClr val="000000">
@@ -4517,7 +4518,7 @@
             <a:effectLst/>
             <a:extLst>
               <a:ext uri="{91240B29-F687-4f45-9708-019B960494DF}">
-                <a14:hiddenLine xmlns:a14="http://schemas.microsoft.com/office/drawing/2010/main" xmlns="" w="9525" cap="flat">
+                <a14:hiddenLine xmlns="" xmlns:a14="http://schemas.microsoft.com/office/drawing/2010/main" w="9525" cap="flat">
                   <a:solidFill>
                     <a:srgbClr val="808080"/>
                   </a:solidFill>
@@ -4527,7 +4528,7 @@
                 </a14:hiddenLine>
               </a:ext>
               <a:ext uri="{AF507438-7753-43e0-B8FC-AC1667EBCBE1}">
-                <a14:hiddenEffects xmlns:a14="http://schemas.microsoft.com/office/drawing/2010/main" xmlns="">
+                <a14:hiddenEffects xmlns="" xmlns:a14="http://schemas.microsoft.com/office/drawing/2010/main">
                   <a:effectLst>
                     <a:outerShdw blurRad="63500" dist="38099" dir="2700000" algn="ctr" rotWithShape="0">
                       <a:srgbClr val="000000">
@@ -4659,7 +4660,7 @@
             <a:effectLst/>
             <a:extLst>
               <a:ext uri="{91240B29-F687-4f45-9708-019B960494DF}">
-                <a14:hiddenLine xmlns:a14="http://schemas.microsoft.com/office/drawing/2010/main" xmlns="" w="9525" cap="flat">
+                <a14:hiddenLine xmlns="" xmlns:a14="http://schemas.microsoft.com/office/drawing/2010/main" w="9525" cap="flat">
                   <a:solidFill>
                     <a:srgbClr val="808080"/>
                   </a:solidFill>
@@ -4669,7 +4670,7 @@
                 </a14:hiddenLine>
               </a:ext>
               <a:ext uri="{AF507438-7753-43e0-B8FC-AC1667EBCBE1}">
-                <a14:hiddenEffects xmlns:a14="http://schemas.microsoft.com/office/drawing/2010/main" xmlns="">
+                <a14:hiddenEffects xmlns="" xmlns:a14="http://schemas.microsoft.com/office/drawing/2010/main">
                   <a:effectLst>
                     <a:outerShdw blurRad="63500" dist="38099" dir="2700000" algn="ctr" rotWithShape="0">
                       <a:srgbClr val="000000">
@@ -4875,7 +4876,7 @@
             <a:effectLst/>
             <a:extLst>
               <a:ext uri="{91240B29-F687-4f45-9708-019B960494DF}">
-                <a14:hiddenLine xmlns:a14="http://schemas.microsoft.com/office/drawing/2010/main" xmlns="" w="9525" cap="flat">
+                <a14:hiddenLine xmlns="" xmlns:a14="http://schemas.microsoft.com/office/drawing/2010/main" w="9525" cap="flat">
                   <a:solidFill>
                     <a:srgbClr val="808080"/>
                   </a:solidFill>
@@ -4885,7 +4886,7 @@
                 </a14:hiddenLine>
               </a:ext>
               <a:ext uri="{AF507438-7753-43e0-B8FC-AC1667EBCBE1}">
-                <a14:hiddenEffects xmlns:a14="http://schemas.microsoft.com/office/drawing/2010/main" xmlns="">
+                <a14:hiddenEffects xmlns="" xmlns:a14="http://schemas.microsoft.com/office/drawing/2010/main">
                   <a:effectLst>
                     <a:outerShdw blurRad="63500" dist="38099" dir="2700000" algn="ctr" rotWithShape="0">
                       <a:srgbClr val="000000">
@@ -5127,7 +5128,7 @@
             <a:effectLst/>
             <a:extLst>
               <a:ext uri="{91240B29-F687-4f45-9708-019B960494DF}">
-                <a14:hiddenLine xmlns:a14="http://schemas.microsoft.com/office/drawing/2010/main" xmlns="" w="9525" cap="flat">
+                <a14:hiddenLine xmlns="" xmlns:a14="http://schemas.microsoft.com/office/drawing/2010/main" w="9525" cap="flat">
                   <a:solidFill>
                     <a:srgbClr val="808080"/>
                   </a:solidFill>
@@ -5137,7 +5138,7 @@
                 </a14:hiddenLine>
               </a:ext>
               <a:ext uri="{AF507438-7753-43e0-B8FC-AC1667EBCBE1}">
-                <a14:hiddenEffects xmlns:a14="http://schemas.microsoft.com/office/drawing/2010/main" xmlns="">
+                <a14:hiddenEffects xmlns="" xmlns:a14="http://schemas.microsoft.com/office/drawing/2010/main">
                   <a:effectLst>
                     <a:outerShdw blurRad="63500" dist="38099" dir="2700000" algn="ctr" rotWithShape="0">
                       <a:srgbClr val="000000">
@@ -5379,7 +5380,7 @@
             <a:effectLst/>
             <a:extLst>
               <a:ext uri="{91240B29-F687-4f45-9708-019B960494DF}">
-                <a14:hiddenLine xmlns:a14="http://schemas.microsoft.com/office/drawing/2010/main" xmlns="" w="9525" cap="flat">
+                <a14:hiddenLine xmlns="" xmlns:a14="http://schemas.microsoft.com/office/drawing/2010/main" w="9525" cap="flat">
                   <a:solidFill>
                     <a:srgbClr val="808080"/>
                   </a:solidFill>
@@ -5389,7 +5390,7 @@
                 </a14:hiddenLine>
               </a:ext>
               <a:ext uri="{AF507438-7753-43e0-B8FC-AC1667EBCBE1}">
-                <a14:hiddenEffects xmlns:a14="http://schemas.microsoft.com/office/drawing/2010/main" xmlns="">
+                <a14:hiddenEffects xmlns="" xmlns:a14="http://schemas.microsoft.com/office/drawing/2010/main">
                   <a:effectLst>
                     <a:outerShdw blurRad="63500" dist="38099" dir="2700000" algn="ctr" rotWithShape="0">
                       <a:srgbClr val="000000">
@@ -5521,7 +5522,7 @@
             <a:effectLst/>
             <a:extLst>
               <a:ext uri="{91240B29-F687-4f45-9708-019B960494DF}">
-                <a14:hiddenLine xmlns:a14="http://schemas.microsoft.com/office/drawing/2010/main" xmlns="" w="9525" cap="flat">
+                <a14:hiddenLine xmlns="" xmlns:a14="http://schemas.microsoft.com/office/drawing/2010/main" w="9525" cap="flat">
                   <a:solidFill>
                     <a:srgbClr val="808080"/>
                   </a:solidFill>
@@ -5531,7 +5532,7 @@
                 </a14:hiddenLine>
               </a:ext>
               <a:ext uri="{AF507438-7753-43e0-B8FC-AC1667EBCBE1}">
-                <a14:hiddenEffects xmlns:a14="http://schemas.microsoft.com/office/drawing/2010/main" xmlns="">
+                <a14:hiddenEffects xmlns="" xmlns:a14="http://schemas.microsoft.com/office/drawing/2010/main">
                   <a:effectLst>
                     <a:outerShdw blurRad="63500" dist="38099" dir="2700000" algn="ctr" rotWithShape="0">
                       <a:srgbClr val="000000">
@@ -5637,7 +5638,7 @@
             <a:effectLst/>
             <a:extLst>
               <a:ext uri="{91240B29-F687-4f45-9708-019B960494DF}">
-                <a14:hiddenLine xmlns:a14="http://schemas.microsoft.com/office/drawing/2010/main" xmlns="" w="9525" cap="flat">
+                <a14:hiddenLine xmlns="" xmlns:a14="http://schemas.microsoft.com/office/drawing/2010/main" w="9525" cap="flat">
                   <a:solidFill>
                     <a:srgbClr val="808080"/>
                   </a:solidFill>
@@ -5647,7 +5648,7 @@
                 </a14:hiddenLine>
               </a:ext>
               <a:ext uri="{AF507438-7753-43e0-B8FC-AC1667EBCBE1}">
-                <a14:hiddenEffects xmlns:a14="http://schemas.microsoft.com/office/drawing/2010/main" xmlns="">
+                <a14:hiddenEffects xmlns="" xmlns:a14="http://schemas.microsoft.com/office/drawing/2010/main">
                   <a:effectLst>
                     <a:outerShdw blurRad="63500" dist="38099" dir="2700000" algn="ctr" rotWithShape="0">
                       <a:srgbClr val="000000">
@@ -5861,7 +5862,7 @@
             <a:effectLst/>
             <a:extLst>
               <a:ext uri="{91240B29-F687-4f45-9708-019B960494DF}">
-                <a14:hiddenLine xmlns:a14="http://schemas.microsoft.com/office/drawing/2010/main" xmlns="" w="9525" cap="flat">
+                <a14:hiddenLine xmlns="" xmlns:a14="http://schemas.microsoft.com/office/drawing/2010/main" w="9525" cap="flat">
                   <a:solidFill>
                     <a:srgbClr val="808080"/>
                   </a:solidFill>
@@ -5871,7 +5872,7 @@
                 </a14:hiddenLine>
               </a:ext>
               <a:ext uri="{AF507438-7753-43e0-B8FC-AC1667EBCBE1}">
-                <a14:hiddenEffects xmlns:a14="http://schemas.microsoft.com/office/drawing/2010/main" xmlns="">
+                <a14:hiddenEffects xmlns="" xmlns:a14="http://schemas.microsoft.com/office/drawing/2010/main">
                   <a:effectLst>
                     <a:outerShdw blurRad="63500" dist="38099" dir="2700000" algn="ctr" rotWithShape="0">
                       <a:srgbClr val="000000">
@@ -6087,7 +6088,7 @@
             <a:effectLst/>
             <a:extLst>
               <a:ext uri="{91240B29-F687-4f45-9708-019B960494DF}">
-                <a14:hiddenLine xmlns:a14="http://schemas.microsoft.com/office/drawing/2010/main" xmlns="" w="9525" cap="flat">
+                <a14:hiddenLine xmlns="" xmlns:a14="http://schemas.microsoft.com/office/drawing/2010/main" w="9525" cap="flat">
                   <a:solidFill>
                     <a:srgbClr val="808080"/>
                   </a:solidFill>
@@ -6097,7 +6098,7 @@
                 </a14:hiddenLine>
               </a:ext>
               <a:ext uri="{AF507438-7753-43e0-B8FC-AC1667EBCBE1}">
-                <a14:hiddenEffects xmlns:a14="http://schemas.microsoft.com/office/drawing/2010/main" xmlns="">
+                <a14:hiddenEffects xmlns="" xmlns:a14="http://schemas.microsoft.com/office/drawing/2010/main">
                   <a:effectLst>
                     <a:outerShdw blurRad="63500" dist="38099" dir="2700000" algn="ctr" rotWithShape="0">
                       <a:srgbClr val="000000">
@@ -6303,7 +6304,7 @@
             <a:effectLst/>
             <a:extLst>
               <a:ext uri="{91240B29-F687-4f45-9708-019B960494DF}">
-                <a14:hiddenLine xmlns:a14="http://schemas.microsoft.com/office/drawing/2010/main" xmlns="" w="9525" cap="flat">
+                <a14:hiddenLine xmlns="" xmlns:a14="http://schemas.microsoft.com/office/drawing/2010/main" w="9525" cap="flat">
                   <a:solidFill>
                     <a:srgbClr val="808080"/>
                   </a:solidFill>
@@ -6313,7 +6314,7 @@
                 </a14:hiddenLine>
               </a:ext>
               <a:ext uri="{AF507438-7753-43e0-B8FC-AC1667EBCBE1}">
-                <a14:hiddenEffects xmlns:a14="http://schemas.microsoft.com/office/drawing/2010/main" xmlns="">
+                <a14:hiddenEffects xmlns="" xmlns:a14="http://schemas.microsoft.com/office/drawing/2010/main">
                   <a:effectLst>
                     <a:outerShdw blurRad="63500" dist="38099" dir="2700000" algn="ctr" rotWithShape="0">
                       <a:srgbClr val="000000">
@@ -6521,7 +6522,7 @@
             <a:effectLst/>
             <a:extLst>
               <a:ext uri="{91240B29-F687-4f45-9708-019B960494DF}">
-                <a14:hiddenLine xmlns:a14="http://schemas.microsoft.com/office/drawing/2010/main" xmlns="" w="9525" cap="flat">
+                <a14:hiddenLine xmlns="" xmlns:a14="http://schemas.microsoft.com/office/drawing/2010/main" w="9525" cap="flat">
                   <a:solidFill>
                     <a:srgbClr val="808080"/>
                   </a:solidFill>
@@ -6531,7 +6532,7 @@
                 </a14:hiddenLine>
               </a:ext>
               <a:ext uri="{AF507438-7753-43e0-B8FC-AC1667EBCBE1}">
-                <a14:hiddenEffects xmlns:a14="http://schemas.microsoft.com/office/drawing/2010/main" xmlns="">
+                <a14:hiddenEffects xmlns="" xmlns:a14="http://schemas.microsoft.com/office/drawing/2010/main">
                   <a:effectLst>
                     <a:outerShdw blurRad="63500" dist="38099" dir="2700000" algn="ctr" rotWithShape="0">
                       <a:srgbClr val="000000">
@@ -6749,7 +6750,7 @@
             <a:effectLst/>
             <a:extLst>
               <a:ext uri="{91240B29-F687-4f45-9708-019B960494DF}">
-                <a14:hiddenLine xmlns:a14="http://schemas.microsoft.com/office/drawing/2010/main" xmlns="" w="9525" cap="flat">
+                <a14:hiddenLine xmlns="" xmlns:a14="http://schemas.microsoft.com/office/drawing/2010/main" w="9525" cap="flat">
                   <a:solidFill>
                     <a:srgbClr val="808080"/>
                   </a:solidFill>
@@ -6759,7 +6760,7 @@
                 </a14:hiddenLine>
               </a:ext>
               <a:ext uri="{AF507438-7753-43e0-B8FC-AC1667EBCBE1}">
-                <a14:hiddenEffects xmlns:a14="http://schemas.microsoft.com/office/drawing/2010/main" xmlns="">
+                <a14:hiddenEffects xmlns="" xmlns:a14="http://schemas.microsoft.com/office/drawing/2010/main">
                   <a:effectLst>
                     <a:outerShdw blurRad="63500" dist="38099" dir="2700000" algn="ctr" rotWithShape="0">
                       <a:srgbClr val="000000">
@@ -6947,7 +6948,7 @@
             <a:effectLst/>
             <a:extLst>
               <a:ext uri="{91240B29-F687-4f45-9708-019B960494DF}">
-                <a14:hiddenLine xmlns:a14="http://schemas.microsoft.com/office/drawing/2010/main" xmlns="" w="9525" cap="flat">
+                <a14:hiddenLine xmlns="" xmlns:a14="http://schemas.microsoft.com/office/drawing/2010/main" w="9525" cap="flat">
                   <a:solidFill>
                     <a:srgbClr val="808080"/>
                   </a:solidFill>
@@ -6957,7 +6958,7 @@
                 </a14:hiddenLine>
               </a:ext>
               <a:ext uri="{AF507438-7753-43e0-B8FC-AC1667EBCBE1}">
-                <a14:hiddenEffects xmlns:a14="http://schemas.microsoft.com/office/drawing/2010/main" xmlns="">
+                <a14:hiddenEffects xmlns="" xmlns:a14="http://schemas.microsoft.com/office/drawing/2010/main">
                   <a:effectLst>
                     <a:outerShdw blurRad="63500" dist="38099" dir="2700000" algn="ctr" rotWithShape="0">
                       <a:srgbClr val="000000">
@@ -7161,7 +7162,7 @@
             <a:effectLst/>
             <a:extLst>
               <a:ext uri="{91240B29-F687-4f45-9708-019B960494DF}">
-                <a14:hiddenLine xmlns:a14="http://schemas.microsoft.com/office/drawing/2010/main" xmlns="" w="9525" cap="flat">
+                <a14:hiddenLine xmlns="" xmlns:a14="http://schemas.microsoft.com/office/drawing/2010/main" w="9525" cap="flat">
                   <a:solidFill>
                     <a:srgbClr val="808080"/>
                   </a:solidFill>
@@ -7171,7 +7172,7 @@
                 </a14:hiddenLine>
               </a:ext>
               <a:ext uri="{AF507438-7753-43e0-B8FC-AC1667EBCBE1}">
-                <a14:hiddenEffects xmlns:a14="http://schemas.microsoft.com/office/drawing/2010/main" xmlns="">
+                <a14:hiddenEffects xmlns="" xmlns:a14="http://schemas.microsoft.com/office/drawing/2010/main">
                   <a:effectLst>
                     <a:outerShdw blurRad="63500" dist="38099" dir="2700000" algn="ctr" rotWithShape="0">
                       <a:srgbClr val="000000">
@@ -7389,7 +7390,7 @@
             <a:effectLst/>
             <a:extLst>
               <a:ext uri="{91240B29-F687-4f45-9708-019B960494DF}">
-                <a14:hiddenLine xmlns:a14="http://schemas.microsoft.com/office/drawing/2010/main" xmlns="" w="9525" cap="flat">
+                <a14:hiddenLine xmlns="" xmlns:a14="http://schemas.microsoft.com/office/drawing/2010/main" w="9525" cap="flat">
                   <a:solidFill>
                     <a:srgbClr val="808080"/>
                   </a:solidFill>
@@ -7399,7 +7400,7 @@
                 </a14:hiddenLine>
               </a:ext>
               <a:ext uri="{AF507438-7753-43e0-B8FC-AC1667EBCBE1}">
-                <a14:hiddenEffects xmlns:a14="http://schemas.microsoft.com/office/drawing/2010/main" xmlns="">
+                <a14:hiddenEffects xmlns="" xmlns:a14="http://schemas.microsoft.com/office/drawing/2010/main">
                   <a:effectLst>
                     <a:outerShdw blurRad="63500" dist="38099" dir="2700000" algn="ctr" rotWithShape="0">
                       <a:srgbClr val="000000">
@@ -7595,7 +7596,7 @@
             <a:effectLst/>
             <a:extLst>
               <a:ext uri="{91240B29-F687-4f45-9708-019B960494DF}">
-                <a14:hiddenLine xmlns:a14="http://schemas.microsoft.com/office/drawing/2010/main" xmlns="" w="9525" cap="flat">
+                <a14:hiddenLine xmlns="" xmlns:a14="http://schemas.microsoft.com/office/drawing/2010/main" w="9525" cap="flat">
                   <a:solidFill>
                     <a:srgbClr val="808080"/>
                   </a:solidFill>
@@ -7605,7 +7606,7 @@
                 </a14:hiddenLine>
               </a:ext>
               <a:ext uri="{AF507438-7753-43e0-B8FC-AC1667EBCBE1}">
-                <a14:hiddenEffects xmlns:a14="http://schemas.microsoft.com/office/drawing/2010/main" xmlns="">
+                <a14:hiddenEffects xmlns="" xmlns:a14="http://schemas.microsoft.com/office/drawing/2010/main">
                   <a:effectLst>
                     <a:outerShdw blurRad="63500" dist="38099" dir="2700000" algn="ctr" rotWithShape="0">
                       <a:srgbClr val="000000">
@@ -7705,7 +7706,7 @@
             <a:effectLst/>
             <a:extLst>
               <a:ext uri="{91240B29-F687-4f45-9708-019B960494DF}">
-                <a14:hiddenLine xmlns:a14="http://schemas.microsoft.com/office/drawing/2010/main" xmlns="" w="9525" cap="flat">
+                <a14:hiddenLine xmlns="" xmlns:a14="http://schemas.microsoft.com/office/drawing/2010/main" w="9525" cap="flat">
                   <a:solidFill>
                     <a:srgbClr val="808080"/>
                   </a:solidFill>
@@ -7715,7 +7716,7 @@
                 </a14:hiddenLine>
               </a:ext>
               <a:ext uri="{AF507438-7753-43e0-B8FC-AC1667EBCBE1}">
-                <a14:hiddenEffects xmlns:a14="http://schemas.microsoft.com/office/drawing/2010/main" xmlns="">
+                <a14:hiddenEffects xmlns="" xmlns:a14="http://schemas.microsoft.com/office/drawing/2010/main">
                   <a:effectLst>
                     <a:outerShdw blurRad="63500" dist="38099" dir="2700000" algn="ctr" rotWithShape="0">
                       <a:srgbClr val="000000">
@@ -8610,7 +8611,7 @@
             <a:effectLst/>
             <a:extLst>
               <a:ext uri="{91240B29-F687-4f45-9708-019B960494DF}">
-                <a14:hiddenLine xmlns:a14="http://schemas.microsoft.com/office/drawing/2010/main" xmlns="" w="9525" cap="flat">
+                <a14:hiddenLine xmlns="" xmlns:a14="http://schemas.microsoft.com/office/drawing/2010/main" w="9525" cap="flat">
                   <a:solidFill>
                     <a:srgbClr val="808080"/>
                   </a:solidFill>
@@ -8620,7 +8621,7 @@
                 </a14:hiddenLine>
               </a:ext>
               <a:ext uri="{AF507438-7753-43e0-B8FC-AC1667EBCBE1}">
-                <a14:hiddenEffects xmlns:a14="http://schemas.microsoft.com/office/drawing/2010/main" xmlns="">
+                <a14:hiddenEffects xmlns="" xmlns:a14="http://schemas.microsoft.com/office/drawing/2010/main">
                   <a:effectLst>
                     <a:outerShdw blurRad="63500" dist="38099" dir="2700000" algn="ctr" rotWithShape="0">
                       <a:srgbClr val="000000">
@@ -8752,7 +8753,7 @@
             <a:effectLst/>
             <a:extLst>
               <a:ext uri="{91240B29-F687-4f45-9708-019B960494DF}">
-                <a14:hiddenLine xmlns:a14="http://schemas.microsoft.com/office/drawing/2010/main" xmlns="" w="9525" cap="flat">
+                <a14:hiddenLine xmlns="" xmlns:a14="http://schemas.microsoft.com/office/drawing/2010/main" w="9525" cap="flat">
                   <a:solidFill>
                     <a:srgbClr val="808080"/>
                   </a:solidFill>
@@ -8762,7 +8763,7 @@
                 </a14:hiddenLine>
               </a:ext>
               <a:ext uri="{AF507438-7753-43e0-B8FC-AC1667EBCBE1}">
-                <a14:hiddenEffects xmlns:a14="http://schemas.microsoft.com/office/drawing/2010/main" xmlns="">
+                <a14:hiddenEffects xmlns="" xmlns:a14="http://schemas.microsoft.com/office/drawing/2010/main">
                   <a:effectLst>
                     <a:outerShdw blurRad="63500" dist="38099" dir="2700000" algn="ctr" rotWithShape="0">
                       <a:srgbClr val="000000">
@@ -8930,7 +8931,7 @@
             <a:effectLst/>
             <a:extLst>
               <a:ext uri="{91240B29-F687-4f45-9708-019B960494DF}">
-                <a14:hiddenLine xmlns:a14="http://schemas.microsoft.com/office/drawing/2010/main" xmlns="" w="9525" cap="flat">
+                <a14:hiddenLine xmlns="" xmlns:a14="http://schemas.microsoft.com/office/drawing/2010/main" w="9525" cap="flat">
                   <a:solidFill>
                     <a:srgbClr val="808080"/>
                   </a:solidFill>
@@ -8940,7 +8941,7 @@
                 </a14:hiddenLine>
               </a:ext>
               <a:ext uri="{AF507438-7753-43e0-B8FC-AC1667EBCBE1}">
-                <a14:hiddenEffects xmlns:a14="http://schemas.microsoft.com/office/drawing/2010/main" xmlns="">
+                <a14:hiddenEffects xmlns="" xmlns:a14="http://schemas.microsoft.com/office/drawing/2010/main">
                   <a:effectLst>
                     <a:outerShdw blurRad="63500" dist="38099" dir="2700000" algn="ctr" rotWithShape="0">
                       <a:srgbClr val="000000">
@@ -9046,7 +9047,7 @@
             <a:effectLst/>
             <a:extLst>
               <a:ext uri="{91240B29-F687-4f45-9708-019B960494DF}">
-                <a14:hiddenLine xmlns:a14="http://schemas.microsoft.com/office/drawing/2010/main" xmlns="" w="9525" cap="flat">
+                <a14:hiddenLine xmlns="" xmlns:a14="http://schemas.microsoft.com/office/drawing/2010/main" w="9525" cap="flat">
                   <a:solidFill>
                     <a:srgbClr val="808080"/>
                   </a:solidFill>
@@ -9056,7 +9057,7 @@
                 </a14:hiddenLine>
               </a:ext>
               <a:ext uri="{AF507438-7753-43e0-B8FC-AC1667EBCBE1}">
-                <a14:hiddenEffects xmlns:a14="http://schemas.microsoft.com/office/drawing/2010/main" xmlns="">
+                <a14:hiddenEffects xmlns="" xmlns:a14="http://schemas.microsoft.com/office/drawing/2010/main">
                   <a:effectLst>
                     <a:outerShdw blurRad="63500" dist="38099" dir="2700000" algn="ctr" rotWithShape="0">
                       <a:srgbClr val="000000">
@@ -9234,7 +9235,7 @@
             <a:effectLst/>
             <a:extLst>
               <a:ext uri="{91240B29-F687-4f45-9708-019B960494DF}">
-                <a14:hiddenLine xmlns:a14="http://schemas.microsoft.com/office/drawing/2010/main" xmlns="" w="9525" cap="flat">
+                <a14:hiddenLine xmlns="" xmlns:a14="http://schemas.microsoft.com/office/drawing/2010/main" w="9525" cap="flat">
                   <a:solidFill>
                     <a:srgbClr val="808080"/>
                   </a:solidFill>
@@ -9244,7 +9245,7 @@
                 </a14:hiddenLine>
               </a:ext>
               <a:ext uri="{AF507438-7753-43e0-B8FC-AC1667EBCBE1}">
-                <a14:hiddenEffects xmlns:a14="http://schemas.microsoft.com/office/drawing/2010/main" xmlns="">
+                <a14:hiddenEffects xmlns="" xmlns:a14="http://schemas.microsoft.com/office/drawing/2010/main">
                   <a:effectLst>
                     <a:outerShdw blurRad="63500" dist="38099" dir="2700000" algn="ctr" rotWithShape="0">
                       <a:srgbClr val="000000">
@@ -9350,7 +9351,7 @@
             <a:effectLst/>
             <a:extLst>
               <a:ext uri="{91240B29-F687-4f45-9708-019B960494DF}">
-                <a14:hiddenLine xmlns:a14="http://schemas.microsoft.com/office/drawing/2010/main" xmlns="" w="9525" cap="flat">
+                <a14:hiddenLine xmlns="" xmlns:a14="http://schemas.microsoft.com/office/drawing/2010/main" w="9525" cap="flat">
                   <a:solidFill>
                     <a:srgbClr val="808080"/>
                   </a:solidFill>
@@ -9360,7 +9361,7 @@
                 </a14:hiddenLine>
               </a:ext>
               <a:ext uri="{AF507438-7753-43e0-B8FC-AC1667EBCBE1}">
-                <a14:hiddenEffects xmlns:a14="http://schemas.microsoft.com/office/drawing/2010/main" xmlns="">
+                <a14:hiddenEffects xmlns="" xmlns:a14="http://schemas.microsoft.com/office/drawing/2010/main">
                   <a:effectLst>
                     <a:outerShdw blurRad="63500" dist="38099" dir="2700000" algn="ctr" rotWithShape="0">
                       <a:srgbClr val="000000">
@@ -9682,7 +9683,7 @@
             <a:effectLst/>
             <a:extLst>
               <a:ext uri="{91240B29-F687-4f45-9708-019B960494DF}">
-                <a14:hiddenLine xmlns:a14="http://schemas.microsoft.com/office/drawing/2010/main" xmlns="" w="9525" cap="flat">
+                <a14:hiddenLine xmlns="" xmlns:a14="http://schemas.microsoft.com/office/drawing/2010/main" w="9525" cap="flat">
                   <a:solidFill>
                     <a:srgbClr val="808080"/>
                   </a:solidFill>
@@ -9692,7 +9693,7 @@
                 </a14:hiddenLine>
               </a:ext>
               <a:ext uri="{AF507438-7753-43e0-B8FC-AC1667EBCBE1}">
-                <a14:hiddenEffects xmlns:a14="http://schemas.microsoft.com/office/drawing/2010/main" xmlns="">
+                <a14:hiddenEffects xmlns="" xmlns:a14="http://schemas.microsoft.com/office/drawing/2010/main">
                   <a:effectLst>
                     <a:outerShdw blurRad="63500" dist="38099" dir="2700000" algn="ctr" rotWithShape="0">
                       <a:srgbClr val="000000">
@@ -9824,7 +9825,7 @@
             <a:effectLst/>
             <a:extLst>
               <a:ext uri="{91240B29-F687-4f45-9708-019B960494DF}">
-                <a14:hiddenLine xmlns:a14="http://schemas.microsoft.com/office/drawing/2010/main" xmlns="" w="9525" cap="flat">
+                <a14:hiddenLine xmlns="" xmlns:a14="http://schemas.microsoft.com/office/drawing/2010/main" w="9525" cap="flat">
                   <a:solidFill>
                     <a:srgbClr val="808080"/>
                   </a:solidFill>
@@ -9834,7 +9835,7 @@
                 </a14:hiddenLine>
               </a:ext>
               <a:ext uri="{AF507438-7753-43e0-B8FC-AC1667EBCBE1}">
-                <a14:hiddenEffects xmlns:a14="http://schemas.microsoft.com/office/drawing/2010/main" xmlns="">
+                <a14:hiddenEffects xmlns="" xmlns:a14="http://schemas.microsoft.com/office/drawing/2010/main">
                   <a:effectLst>
                     <a:outerShdw blurRad="63500" dist="38099" dir="2700000" algn="ctr" rotWithShape="0">
                       <a:srgbClr val="000000">
@@ -10040,7 +10041,7 @@
             <a:effectLst/>
             <a:extLst>
               <a:ext uri="{91240B29-F687-4f45-9708-019B960494DF}">
-                <a14:hiddenLine xmlns:a14="http://schemas.microsoft.com/office/drawing/2010/main" xmlns="" w="9525" cap="flat">
+                <a14:hiddenLine xmlns="" xmlns:a14="http://schemas.microsoft.com/office/drawing/2010/main" w="9525" cap="flat">
                   <a:solidFill>
                     <a:srgbClr val="808080"/>
                   </a:solidFill>
@@ -10050,7 +10051,7 @@
                 </a14:hiddenLine>
               </a:ext>
               <a:ext uri="{AF507438-7753-43e0-B8FC-AC1667EBCBE1}">
-                <a14:hiddenEffects xmlns:a14="http://schemas.microsoft.com/office/drawing/2010/main" xmlns="">
+                <a14:hiddenEffects xmlns="" xmlns:a14="http://schemas.microsoft.com/office/drawing/2010/main">
                   <a:effectLst>
                     <a:outerShdw blurRad="63500" dist="38099" dir="2700000" algn="ctr" rotWithShape="0">
                       <a:srgbClr val="000000">
@@ -10292,7 +10293,7 @@
             <a:effectLst/>
             <a:extLst>
               <a:ext uri="{91240B29-F687-4f45-9708-019B960494DF}">
-                <a14:hiddenLine xmlns:a14="http://schemas.microsoft.com/office/drawing/2010/main" xmlns="" w="9525" cap="flat">
+                <a14:hiddenLine xmlns="" xmlns:a14="http://schemas.microsoft.com/office/drawing/2010/main" w="9525" cap="flat">
                   <a:solidFill>
                     <a:srgbClr val="808080"/>
                   </a:solidFill>
@@ -10302,7 +10303,7 @@
                 </a14:hiddenLine>
               </a:ext>
               <a:ext uri="{AF507438-7753-43e0-B8FC-AC1667EBCBE1}">
-                <a14:hiddenEffects xmlns:a14="http://schemas.microsoft.com/office/drawing/2010/main" xmlns="">
+                <a14:hiddenEffects xmlns="" xmlns:a14="http://schemas.microsoft.com/office/drawing/2010/main">
                   <a:effectLst>
                     <a:outerShdw blurRad="63500" dist="38099" dir="2700000" algn="ctr" rotWithShape="0">
                       <a:srgbClr val="000000">
@@ -10544,7 +10545,7 @@
             <a:effectLst/>
             <a:extLst>
               <a:ext uri="{91240B29-F687-4f45-9708-019B960494DF}">
-                <a14:hiddenLine xmlns:a14="http://schemas.microsoft.com/office/drawing/2010/main" xmlns="" w="9525" cap="flat">
+                <a14:hiddenLine xmlns="" xmlns:a14="http://schemas.microsoft.com/office/drawing/2010/main" w="9525" cap="flat">
                   <a:solidFill>
                     <a:srgbClr val="808080"/>
                   </a:solidFill>
@@ -10554,7 +10555,7 @@
                 </a14:hiddenLine>
               </a:ext>
               <a:ext uri="{AF507438-7753-43e0-B8FC-AC1667EBCBE1}">
-                <a14:hiddenEffects xmlns:a14="http://schemas.microsoft.com/office/drawing/2010/main" xmlns="">
+                <a14:hiddenEffects xmlns="" xmlns:a14="http://schemas.microsoft.com/office/drawing/2010/main">
                   <a:effectLst>
                     <a:outerShdw blurRad="63500" dist="38099" dir="2700000" algn="ctr" rotWithShape="0">
                       <a:srgbClr val="000000">
@@ -10686,7 +10687,7 @@
             <a:effectLst/>
             <a:extLst>
               <a:ext uri="{91240B29-F687-4f45-9708-019B960494DF}">
-                <a14:hiddenLine xmlns:a14="http://schemas.microsoft.com/office/drawing/2010/main" xmlns="" w="9525" cap="flat">
+                <a14:hiddenLine xmlns="" xmlns:a14="http://schemas.microsoft.com/office/drawing/2010/main" w="9525" cap="flat">
                   <a:solidFill>
                     <a:srgbClr val="808080"/>
                   </a:solidFill>
@@ -10696,7 +10697,7 @@
                 </a14:hiddenLine>
               </a:ext>
               <a:ext uri="{AF507438-7753-43e0-B8FC-AC1667EBCBE1}">
-                <a14:hiddenEffects xmlns:a14="http://schemas.microsoft.com/office/drawing/2010/main" xmlns="">
+                <a14:hiddenEffects xmlns="" xmlns:a14="http://schemas.microsoft.com/office/drawing/2010/main">
                   <a:effectLst>
                     <a:outerShdw blurRad="63500" dist="38099" dir="2700000" algn="ctr" rotWithShape="0">
                       <a:srgbClr val="000000">
@@ -10802,7 +10803,7 @@
             <a:effectLst/>
             <a:extLst>
               <a:ext uri="{91240B29-F687-4f45-9708-019B960494DF}">
-                <a14:hiddenLine xmlns:a14="http://schemas.microsoft.com/office/drawing/2010/main" xmlns="" w="9525" cap="flat">
+                <a14:hiddenLine xmlns="" xmlns:a14="http://schemas.microsoft.com/office/drawing/2010/main" w="9525" cap="flat">
                   <a:solidFill>
                     <a:srgbClr val="808080"/>
                   </a:solidFill>
@@ -10812,7 +10813,7 @@
                 </a14:hiddenLine>
               </a:ext>
               <a:ext uri="{AF507438-7753-43e0-B8FC-AC1667EBCBE1}">
-                <a14:hiddenEffects xmlns:a14="http://schemas.microsoft.com/office/drawing/2010/main" xmlns="">
+                <a14:hiddenEffects xmlns="" xmlns:a14="http://schemas.microsoft.com/office/drawing/2010/main">
                   <a:effectLst>
                     <a:outerShdw blurRad="63500" dist="38099" dir="2700000" algn="ctr" rotWithShape="0">
                       <a:srgbClr val="000000">
@@ -11026,7 +11027,7 @@
             <a:effectLst/>
             <a:extLst>
               <a:ext uri="{91240B29-F687-4f45-9708-019B960494DF}">
-                <a14:hiddenLine xmlns:a14="http://schemas.microsoft.com/office/drawing/2010/main" xmlns="" w="9525" cap="flat">
+                <a14:hiddenLine xmlns="" xmlns:a14="http://schemas.microsoft.com/office/drawing/2010/main" w="9525" cap="flat">
                   <a:solidFill>
                     <a:srgbClr val="808080"/>
                   </a:solidFill>
@@ -11036,7 +11037,7 @@
                 </a14:hiddenLine>
               </a:ext>
               <a:ext uri="{AF507438-7753-43e0-B8FC-AC1667EBCBE1}">
-                <a14:hiddenEffects xmlns:a14="http://schemas.microsoft.com/office/drawing/2010/main" xmlns="">
+                <a14:hiddenEffects xmlns="" xmlns:a14="http://schemas.microsoft.com/office/drawing/2010/main">
                   <a:effectLst>
                     <a:outerShdw blurRad="63500" dist="38099" dir="2700000" algn="ctr" rotWithShape="0">
                       <a:srgbClr val="000000">
@@ -11252,7 +11253,7 @@
             <a:effectLst/>
             <a:extLst>
               <a:ext uri="{91240B29-F687-4f45-9708-019B960494DF}">
-                <a14:hiddenLine xmlns:a14="http://schemas.microsoft.com/office/drawing/2010/main" xmlns="" w="9525" cap="flat">
+                <a14:hiddenLine xmlns="" xmlns:a14="http://schemas.microsoft.com/office/drawing/2010/main" w="9525" cap="flat">
                   <a:solidFill>
                     <a:srgbClr val="808080"/>
                   </a:solidFill>
@@ -11262,7 +11263,7 @@
                 </a14:hiddenLine>
               </a:ext>
               <a:ext uri="{AF507438-7753-43e0-B8FC-AC1667EBCBE1}">
-                <a14:hiddenEffects xmlns:a14="http://schemas.microsoft.com/office/drawing/2010/main" xmlns="">
+                <a14:hiddenEffects xmlns="" xmlns:a14="http://schemas.microsoft.com/office/drawing/2010/main">
                   <a:effectLst>
                     <a:outerShdw blurRad="63500" dist="38099" dir="2700000" algn="ctr" rotWithShape="0">
                       <a:srgbClr val="000000">
@@ -11468,7 +11469,7 @@
             <a:effectLst/>
             <a:extLst>
               <a:ext uri="{91240B29-F687-4f45-9708-019B960494DF}">
-                <a14:hiddenLine xmlns:a14="http://schemas.microsoft.com/office/drawing/2010/main" xmlns="" w="9525" cap="flat">
+                <a14:hiddenLine xmlns="" xmlns:a14="http://schemas.microsoft.com/office/drawing/2010/main" w="9525" cap="flat">
                   <a:solidFill>
                     <a:srgbClr val="808080"/>
                   </a:solidFill>
@@ -11478,7 +11479,7 @@
                 </a14:hiddenLine>
               </a:ext>
               <a:ext uri="{AF507438-7753-43e0-B8FC-AC1667EBCBE1}">
-                <a14:hiddenEffects xmlns:a14="http://schemas.microsoft.com/office/drawing/2010/main" xmlns="">
+                <a14:hiddenEffects xmlns="" xmlns:a14="http://schemas.microsoft.com/office/drawing/2010/main">
                   <a:effectLst>
                     <a:outerShdw blurRad="63500" dist="38099" dir="2700000" algn="ctr" rotWithShape="0">
                       <a:srgbClr val="000000">
@@ -11686,7 +11687,7 @@
             <a:effectLst/>
             <a:extLst>
               <a:ext uri="{91240B29-F687-4f45-9708-019B960494DF}">
-                <a14:hiddenLine xmlns:a14="http://schemas.microsoft.com/office/drawing/2010/main" xmlns="" w="9525" cap="flat">
+                <a14:hiddenLine xmlns="" xmlns:a14="http://schemas.microsoft.com/office/drawing/2010/main" w="9525" cap="flat">
                   <a:solidFill>
                     <a:srgbClr val="808080"/>
                   </a:solidFill>
@@ -11696,7 +11697,7 @@
                 </a14:hiddenLine>
               </a:ext>
               <a:ext uri="{AF507438-7753-43e0-B8FC-AC1667EBCBE1}">
-                <a14:hiddenEffects xmlns:a14="http://schemas.microsoft.com/office/drawing/2010/main" xmlns="">
+                <a14:hiddenEffects xmlns="" xmlns:a14="http://schemas.microsoft.com/office/drawing/2010/main">
                   <a:effectLst>
                     <a:outerShdw blurRad="63500" dist="38099" dir="2700000" algn="ctr" rotWithShape="0">
                       <a:srgbClr val="000000">
@@ -11914,7 +11915,7 @@
             <a:effectLst/>
             <a:extLst>
               <a:ext uri="{91240B29-F687-4f45-9708-019B960494DF}">
-                <a14:hiddenLine xmlns:a14="http://schemas.microsoft.com/office/drawing/2010/main" xmlns="" w="9525" cap="flat">
+                <a14:hiddenLine xmlns="" xmlns:a14="http://schemas.microsoft.com/office/drawing/2010/main" w="9525" cap="flat">
                   <a:solidFill>
                     <a:srgbClr val="808080"/>
                   </a:solidFill>
@@ -11924,7 +11925,7 @@
                 </a14:hiddenLine>
               </a:ext>
               <a:ext uri="{AF507438-7753-43e0-B8FC-AC1667EBCBE1}">
-                <a14:hiddenEffects xmlns:a14="http://schemas.microsoft.com/office/drawing/2010/main" xmlns="">
+                <a14:hiddenEffects xmlns="" xmlns:a14="http://schemas.microsoft.com/office/drawing/2010/main">
                   <a:effectLst>
                     <a:outerShdw blurRad="63500" dist="38099" dir="2700000" algn="ctr" rotWithShape="0">
                       <a:srgbClr val="000000">
@@ -12112,7 +12113,7 @@
             <a:effectLst/>
             <a:extLst>
               <a:ext uri="{91240B29-F687-4f45-9708-019B960494DF}">
-                <a14:hiddenLine xmlns:a14="http://schemas.microsoft.com/office/drawing/2010/main" xmlns="" w="9525" cap="flat">
+                <a14:hiddenLine xmlns="" xmlns:a14="http://schemas.microsoft.com/office/drawing/2010/main" w="9525" cap="flat">
                   <a:solidFill>
                     <a:srgbClr val="808080"/>
                   </a:solidFill>
@@ -12122,7 +12123,7 @@
                 </a14:hiddenLine>
               </a:ext>
               <a:ext uri="{AF507438-7753-43e0-B8FC-AC1667EBCBE1}">
-                <a14:hiddenEffects xmlns:a14="http://schemas.microsoft.com/office/drawing/2010/main" xmlns="">
+                <a14:hiddenEffects xmlns="" xmlns:a14="http://schemas.microsoft.com/office/drawing/2010/main">
                   <a:effectLst>
                     <a:outerShdw blurRad="63500" dist="38099" dir="2700000" algn="ctr" rotWithShape="0">
                       <a:srgbClr val="000000">
@@ -12326,7 +12327,7 @@
             <a:effectLst/>
             <a:extLst>
               <a:ext uri="{91240B29-F687-4f45-9708-019B960494DF}">
-                <a14:hiddenLine xmlns:a14="http://schemas.microsoft.com/office/drawing/2010/main" xmlns="" w="9525" cap="flat">
+                <a14:hiddenLine xmlns="" xmlns:a14="http://schemas.microsoft.com/office/drawing/2010/main" w="9525" cap="flat">
                   <a:solidFill>
                     <a:srgbClr val="808080"/>
                   </a:solidFill>
@@ -12336,7 +12337,7 @@
                 </a14:hiddenLine>
               </a:ext>
               <a:ext uri="{AF507438-7753-43e0-B8FC-AC1667EBCBE1}">
-                <a14:hiddenEffects xmlns:a14="http://schemas.microsoft.com/office/drawing/2010/main" xmlns="">
+                <a14:hiddenEffects xmlns="" xmlns:a14="http://schemas.microsoft.com/office/drawing/2010/main">
                   <a:effectLst>
                     <a:outerShdw blurRad="63500" dist="38099" dir="2700000" algn="ctr" rotWithShape="0">
                       <a:srgbClr val="000000">
@@ -12554,7 +12555,7 @@
             <a:effectLst/>
             <a:extLst>
               <a:ext uri="{91240B29-F687-4f45-9708-019B960494DF}">
-                <a14:hiddenLine xmlns:a14="http://schemas.microsoft.com/office/drawing/2010/main" xmlns="" w="9525" cap="flat">
+                <a14:hiddenLine xmlns="" xmlns:a14="http://schemas.microsoft.com/office/drawing/2010/main" w="9525" cap="flat">
                   <a:solidFill>
                     <a:srgbClr val="808080"/>
                   </a:solidFill>
@@ -12564,7 +12565,7 @@
                 </a14:hiddenLine>
               </a:ext>
               <a:ext uri="{AF507438-7753-43e0-B8FC-AC1667EBCBE1}">
-                <a14:hiddenEffects xmlns:a14="http://schemas.microsoft.com/office/drawing/2010/main" xmlns="">
+                <a14:hiddenEffects xmlns="" xmlns:a14="http://schemas.microsoft.com/office/drawing/2010/main">
                   <a:effectLst>
                     <a:outerShdw blurRad="63500" dist="38099" dir="2700000" algn="ctr" rotWithShape="0">
                       <a:srgbClr val="000000">
@@ -12760,7 +12761,7 @@
             <a:effectLst/>
             <a:extLst>
               <a:ext uri="{91240B29-F687-4f45-9708-019B960494DF}">
-                <a14:hiddenLine xmlns:a14="http://schemas.microsoft.com/office/drawing/2010/main" xmlns="" w="9525" cap="flat">
+                <a14:hiddenLine xmlns="" xmlns:a14="http://schemas.microsoft.com/office/drawing/2010/main" w="9525" cap="flat">
                   <a:solidFill>
                     <a:srgbClr val="808080"/>
                   </a:solidFill>
@@ -12770,7 +12771,7 @@
                 </a14:hiddenLine>
               </a:ext>
               <a:ext uri="{AF507438-7753-43e0-B8FC-AC1667EBCBE1}">
-                <a14:hiddenEffects xmlns:a14="http://schemas.microsoft.com/office/drawing/2010/main" xmlns="">
+                <a14:hiddenEffects xmlns="" xmlns:a14="http://schemas.microsoft.com/office/drawing/2010/main">
                   <a:effectLst>
                     <a:outerShdw blurRad="63500" dist="38099" dir="2700000" algn="ctr" rotWithShape="0">
                       <a:srgbClr val="000000">
@@ -12870,7 +12871,7 @@
             <a:effectLst/>
             <a:extLst>
               <a:ext uri="{91240B29-F687-4f45-9708-019B960494DF}">
-                <a14:hiddenLine xmlns:a14="http://schemas.microsoft.com/office/drawing/2010/main" xmlns="" w="9525" cap="flat">
+                <a14:hiddenLine xmlns="" xmlns:a14="http://schemas.microsoft.com/office/drawing/2010/main" w="9525" cap="flat">
                   <a:solidFill>
                     <a:srgbClr val="808080"/>
                   </a:solidFill>
@@ -12880,7 +12881,7 @@
                 </a14:hiddenLine>
               </a:ext>
               <a:ext uri="{AF507438-7753-43e0-B8FC-AC1667EBCBE1}">
-                <a14:hiddenEffects xmlns:a14="http://schemas.microsoft.com/office/drawing/2010/main" xmlns="">
+                <a14:hiddenEffects xmlns="" xmlns:a14="http://schemas.microsoft.com/office/drawing/2010/main">
                   <a:effectLst>
                     <a:outerShdw blurRad="63500" dist="38099" dir="2700000" algn="ctr" rotWithShape="0">
                       <a:srgbClr val="000000">
@@ -13418,7 +13419,7 @@
             <a:effectLst/>
             <a:extLst>
               <a:ext uri="{91240B29-F687-4f45-9708-019B960494DF}">
-                <a14:hiddenLine xmlns:a14="http://schemas.microsoft.com/office/drawing/2010/main" xmlns="" w="9525" cap="flat">
+                <a14:hiddenLine xmlns="" xmlns:a14="http://schemas.microsoft.com/office/drawing/2010/main" w="9525" cap="flat">
                   <a:solidFill>
                     <a:srgbClr val="808080"/>
                   </a:solidFill>
@@ -13428,7 +13429,7 @@
                 </a14:hiddenLine>
               </a:ext>
               <a:ext uri="{AF507438-7753-43e0-B8FC-AC1667EBCBE1}">
-                <a14:hiddenEffects xmlns:a14="http://schemas.microsoft.com/office/drawing/2010/main" xmlns="">
+                <a14:hiddenEffects xmlns="" xmlns:a14="http://schemas.microsoft.com/office/drawing/2010/main">
                   <a:effectLst>
                     <a:outerShdw blurRad="63500" dist="38099" dir="2700000" algn="ctr" rotWithShape="0">
                       <a:srgbClr val="000000">
@@ -13560,7 +13561,7 @@
             <a:effectLst/>
             <a:extLst>
               <a:ext uri="{91240B29-F687-4f45-9708-019B960494DF}">
-                <a14:hiddenLine xmlns:a14="http://schemas.microsoft.com/office/drawing/2010/main" xmlns="" w="9525" cap="flat">
+                <a14:hiddenLine xmlns="" xmlns:a14="http://schemas.microsoft.com/office/drawing/2010/main" w="9525" cap="flat">
                   <a:solidFill>
                     <a:srgbClr val="808080"/>
                   </a:solidFill>
@@ -13570,7 +13571,7 @@
                 </a14:hiddenLine>
               </a:ext>
               <a:ext uri="{AF507438-7753-43e0-B8FC-AC1667EBCBE1}">
-                <a14:hiddenEffects xmlns:a14="http://schemas.microsoft.com/office/drawing/2010/main" xmlns="">
+                <a14:hiddenEffects xmlns="" xmlns:a14="http://schemas.microsoft.com/office/drawing/2010/main">
                   <a:effectLst>
                     <a:outerShdw blurRad="63500" dist="38099" dir="2700000" algn="ctr" rotWithShape="0">
                       <a:srgbClr val="000000">
@@ -13738,7 +13739,7 @@
             <a:effectLst/>
             <a:extLst>
               <a:ext uri="{91240B29-F687-4f45-9708-019B960494DF}">
-                <a14:hiddenLine xmlns:a14="http://schemas.microsoft.com/office/drawing/2010/main" xmlns="" w="9525" cap="flat">
+                <a14:hiddenLine xmlns="" xmlns:a14="http://schemas.microsoft.com/office/drawing/2010/main" w="9525" cap="flat">
                   <a:solidFill>
                     <a:srgbClr val="808080"/>
                   </a:solidFill>
@@ -13748,7 +13749,7 @@
                 </a14:hiddenLine>
               </a:ext>
               <a:ext uri="{AF507438-7753-43e0-B8FC-AC1667EBCBE1}">
-                <a14:hiddenEffects xmlns:a14="http://schemas.microsoft.com/office/drawing/2010/main" xmlns="">
+                <a14:hiddenEffects xmlns="" xmlns:a14="http://schemas.microsoft.com/office/drawing/2010/main">
                   <a:effectLst>
                     <a:outerShdw blurRad="63500" dist="38099" dir="2700000" algn="ctr" rotWithShape="0">
                       <a:srgbClr val="000000">
@@ -13854,7 +13855,7 @@
             <a:effectLst/>
             <a:extLst>
               <a:ext uri="{91240B29-F687-4f45-9708-019B960494DF}">
-                <a14:hiddenLine xmlns:a14="http://schemas.microsoft.com/office/drawing/2010/main" xmlns="" w="9525" cap="flat">
+                <a14:hiddenLine xmlns="" xmlns:a14="http://schemas.microsoft.com/office/drawing/2010/main" w="9525" cap="flat">
                   <a:solidFill>
                     <a:srgbClr val="808080"/>
                   </a:solidFill>
@@ -13864,7 +13865,7 @@
                 </a14:hiddenLine>
               </a:ext>
               <a:ext uri="{AF507438-7753-43e0-B8FC-AC1667EBCBE1}">
-                <a14:hiddenEffects xmlns:a14="http://schemas.microsoft.com/office/drawing/2010/main" xmlns="">
+                <a14:hiddenEffects xmlns="" xmlns:a14="http://schemas.microsoft.com/office/drawing/2010/main">
                   <a:effectLst>
                     <a:outerShdw blurRad="63500" dist="38099" dir="2700000" algn="ctr" rotWithShape="0">
                       <a:srgbClr val="000000">
@@ -14042,7 +14043,7 @@
             <a:effectLst/>
             <a:extLst>
               <a:ext uri="{91240B29-F687-4f45-9708-019B960494DF}">
-                <a14:hiddenLine xmlns:a14="http://schemas.microsoft.com/office/drawing/2010/main" xmlns="" w="9525" cap="flat">
+                <a14:hiddenLine xmlns="" xmlns:a14="http://schemas.microsoft.com/office/drawing/2010/main" w="9525" cap="flat">
                   <a:solidFill>
                     <a:srgbClr val="808080"/>
                   </a:solidFill>
@@ -14052,7 +14053,7 @@
                 </a14:hiddenLine>
               </a:ext>
               <a:ext uri="{AF507438-7753-43e0-B8FC-AC1667EBCBE1}">
-                <a14:hiddenEffects xmlns:a14="http://schemas.microsoft.com/office/drawing/2010/main" xmlns="">
+                <a14:hiddenEffects xmlns="" xmlns:a14="http://schemas.microsoft.com/office/drawing/2010/main">
                   <a:effectLst>
                     <a:outerShdw blurRad="63500" dist="38099" dir="2700000" algn="ctr" rotWithShape="0">
                       <a:srgbClr val="000000">
@@ -14158,7 +14159,7 @@
             <a:effectLst/>
             <a:extLst>
               <a:ext uri="{91240B29-F687-4f45-9708-019B960494DF}">
-                <a14:hiddenLine xmlns:a14="http://schemas.microsoft.com/office/drawing/2010/main" xmlns="" w="9525" cap="flat">
+                <a14:hiddenLine xmlns="" xmlns:a14="http://schemas.microsoft.com/office/drawing/2010/main" w="9525" cap="flat">
                   <a:solidFill>
                     <a:srgbClr val="808080"/>
                   </a:solidFill>
@@ -14168,7 +14169,7 @@
                 </a14:hiddenLine>
               </a:ext>
               <a:ext uri="{AF507438-7753-43e0-B8FC-AC1667EBCBE1}">
-                <a14:hiddenEffects xmlns:a14="http://schemas.microsoft.com/office/drawing/2010/main" xmlns="">
+                <a14:hiddenEffects xmlns="" xmlns:a14="http://schemas.microsoft.com/office/drawing/2010/main">
                   <a:effectLst>
                     <a:outerShdw blurRad="63500" dist="38099" dir="2700000" algn="ctr" rotWithShape="0">
                       <a:srgbClr val="000000">
@@ -14490,7 +14491,7 @@
             <a:effectLst/>
             <a:extLst>
               <a:ext uri="{91240B29-F687-4f45-9708-019B960494DF}">
-                <a14:hiddenLine xmlns:a14="http://schemas.microsoft.com/office/drawing/2010/main" xmlns="" w="9525" cap="flat">
+                <a14:hiddenLine xmlns="" xmlns:a14="http://schemas.microsoft.com/office/drawing/2010/main" w="9525" cap="flat">
                   <a:solidFill>
                     <a:srgbClr val="808080"/>
                   </a:solidFill>
@@ -14500,7 +14501,7 @@
                 </a14:hiddenLine>
               </a:ext>
               <a:ext uri="{AF507438-7753-43e0-B8FC-AC1667EBCBE1}">
-                <a14:hiddenEffects xmlns:a14="http://schemas.microsoft.com/office/drawing/2010/main" xmlns="">
+                <a14:hiddenEffects xmlns="" xmlns:a14="http://schemas.microsoft.com/office/drawing/2010/main">
                   <a:effectLst>
                     <a:outerShdw blurRad="63500" dist="38099" dir="2700000" algn="ctr" rotWithShape="0">
                       <a:srgbClr val="000000">
@@ -14632,7 +14633,7 @@
             <a:effectLst/>
             <a:extLst>
               <a:ext uri="{91240B29-F687-4f45-9708-019B960494DF}">
-                <a14:hiddenLine xmlns:a14="http://schemas.microsoft.com/office/drawing/2010/main" xmlns="" w="9525" cap="flat">
+                <a14:hiddenLine xmlns="" xmlns:a14="http://schemas.microsoft.com/office/drawing/2010/main" w="9525" cap="flat">
                   <a:solidFill>
                     <a:srgbClr val="808080"/>
                   </a:solidFill>
@@ -14642,7 +14643,7 @@
                 </a14:hiddenLine>
               </a:ext>
               <a:ext uri="{AF507438-7753-43e0-B8FC-AC1667EBCBE1}">
-                <a14:hiddenEffects xmlns:a14="http://schemas.microsoft.com/office/drawing/2010/main" xmlns="">
+                <a14:hiddenEffects xmlns="" xmlns:a14="http://schemas.microsoft.com/office/drawing/2010/main">
                   <a:effectLst>
                     <a:outerShdw blurRad="63500" dist="38099" dir="2700000" algn="ctr" rotWithShape="0">
                       <a:srgbClr val="000000">
@@ -14848,7 +14849,7 @@
             <a:effectLst/>
             <a:extLst>
               <a:ext uri="{91240B29-F687-4f45-9708-019B960494DF}">
-                <a14:hiddenLine xmlns:a14="http://schemas.microsoft.com/office/drawing/2010/main" xmlns="" w="9525" cap="flat">
+                <a14:hiddenLine xmlns="" xmlns:a14="http://schemas.microsoft.com/office/drawing/2010/main" w="9525" cap="flat">
                   <a:solidFill>
                     <a:srgbClr val="808080"/>
                   </a:solidFill>
@@ -14858,7 +14859,7 @@
                 </a14:hiddenLine>
               </a:ext>
               <a:ext uri="{AF507438-7753-43e0-B8FC-AC1667EBCBE1}">
-                <a14:hiddenEffects xmlns:a14="http://schemas.microsoft.com/office/drawing/2010/main" xmlns="">
+                <a14:hiddenEffects xmlns="" xmlns:a14="http://schemas.microsoft.com/office/drawing/2010/main">
                   <a:effectLst>
                     <a:outerShdw blurRad="63500" dist="38099" dir="2700000" algn="ctr" rotWithShape="0">
                       <a:srgbClr val="000000">
@@ -15100,7 +15101,7 @@
             <a:effectLst/>
             <a:extLst>
               <a:ext uri="{91240B29-F687-4f45-9708-019B960494DF}">
-                <a14:hiddenLine xmlns:a14="http://schemas.microsoft.com/office/drawing/2010/main" xmlns="" w="9525" cap="flat">
+                <a14:hiddenLine xmlns="" xmlns:a14="http://schemas.microsoft.com/office/drawing/2010/main" w="9525" cap="flat">
                   <a:solidFill>
                     <a:srgbClr val="808080"/>
                   </a:solidFill>
@@ -15110,7 +15111,7 @@
                 </a14:hiddenLine>
               </a:ext>
               <a:ext uri="{AF507438-7753-43e0-B8FC-AC1667EBCBE1}">
-                <a14:hiddenEffects xmlns:a14="http://schemas.microsoft.com/office/drawing/2010/main" xmlns="">
+                <a14:hiddenEffects xmlns="" xmlns:a14="http://schemas.microsoft.com/office/drawing/2010/main">
                   <a:effectLst>
                     <a:outerShdw blurRad="63500" dist="38099" dir="2700000" algn="ctr" rotWithShape="0">
                       <a:srgbClr val="000000">
@@ -15352,7 +15353,7 @@
             <a:effectLst/>
             <a:extLst>
               <a:ext uri="{91240B29-F687-4f45-9708-019B960494DF}">
-                <a14:hiddenLine xmlns:a14="http://schemas.microsoft.com/office/drawing/2010/main" xmlns="" w="9525" cap="flat">
+                <a14:hiddenLine xmlns="" xmlns:a14="http://schemas.microsoft.com/office/drawing/2010/main" w="9525" cap="flat">
                   <a:solidFill>
                     <a:srgbClr val="808080"/>
                   </a:solidFill>
@@ -15362,7 +15363,7 @@
                 </a14:hiddenLine>
               </a:ext>
               <a:ext uri="{AF507438-7753-43e0-B8FC-AC1667EBCBE1}">
-                <a14:hiddenEffects xmlns:a14="http://schemas.microsoft.com/office/drawing/2010/main" xmlns="">
+                <a14:hiddenEffects xmlns="" xmlns:a14="http://schemas.microsoft.com/office/drawing/2010/main">
                   <a:effectLst>
                     <a:outerShdw blurRad="63500" dist="38099" dir="2700000" algn="ctr" rotWithShape="0">
                       <a:srgbClr val="000000">
@@ -15494,7 +15495,7 @@
             <a:effectLst/>
             <a:extLst>
               <a:ext uri="{91240B29-F687-4f45-9708-019B960494DF}">
-                <a14:hiddenLine xmlns:a14="http://schemas.microsoft.com/office/drawing/2010/main" xmlns="" w="9525" cap="flat">
+                <a14:hiddenLine xmlns="" xmlns:a14="http://schemas.microsoft.com/office/drawing/2010/main" w="9525" cap="flat">
                   <a:solidFill>
                     <a:srgbClr val="808080"/>
                   </a:solidFill>
@@ -15504,7 +15505,7 @@
                 </a14:hiddenLine>
               </a:ext>
               <a:ext uri="{AF507438-7753-43e0-B8FC-AC1667EBCBE1}">
-                <a14:hiddenEffects xmlns:a14="http://schemas.microsoft.com/office/drawing/2010/main" xmlns="">
+                <a14:hiddenEffects xmlns="" xmlns:a14="http://schemas.microsoft.com/office/drawing/2010/main">
                   <a:effectLst>
                     <a:outerShdw blurRad="63500" dist="38099" dir="2700000" algn="ctr" rotWithShape="0">
                       <a:srgbClr val="000000">
@@ -15610,7 +15611,7 @@
             <a:effectLst/>
             <a:extLst>
               <a:ext uri="{91240B29-F687-4f45-9708-019B960494DF}">
-                <a14:hiddenLine xmlns:a14="http://schemas.microsoft.com/office/drawing/2010/main" xmlns="" w="9525" cap="flat">
+                <a14:hiddenLine xmlns="" xmlns:a14="http://schemas.microsoft.com/office/drawing/2010/main" w="9525" cap="flat">
                   <a:solidFill>
                     <a:srgbClr val="808080"/>
                   </a:solidFill>
@@ -15620,7 +15621,7 @@
                 </a14:hiddenLine>
               </a:ext>
               <a:ext uri="{AF507438-7753-43e0-B8FC-AC1667EBCBE1}">
-                <a14:hiddenEffects xmlns:a14="http://schemas.microsoft.com/office/drawing/2010/main" xmlns="">
+                <a14:hiddenEffects xmlns="" xmlns:a14="http://schemas.microsoft.com/office/drawing/2010/main">
                   <a:effectLst>
                     <a:outerShdw blurRad="63500" dist="38099" dir="2700000" algn="ctr" rotWithShape="0">
                       <a:srgbClr val="000000">
@@ -15834,7 +15835,7 @@
             <a:effectLst/>
             <a:extLst>
               <a:ext uri="{91240B29-F687-4f45-9708-019B960494DF}">
-                <a14:hiddenLine xmlns:a14="http://schemas.microsoft.com/office/drawing/2010/main" xmlns="" w="9525" cap="flat">
+                <a14:hiddenLine xmlns="" xmlns:a14="http://schemas.microsoft.com/office/drawing/2010/main" w="9525" cap="flat">
                   <a:solidFill>
                     <a:srgbClr val="808080"/>
                   </a:solidFill>
@@ -15844,7 +15845,7 @@
                 </a14:hiddenLine>
               </a:ext>
               <a:ext uri="{AF507438-7753-43e0-B8FC-AC1667EBCBE1}">
-                <a14:hiddenEffects xmlns:a14="http://schemas.microsoft.com/office/drawing/2010/main" xmlns="">
+                <a14:hiddenEffects xmlns="" xmlns:a14="http://schemas.microsoft.com/office/drawing/2010/main">
                   <a:effectLst>
                     <a:outerShdw blurRad="63500" dist="38099" dir="2700000" algn="ctr" rotWithShape="0">
                       <a:srgbClr val="000000">
@@ -16060,7 +16061,7 @@
             <a:effectLst/>
             <a:extLst>
               <a:ext uri="{91240B29-F687-4f45-9708-019B960494DF}">
-                <a14:hiddenLine xmlns:a14="http://schemas.microsoft.com/office/drawing/2010/main" xmlns="" w="9525" cap="flat">
+                <a14:hiddenLine xmlns="" xmlns:a14="http://schemas.microsoft.com/office/drawing/2010/main" w="9525" cap="flat">
                   <a:solidFill>
                     <a:srgbClr val="808080"/>
                   </a:solidFill>
@@ -16070,7 +16071,7 @@
                 </a14:hiddenLine>
               </a:ext>
               <a:ext uri="{AF507438-7753-43e0-B8FC-AC1667EBCBE1}">
-                <a14:hiddenEffects xmlns:a14="http://schemas.microsoft.com/office/drawing/2010/main" xmlns="">
+                <a14:hiddenEffects xmlns="" xmlns:a14="http://schemas.microsoft.com/office/drawing/2010/main">
                   <a:effectLst>
                     <a:outerShdw blurRad="63500" dist="38099" dir="2700000" algn="ctr" rotWithShape="0">
                       <a:srgbClr val="000000">
@@ -16276,7 +16277,7 @@
             <a:effectLst/>
             <a:extLst>
               <a:ext uri="{91240B29-F687-4f45-9708-019B960494DF}">
-                <a14:hiddenLine xmlns:a14="http://schemas.microsoft.com/office/drawing/2010/main" xmlns="" w="9525" cap="flat">
+                <a14:hiddenLine xmlns="" xmlns:a14="http://schemas.microsoft.com/office/drawing/2010/main" w="9525" cap="flat">
                   <a:solidFill>
                     <a:srgbClr val="808080"/>
                   </a:solidFill>
@@ -16286,7 +16287,7 @@
                 </a14:hiddenLine>
               </a:ext>
               <a:ext uri="{AF507438-7753-43e0-B8FC-AC1667EBCBE1}">
-                <a14:hiddenEffects xmlns:a14="http://schemas.microsoft.com/office/drawing/2010/main" xmlns="">
+                <a14:hiddenEffects xmlns="" xmlns:a14="http://schemas.microsoft.com/office/drawing/2010/main">
                   <a:effectLst>
                     <a:outerShdw blurRad="63500" dist="38099" dir="2700000" algn="ctr" rotWithShape="0">
                       <a:srgbClr val="000000">
@@ -16494,7 +16495,7 @@
             <a:effectLst/>
             <a:extLst>
               <a:ext uri="{91240B29-F687-4f45-9708-019B960494DF}">
-                <a14:hiddenLine xmlns:a14="http://schemas.microsoft.com/office/drawing/2010/main" xmlns="" w="9525" cap="flat">
+                <a14:hiddenLine xmlns="" xmlns:a14="http://schemas.microsoft.com/office/drawing/2010/main" w="9525" cap="flat">
                   <a:solidFill>
                     <a:srgbClr val="808080"/>
                   </a:solidFill>
@@ -16504,7 +16505,7 @@
                 </a14:hiddenLine>
               </a:ext>
               <a:ext uri="{AF507438-7753-43e0-B8FC-AC1667EBCBE1}">
-                <a14:hiddenEffects xmlns:a14="http://schemas.microsoft.com/office/drawing/2010/main" xmlns="">
+                <a14:hiddenEffects xmlns="" xmlns:a14="http://schemas.microsoft.com/office/drawing/2010/main">
                   <a:effectLst>
                     <a:outerShdw blurRad="63500" dist="38099" dir="2700000" algn="ctr" rotWithShape="0">
                       <a:srgbClr val="000000">
@@ -16722,7 +16723,7 @@
             <a:effectLst/>
             <a:extLst>
               <a:ext uri="{91240B29-F687-4f45-9708-019B960494DF}">
-                <a14:hiddenLine xmlns:a14="http://schemas.microsoft.com/office/drawing/2010/main" xmlns="" w="9525" cap="flat">
+                <a14:hiddenLine xmlns="" xmlns:a14="http://schemas.microsoft.com/office/drawing/2010/main" w="9525" cap="flat">
                   <a:solidFill>
                     <a:srgbClr val="808080"/>
                   </a:solidFill>
@@ -16732,7 +16733,7 @@
                 </a14:hiddenLine>
               </a:ext>
               <a:ext uri="{AF507438-7753-43e0-B8FC-AC1667EBCBE1}">
-                <a14:hiddenEffects xmlns:a14="http://schemas.microsoft.com/office/drawing/2010/main" xmlns="">
+                <a14:hiddenEffects xmlns="" xmlns:a14="http://schemas.microsoft.com/office/drawing/2010/main">
                   <a:effectLst>
                     <a:outerShdw blurRad="63500" dist="38099" dir="2700000" algn="ctr" rotWithShape="0">
                       <a:srgbClr val="000000">
@@ -16920,7 +16921,7 @@
             <a:effectLst/>
             <a:extLst>
               <a:ext uri="{91240B29-F687-4f45-9708-019B960494DF}">
-                <a14:hiddenLine xmlns:a14="http://schemas.microsoft.com/office/drawing/2010/main" xmlns="" w="9525" cap="flat">
+                <a14:hiddenLine xmlns="" xmlns:a14="http://schemas.microsoft.com/office/drawing/2010/main" w="9525" cap="flat">
                   <a:solidFill>
                     <a:srgbClr val="808080"/>
                   </a:solidFill>
@@ -16930,7 +16931,7 @@
                 </a14:hiddenLine>
               </a:ext>
               <a:ext uri="{AF507438-7753-43e0-B8FC-AC1667EBCBE1}">
-                <a14:hiddenEffects xmlns:a14="http://schemas.microsoft.com/office/drawing/2010/main" xmlns="">
+                <a14:hiddenEffects xmlns="" xmlns:a14="http://schemas.microsoft.com/office/drawing/2010/main">
                   <a:effectLst>
                     <a:outerShdw blurRad="63500" dist="38099" dir="2700000" algn="ctr" rotWithShape="0">
                       <a:srgbClr val="000000">
@@ -17134,7 +17135,7 @@
             <a:effectLst/>
             <a:extLst>
               <a:ext uri="{91240B29-F687-4f45-9708-019B960494DF}">
-                <a14:hiddenLine xmlns:a14="http://schemas.microsoft.com/office/drawing/2010/main" xmlns="" w="9525" cap="flat">
+                <a14:hiddenLine xmlns="" xmlns:a14="http://schemas.microsoft.com/office/drawing/2010/main" w="9525" cap="flat">
                   <a:solidFill>
                     <a:srgbClr val="808080"/>
                   </a:solidFill>
@@ -17144,7 +17145,7 @@
                 </a14:hiddenLine>
               </a:ext>
               <a:ext uri="{AF507438-7753-43e0-B8FC-AC1667EBCBE1}">
-                <a14:hiddenEffects xmlns:a14="http://schemas.microsoft.com/office/drawing/2010/main" xmlns="">
+                <a14:hiddenEffects xmlns="" xmlns:a14="http://schemas.microsoft.com/office/drawing/2010/main">
                   <a:effectLst>
                     <a:outerShdw blurRad="63500" dist="38099" dir="2700000" algn="ctr" rotWithShape="0">
                       <a:srgbClr val="000000">
@@ -17362,7 +17363,7 @@
             <a:effectLst/>
             <a:extLst>
               <a:ext uri="{91240B29-F687-4f45-9708-019B960494DF}">
-                <a14:hiddenLine xmlns:a14="http://schemas.microsoft.com/office/drawing/2010/main" xmlns="" w="9525" cap="flat">
+                <a14:hiddenLine xmlns="" xmlns:a14="http://schemas.microsoft.com/office/drawing/2010/main" w="9525" cap="flat">
                   <a:solidFill>
                     <a:srgbClr val="808080"/>
                   </a:solidFill>
@@ -17372,7 +17373,7 @@
                 </a14:hiddenLine>
               </a:ext>
               <a:ext uri="{AF507438-7753-43e0-B8FC-AC1667EBCBE1}">
-                <a14:hiddenEffects xmlns:a14="http://schemas.microsoft.com/office/drawing/2010/main" xmlns="">
+                <a14:hiddenEffects xmlns="" xmlns:a14="http://schemas.microsoft.com/office/drawing/2010/main">
                   <a:effectLst>
                     <a:outerShdw blurRad="63500" dist="38099" dir="2700000" algn="ctr" rotWithShape="0">
                       <a:srgbClr val="000000">
@@ -17568,7 +17569,7 @@
             <a:effectLst/>
             <a:extLst>
               <a:ext uri="{91240B29-F687-4f45-9708-019B960494DF}">
-                <a14:hiddenLine xmlns:a14="http://schemas.microsoft.com/office/drawing/2010/main" xmlns="" w="9525" cap="flat">
+                <a14:hiddenLine xmlns="" xmlns:a14="http://schemas.microsoft.com/office/drawing/2010/main" w="9525" cap="flat">
                   <a:solidFill>
                     <a:srgbClr val="808080"/>
                   </a:solidFill>
@@ -17578,7 +17579,7 @@
                 </a14:hiddenLine>
               </a:ext>
               <a:ext uri="{AF507438-7753-43e0-B8FC-AC1667EBCBE1}">
-                <a14:hiddenEffects xmlns:a14="http://schemas.microsoft.com/office/drawing/2010/main" xmlns="">
+                <a14:hiddenEffects xmlns="" xmlns:a14="http://schemas.microsoft.com/office/drawing/2010/main">
                   <a:effectLst>
                     <a:outerShdw blurRad="63500" dist="38099" dir="2700000" algn="ctr" rotWithShape="0">
                       <a:srgbClr val="000000">
@@ -17678,7 +17679,7 @@
             <a:effectLst/>
             <a:extLst>
               <a:ext uri="{91240B29-F687-4f45-9708-019B960494DF}">
-                <a14:hiddenLine xmlns:a14="http://schemas.microsoft.com/office/drawing/2010/main" xmlns="" w="9525" cap="flat">
+                <a14:hiddenLine xmlns="" xmlns:a14="http://schemas.microsoft.com/office/drawing/2010/main" w="9525" cap="flat">
                   <a:solidFill>
                     <a:srgbClr val="808080"/>
                   </a:solidFill>
@@ -17688,7 +17689,7 @@
                 </a14:hiddenLine>
               </a:ext>
               <a:ext uri="{AF507438-7753-43e0-B8FC-AC1667EBCBE1}">
-                <a14:hiddenEffects xmlns:a14="http://schemas.microsoft.com/office/drawing/2010/main" xmlns="">
+                <a14:hiddenEffects xmlns="" xmlns:a14="http://schemas.microsoft.com/office/drawing/2010/main">
                   <a:effectLst>
                     <a:outerShdw blurRad="63500" dist="38099" dir="2700000" algn="ctr" rotWithShape="0">
                       <a:srgbClr val="000000">
@@ -18681,7 +18682,7 @@
             <a:effectLst/>
             <a:extLst>
               <a:ext uri="{91240B29-F687-4f45-9708-019B960494DF}">
-                <a14:hiddenLine xmlns:a14="http://schemas.microsoft.com/office/drawing/2010/main" xmlns="" w="9525" cap="flat">
+                <a14:hiddenLine xmlns="" xmlns:a14="http://schemas.microsoft.com/office/drawing/2010/main" w="9525" cap="flat">
                   <a:solidFill>
                     <a:srgbClr val="808080"/>
                   </a:solidFill>
@@ -18691,7 +18692,7 @@
                 </a14:hiddenLine>
               </a:ext>
               <a:ext uri="{AF507438-7753-43e0-B8FC-AC1667EBCBE1}">
-                <a14:hiddenEffects xmlns:a14="http://schemas.microsoft.com/office/drawing/2010/main" xmlns="">
+                <a14:hiddenEffects xmlns="" xmlns:a14="http://schemas.microsoft.com/office/drawing/2010/main">
                   <a:effectLst>
                     <a:outerShdw blurRad="63500" dist="38099" dir="2700000" algn="ctr" rotWithShape="0">
                       <a:srgbClr val="000000">
@@ -18823,7 +18824,7 @@
             <a:effectLst/>
             <a:extLst>
               <a:ext uri="{91240B29-F687-4f45-9708-019B960494DF}">
-                <a14:hiddenLine xmlns:a14="http://schemas.microsoft.com/office/drawing/2010/main" xmlns="" w="9525" cap="flat">
+                <a14:hiddenLine xmlns="" xmlns:a14="http://schemas.microsoft.com/office/drawing/2010/main" w="9525" cap="flat">
                   <a:solidFill>
                     <a:srgbClr val="808080"/>
                   </a:solidFill>
@@ -18833,7 +18834,7 @@
                 </a14:hiddenLine>
               </a:ext>
               <a:ext uri="{AF507438-7753-43e0-B8FC-AC1667EBCBE1}">
-                <a14:hiddenEffects xmlns:a14="http://schemas.microsoft.com/office/drawing/2010/main" xmlns="">
+                <a14:hiddenEffects xmlns="" xmlns:a14="http://schemas.microsoft.com/office/drawing/2010/main">
                   <a:effectLst>
                     <a:outerShdw blurRad="63500" dist="38099" dir="2700000" algn="ctr" rotWithShape="0">
                       <a:srgbClr val="000000">
@@ -19001,7 +19002,7 @@
             <a:effectLst/>
             <a:extLst>
               <a:ext uri="{91240B29-F687-4f45-9708-019B960494DF}">
-                <a14:hiddenLine xmlns:a14="http://schemas.microsoft.com/office/drawing/2010/main" xmlns="" w="9525" cap="flat">
+                <a14:hiddenLine xmlns="" xmlns:a14="http://schemas.microsoft.com/office/drawing/2010/main" w="9525" cap="flat">
                   <a:solidFill>
                     <a:srgbClr val="808080"/>
                   </a:solidFill>
@@ -19011,7 +19012,7 @@
                 </a14:hiddenLine>
               </a:ext>
               <a:ext uri="{AF507438-7753-43e0-B8FC-AC1667EBCBE1}">
-                <a14:hiddenEffects xmlns:a14="http://schemas.microsoft.com/office/drawing/2010/main" xmlns="">
+                <a14:hiddenEffects xmlns="" xmlns:a14="http://schemas.microsoft.com/office/drawing/2010/main">
                   <a:effectLst>
                     <a:outerShdw blurRad="63500" dist="38099" dir="2700000" algn="ctr" rotWithShape="0">
                       <a:srgbClr val="000000">
@@ -19117,7 +19118,7 @@
             <a:effectLst/>
             <a:extLst>
               <a:ext uri="{91240B29-F687-4f45-9708-019B960494DF}">
-                <a14:hiddenLine xmlns:a14="http://schemas.microsoft.com/office/drawing/2010/main" xmlns="" w="9525" cap="flat">
+                <a14:hiddenLine xmlns="" xmlns:a14="http://schemas.microsoft.com/office/drawing/2010/main" w="9525" cap="flat">
                   <a:solidFill>
                     <a:srgbClr val="808080"/>
                   </a:solidFill>
@@ -19127,7 +19128,7 @@
                 </a14:hiddenLine>
               </a:ext>
               <a:ext uri="{AF507438-7753-43e0-B8FC-AC1667EBCBE1}">
-                <a14:hiddenEffects xmlns:a14="http://schemas.microsoft.com/office/drawing/2010/main" xmlns="">
+                <a14:hiddenEffects xmlns="" xmlns:a14="http://schemas.microsoft.com/office/drawing/2010/main">
                   <a:effectLst>
                     <a:outerShdw blurRad="63500" dist="38099" dir="2700000" algn="ctr" rotWithShape="0">
                       <a:srgbClr val="000000">
@@ -19305,7 +19306,7 @@
             <a:effectLst/>
             <a:extLst>
               <a:ext uri="{91240B29-F687-4f45-9708-019B960494DF}">
-                <a14:hiddenLine xmlns:a14="http://schemas.microsoft.com/office/drawing/2010/main" xmlns="" w="9525" cap="flat">
+                <a14:hiddenLine xmlns="" xmlns:a14="http://schemas.microsoft.com/office/drawing/2010/main" w="9525" cap="flat">
                   <a:solidFill>
                     <a:srgbClr val="808080"/>
                   </a:solidFill>
@@ -19315,7 +19316,7 @@
                 </a14:hiddenLine>
               </a:ext>
               <a:ext uri="{AF507438-7753-43e0-B8FC-AC1667EBCBE1}">
-                <a14:hiddenEffects xmlns:a14="http://schemas.microsoft.com/office/drawing/2010/main" xmlns="">
+                <a14:hiddenEffects xmlns="" xmlns:a14="http://schemas.microsoft.com/office/drawing/2010/main">
                   <a:effectLst>
                     <a:outerShdw blurRad="63500" dist="38099" dir="2700000" algn="ctr" rotWithShape="0">
                       <a:srgbClr val="000000">
@@ -19421,7 +19422,7 @@
             <a:effectLst/>
             <a:extLst>
               <a:ext uri="{91240B29-F687-4f45-9708-019B960494DF}">
-                <a14:hiddenLine xmlns:a14="http://schemas.microsoft.com/office/drawing/2010/main" xmlns="" w="9525" cap="flat">
+                <a14:hiddenLine xmlns="" xmlns:a14="http://schemas.microsoft.com/office/drawing/2010/main" w="9525" cap="flat">
                   <a:solidFill>
                     <a:srgbClr val="808080"/>
                   </a:solidFill>
@@ -19431,7 +19432,7 @@
                 </a14:hiddenLine>
               </a:ext>
               <a:ext uri="{AF507438-7753-43e0-B8FC-AC1667EBCBE1}">
-                <a14:hiddenEffects xmlns:a14="http://schemas.microsoft.com/office/drawing/2010/main" xmlns="">
+                <a14:hiddenEffects xmlns="" xmlns:a14="http://schemas.microsoft.com/office/drawing/2010/main">
                   <a:effectLst>
                     <a:outerShdw blurRad="63500" dist="38099" dir="2700000" algn="ctr" rotWithShape="0">
                       <a:srgbClr val="000000">
@@ -19753,7 +19754,7 @@
             <a:effectLst/>
             <a:extLst>
               <a:ext uri="{91240B29-F687-4f45-9708-019B960494DF}">
-                <a14:hiddenLine xmlns:a14="http://schemas.microsoft.com/office/drawing/2010/main" xmlns="" w="9525" cap="flat">
+                <a14:hiddenLine xmlns="" xmlns:a14="http://schemas.microsoft.com/office/drawing/2010/main" w="9525" cap="flat">
                   <a:solidFill>
                     <a:srgbClr val="808080"/>
                   </a:solidFill>
@@ -19763,7 +19764,7 @@
                 </a14:hiddenLine>
               </a:ext>
               <a:ext uri="{AF507438-7753-43e0-B8FC-AC1667EBCBE1}">
-                <a14:hiddenEffects xmlns:a14="http://schemas.microsoft.com/office/drawing/2010/main" xmlns="">
+                <a14:hiddenEffects xmlns="" xmlns:a14="http://schemas.microsoft.com/office/drawing/2010/main">
                   <a:effectLst>
                     <a:outerShdw blurRad="63500" dist="38099" dir="2700000" algn="ctr" rotWithShape="0">
                       <a:srgbClr val="000000">
@@ -19895,7 +19896,7 @@
             <a:effectLst/>
             <a:extLst>
               <a:ext uri="{91240B29-F687-4f45-9708-019B960494DF}">
-                <a14:hiddenLine xmlns:a14="http://schemas.microsoft.com/office/drawing/2010/main" xmlns="" w="9525" cap="flat">
+                <a14:hiddenLine xmlns="" xmlns:a14="http://schemas.microsoft.com/office/drawing/2010/main" w="9525" cap="flat">
                   <a:solidFill>
                     <a:srgbClr val="808080"/>
                   </a:solidFill>
@@ -19905,7 +19906,7 @@
                 </a14:hiddenLine>
               </a:ext>
               <a:ext uri="{AF507438-7753-43e0-B8FC-AC1667EBCBE1}">
-                <a14:hiddenEffects xmlns:a14="http://schemas.microsoft.com/office/drawing/2010/main" xmlns="">
+                <a14:hiddenEffects xmlns="" xmlns:a14="http://schemas.microsoft.com/office/drawing/2010/main">
                   <a:effectLst>
                     <a:outerShdw blurRad="63500" dist="38099" dir="2700000" algn="ctr" rotWithShape="0">
                       <a:srgbClr val="000000">
@@ -20111,7 +20112,7 @@
             <a:effectLst/>
             <a:extLst>
               <a:ext uri="{91240B29-F687-4f45-9708-019B960494DF}">
-                <a14:hiddenLine xmlns:a14="http://schemas.microsoft.com/office/drawing/2010/main" xmlns="" w="9525" cap="flat">
+                <a14:hiddenLine xmlns="" xmlns:a14="http://schemas.microsoft.com/office/drawing/2010/main" w="9525" cap="flat">
                   <a:solidFill>
                     <a:srgbClr val="808080"/>
                   </a:solidFill>
@@ -20121,7 +20122,7 @@
                 </a14:hiddenLine>
               </a:ext>
               <a:ext uri="{AF507438-7753-43e0-B8FC-AC1667EBCBE1}">
-                <a14:hiddenEffects xmlns:a14="http://schemas.microsoft.com/office/drawing/2010/main" xmlns="">
+                <a14:hiddenEffects xmlns="" xmlns:a14="http://schemas.microsoft.com/office/drawing/2010/main">
                   <a:effectLst>
                     <a:outerShdw blurRad="63500" dist="38099" dir="2700000" algn="ctr" rotWithShape="0">
                       <a:srgbClr val="000000">
@@ -20363,7 +20364,7 @@
             <a:effectLst/>
             <a:extLst>
               <a:ext uri="{91240B29-F687-4f45-9708-019B960494DF}">
-                <a14:hiddenLine xmlns:a14="http://schemas.microsoft.com/office/drawing/2010/main" xmlns="" w="9525" cap="flat">
+                <a14:hiddenLine xmlns="" xmlns:a14="http://schemas.microsoft.com/office/drawing/2010/main" w="9525" cap="flat">
                   <a:solidFill>
                     <a:srgbClr val="808080"/>
                   </a:solidFill>
@@ -20373,7 +20374,7 @@
                 </a14:hiddenLine>
               </a:ext>
               <a:ext uri="{AF507438-7753-43e0-B8FC-AC1667EBCBE1}">
-                <a14:hiddenEffects xmlns:a14="http://schemas.microsoft.com/office/drawing/2010/main" xmlns="">
+                <a14:hiddenEffects xmlns="" xmlns:a14="http://schemas.microsoft.com/office/drawing/2010/main">
                   <a:effectLst>
                     <a:outerShdw blurRad="63500" dist="38099" dir="2700000" algn="ctr" rotWithShape="0">
                       <a:srgbClr val="000000">
@@ -20615,7 +20616,7 @@
             <a:effectLst/>
             <a:extLst>
               <a:ext uri="{91240B29-F687-4f45-9708-019B960494DF}">
-                <a14:hiddenLine xmlns:a14="http://schemas.microsoft.com/office/drawing/2010/main" xmlns="" w="9525" cap="flat">
+                <a14:hiddenLine xmlns="" xmlns:a14="http://schemas.microsoft.com/office/drawing/2010/main" w="9525" cap="flat">
                   <a:solidFill>
                     <a:srgbClr val="808080"/>
                   </a:solidFill>
@@ -20625,7 +20626,7 @@
                 </a14:hiddenLine>
               </a:ext>
               <a:ext uri="{AF507438-7753-43e0-B8FC-AC1667EBCBE1}">
-                <a14:hiddenEffects xmlns:a14="http://schemas.microsoft.com/office/drawing/2010/main" xmlns="">
+                <a14:hiddenEffects xmlns="" xmlns:a14="http://schemas.microsoft.com/office/drawing/2010/main">
                   <a:effectLst>
                     <a:outerShdw blurRad="63500" dist="38099" dir="2700000" algn="ctr" rotWithShape="0">
                       <a:srgbClr val="000000">
@@ -20757,7 +20758,7 @@
             <a:effectLst/>
             <a:extLst>
               <a:ext uri="{91240B29-F687-4f45-9708-019B960494DF}">
-                <a14:hiddenLine xmlns:a14="http://schemas.microsoft.com/office/drawing/2010/main" xmlns="" w="9525" cap="flat">
+                <a14:hiddenLine xmlns="" xmlns:a14="http://schemas.microsoft.com/office/drawing/2010/main" w="9525" cap="flat">
                   <a:solidFill>
                     <a:srgbClr val="808080"/>
                   </a:solidFill>
@@ -20767,7 +20768,7 @@
                 </a14:hiddenLine>
               </a:ext>
               <a:ext uri="{AF507438-7753-43e0-B8FC-AC1667EBCBE1}">
-                <a14:hiddenEffects xmlns:a14="http://schemas.microsoft.com/office/drawing/2010/main" xmlns="">
+                <a14:hiddenEffects xmlns="" xmlns:a14="http://schemas.microsoft.com/office/drawing/2010/main">
                   <a:effectLst>
                     <a:outerShdw blurRad="63500" dist="38099" dir="2700000" algn="ctr" rotWithShape="0">
                       <a:srgbClr val="000000">
@@ -20873,7 +20874,7 @@
             <a:effectLst/>
             <a:extLst>
               <a:ext uri="{91240B29-F687-4f45-9708-019B960494DF}">
-                <a14:hiddenLine xmlns:a14="http://schemas.microsoft.com/office/drawing/2010/main" xmlns="" w="9525" cap="flat">
+                <a14:hiddenLine xmlns="" xmlns:a14="http://schemas.microsoft.com/office/drawing/2010/main" w="9525" cap="flat">
                   <a:solidFill>
                     <a:srgbClr val="808080"/>
                   </a:solidFill>
@@ -20883,7 +20884,7 @@
                 </a14:hiddenLine>
               </a:ext>
               <a:ext uri="{AF507438-7753-43e0-B8FC-AC1667EBCBE1}">
-                <a14:hiddenEffects xmlns:a14="http://schemas.microsoft.com/office/drawing/2010/main" xmlns="">
+                <a14:hiddenEffects xmlns="" xmlns:a14="http://schemas.microsoft.com/office/drawing/2010/main">
                   <a:effectLst>
                     <a:outerShdw blurRad="63500" dist="38099" dir="2700000" algn="ctr" rotWithShape="0">
                       <a:srgbClr val="000000">
@@ -21097,7 +21098,7 @@
             <a:effectLst/>
             <a:extLst>
               <a:ext uri="{91240B29-F687-4f45-9708-019B960494DF}">
-                <a14:hiddenLine xmlns:a14="http://schemas.microsoft.com/office/drawing/2010/main" xmlns="" w="9525" cap="flat">
+                <a14:hiddenLine xmlns="" xmlns:a14="http://schemas.microsoft.com/office/drawing/2010/main" w="9525" cap="flat">
                   <a:solidFill>
                     <a:srgbClr val="808080"/>
                   </a:solidFill>
@@ -21107,7 +21108,7 @@
                 </a14:hiddenLine>
               </a:ext>
               <a:ext uri="{AF507438-7753-43e0-B8FC-AC1667EBCBE1}">
-                <a14:hiddenEffects xmlns:a14="http://schemas.microsoft.com/office/drawing/2010/main" xmlns="">
+                <a14:hiddenEffects xmlns="" xmlns:a14="http://schemas.microsoft.com/office/drawing/2010/main">
                   <a:effectLst>
                     <a:outerShdw blurRad="63500" dist="38099" dir="2700000" algn="ctr" rotWithShape="0">
                       <a:srgbClr val="000000">
@@ -21323,7 +21324,7 @@
             <a:effectLst/>
             <a:extLst>
               <a:ext uri="{91240B29-F687-4f45-9708-019B960494DF}">
-                <a14:hiddenLine xmlns:a14="http://schemas.microsoft.com/office/drawing/2010/main" xmlns="" w="9525" cap="flat">
+                <a14:hiddenLine xmlns="" xmlns:a14="http://schemas.microsoft.com/office/drawing/2010/main" w="9525" cap="flat">
                   <a:solidFill>
                     <a:srgbClr val="808080"/>
                   </a:solidFill>
@@ -21333,7 +21334,7 @@
                 </a14:hiddenLine>
               </a:ext>
               <a:ext uri="{AF507438-7753-43e0-B8FC-AC1667EBCBE1}">
-                <a14:hiddenEffects xmlns:a14="http://schemas.microsoft.com/office/drawing/2010/main" xmlns="">
+                <a14:hiddenEffects xmlns="" xmlns:a14="http://schemas.microsoft.com/office/drawing/2010/main">
                   <a:effectLst>
                     <a:outerShdw blurRad="63500" dist="38099" dir="2700000" algn="ctr" rotWithShape="0">
                       <a:srgbClr val="000000">
@@ -21539,7 +21540,7 @@
             <a:effectLst/>
             <a:extLst>
               <a:ext uri="{91240B29-F687-4f45-9708-019B960494DF}">
-                <a14:hiddenLine xmlns:a14="http://schemas.microsoft.com/office/drawing/2010/main" xmlns="" w="9525" cap="flat">
+                <a14:hiddenLine xmlns="" xmlns:a14="http://schemas.microsoft.com/office/drawing/2010/main" w="9525" cap="flat">
                   <a:solidFill>
                     <a:srgbClr val="808080"/>
                   </a:solidFill>
@@ -21549,7 +21550,7 @@
                 </a14:hiddenLine>
               </a:ext>
               <a:ext uri="{AF507438-7753-43e0-B8FC-AC1667EBCBE1}">
-                <a14:hiddenEffects xmlns:a14="http://schemas.microsoft.com/office/drawing/2010/main" xmlns="">
+                <a14:hiddenEffects xmlns="" xmlns:a14="http://schemas.microsoft.com/office/drawing/2010/main">
                   <a:effectLst>
                     <a:outerShdw blurRad="63500" dist="38099" dir="2700000" algn="ctr" rotWithShape="0">
                       <a:srgbClr val="000000">
@@ -21757,7 +21758,7 @@
             <a:effectLst/>
             <a:extLst>
               <a:ext uri="{91240B29-F687-4f45-9708-019B960494DF}">
-                <a14:hiddenLine xmlns:a14="http://schemas.microsoft.com/office/drawing/2010/main" xmlns="" w="9525" cap="flat">
+                <a14:hiddenLine xmlns="" xmlns:a14="http://schemas.microsoft.com/office/drawing/2010/main" w="9525" cap="flat">
                   <a:solidFill>
                     <a:srgbClr val="808080"/>
                   </a:solidFill>
@@ -21767,7 +21768,7 @@
                 </a14:hiddenLine>
               </a:ext>
               <a:ext uri="{AF507438-7753-43e0-B8FC-AC1667EBCBE1}">
-                <a14:hiddenEffects xmlns:a14="http://schemas.microsoft.com/office/drawing/2010/main" xmlns="">
+                <a14:hiddenEffects xmlns="" xmlns:a14="http://schemas.microsoft.com/office/drawing/2010/main">
                   <a:effectLst>
                     <a:outerShdw blurRad="63500" dist="38099" dir="2700000" algn="ctr" rotWithShape="0">
                       <a:srgbClr val="000000">
@@ -21985,7 +21986,7 @@
             <a:effectLst/>
             <a:extLst>
               <a:ext uri="{91240B29-F687-4f45-9708-019B960494DF}">
-                <a14:hiddenLine xmlns:a14="http://schemas.microsoft.com/office/drawing/2010/main" xmlns="" w="9525" cap="flat">
+                <a14:hiddenLine xmlns="" xmlns:a14="http://schemas.microsoft.com/office/drawing/2010/main" w="9525" cap="flat">
                   <a:solidFill>
                     <a:srgbClr val="808080"/>
                   </a:solidFill>
@@ -21995,7 +21996,7 @@
                 </a14:hiddenLine>
               </a:ext>
               <a:ext uri="{AF507438-7753-43e0-B8FC-AC1667EBCBE1}">
-                <a14:hiddenEffects xmlns:a14="http://schemas.microsoft.com/office/drawing/2010/main" xmlns="">
+                <a14:hiddenEffects xmlns="" xmlns:a14="http://schemas.microsoft.com/office/drawing/2010/main">
                   <a:effectLst>
                     <a:outerShdw blurRad="63500" dist="38099" dir="2700000" algn="ctr" rotWithShape="0">
                       <a:srgbClr val="000000">
@@ -22183,7 +22184,7 @@
             <a:effectLst/>
             <a:extLst>
               <a:ext uri="{91240B29-F687-4f45-9708-019B960494DF}">
-                <a14:hiddenLine xmlns:a14="http://schemas.microsoft.com/office/drawing/2010/main" xmlns="" w="9525" cap="flat">
+                <a14:hiddenLine xmlns="" xmlns:a14="http://schemas.microsoft.com/office/drawing/2010/main" w="9525" cap="flat">
                   <a:solidFill>
                     <a:srgbClr val="808080"/>
                   </a:solidFill>
@@ -22193,7 +22194,7 @@
                 </a14:hiddenLine>
               </a:ext>
               <a:ext uri="{AF507438-7753-43e0-B8FC-AC1667EBCBE1}">
-                <a14:hiddenEffects xmlns:a14="http://schemas.microsoft.com/office/drawing/2010/main" xmlns="">
+                <a14:hiddenEffects xmlns="" xmlns:a14="http://schemas.microsoft.com/office/drawing/2010/main">
                   <a:effectLst>
                     <a:outerShdw blurRad="63500" dist="38099" dir="2700000" algn="ctr" rotWithShape="0">
                       <a:srgbClr val="000000">
@@ -22397,7 +22398,7 @@
             <a:effectLst/>
             <a:extLst>
               <a:ext uri="{91240B29-F687-4f45-9708-019B960494DF}">
-                <a14:hiddenLine xmlns:a14="http://schemas.microsoft.com/office/drawing/2010/main" xmlns="" w="9525" cap="flat">
+                <a14:hiddenLine xmlns="" xmlns:a14="http://schemas.microsoft.com/office/drawing/2010/main" w="9525" cap="flat">
                   <a:solidFill>
                     <a:srgbClr val="808080"/>
                   </a:solidFill>
@@ -22407,7 +22408,7 @@
                 </a14:hiddenLine>
               </a:ext>
               <a:ext uri="{AF507438-7753-43e0-B8FC-AC1667EBCBE1}">
-                <a14:hiddenEffects xmlns:a14="http://schemas.microsoft.com/office/drawing/2010/main" xmlns="">
+                <a14:hiddenEffects xmlns="" xmlns:a14="http://schemas.microsoft.com/office/drawing/2010/main">
                   <a:effectLst>
                     <a:outerShdw blurRad="63500" dist="38099" dir="2700000" algn="ctr" rotWithShape="0">
                       <a:srgbClr val="000000">
@@ -22625,7 +22626,7 @@
             <a:effectLst/>
             <a:extLst>
               <a:ext uri="{91240B29-F687-4f45-9708-019B960494DF}">
-                <a14:hiddenLine xmlns:a14="http://schemas.microsoft.com/office/drawing/2010/main" xmlns="" w="9525" cap="flat">
+                <a14:hiddenLine xmlns="" xmlns:a14="http://schemas.microsoft.com/office/drawing/2010/main" w="9525" cap="flat">
                   <a:solidFill>
                     <a:srgbClr val="808080"/>
                   </a:solidFill>
@@ -22635,7 +22636,7 @@
                 </a14:hiddenLine>
               </a:ext>
               <a:ext uri="{AF507438-7753-43e0-B8FC-AC1667EBCBE1}">
-                <a14:hiddenEffects xmlns:a14="http://schemas.microsoft.com/office/drawing/2010/main" xmlns="">
+                <a14:hiddenEffects xmlns="" xmlns:a14="http://schemas.microsoft.com/office/drawing/2010/main">
                   <a:effectLst>
                     <a:outerShdw blurRad="63500" dist="38099" dir="2700000" algn="ctr" rotWithShape="0">
                       <a:srgbClr val="000000">
@@ -22831,7 +22832,7 @@
             <a:effectLst/>
             <a:extLst>
               <a:ext uri="{91240B29-F687-4f45-9708-019B960494DF}">
-                <a14:hiddenLine xmlns:a14="http://schemas.microsoft.com/office/drawing/2010/main" xmlns="" w="9525" cap="flat">
+                <a14:hiddenLine xmlns="" xmlns:a14="http://schemas.microsoft.com/office/drawing/2010/main" w="9525" cap="flat">
                   <a:solidFill>
                     <a:srgbClr val="808080"/>
                   </a:solidFill>
@@ -22841,7 +22842,7 @@
                 </a14:hiddenLine>
               </a:ext>
               <a:ext uri="{AF507438-7753-43e0-B8FC-AC1667EBCBE1}">
-                <a14:hiddenEffects xmlns:a14="http://schemas.microsoft.com/office/drawing/2010/main" xmlns="">
+                <a14:hiddenEffects xmlns="" xmlns:a14="http://schemas.microsoft.com/office/drawing/2010/main">
                   <a:effectLst>
                     <a:outerShdw blurRad="63500" dist="38099" dir="2700000" algn="ctr" rotWithShape="0">
                       <a:srgbClr val="000000">
@@ -22941,7 +22942,7 @@
             <a:effectLst/>
             <a:extLst>
               <a:ext uri="{91240B29-F687-4f45-9708-019B960494DF}">
-                <a14:hiddenLine xmlns:a14="http://schemas.microsoft.com/office/drawing/2010/main" xmlns="" w="9525" cap="flat">
+                <a14:hiddenLine xmlns="" xmlns:a14="http://schemas.microsoft.com/office/drawing/2010/main" w="9525" cap="flat">
                   <a:solidFill>
                     <a:srgbClr val="808080"/>
                   </a:solidFill>
@@ -22951,7 +22952,7 @@
                 </a14:hiddenLine>
               </a:ext>
               <a:ext uri="{AF507438-7753-43e0-B8FC-AC1667EBCBE1}">
-                <a14:hiddenEffects xmlns:a14="http://schemas.microsoft.com/office/drawing/2010/main" xmlns="">
+                <a14:hiddenEffects xmlns="" xmlns:a14="http://schemas.microsoft.com/office/drawing/2010/main">
                   <a:effectLst>
                     <a:outerShdw blurRad="63500" dist="38099" dir="2700000" algn="ctr" rotWithShape="0">
                       <a:srgbClr val="000000">
@@ -23826,7 +23827,7 @@
             <a:effectLst/>
             <a:extLst>
               <a:ext uri="{91240B29-F687-4f45-9708-019B960494DF}">
-                <a14:hiddenLine xmlns="" xmlns:a14="http://schemas.microsoft.com/office/drawing/2010/main" w="9525" cap="flat">
+                <a14:hiddenLine xmlns:a14="http://schemas.microsoft.com/office/drawing/2010/main" xmlns="" w="9525" cap="flat">
                   <a:solidFill>
                     <a:srgbClr val="808080"/>
                   </a:solidFill>
@@ -23836,7 +23837,7 @@
                 </a14:hiddenLine>
               </a:ext>
               <a:ext uri="{AF507438-7753-43e0-B8FC-AC1667EBCBE1}">
-                <a14:hiddenEffects xmlns="" xmlns:a14="http://schemas.microsoft.com/office/drawing/2010/main">
+                <a14:hiddenEffects xmlns:a14="http://schemas.microsoft.com/office/drawing/2010/main" xmlns="">
                   <a:effectLst>
                     <a:outerShdw blurRad="63500" dist="38099" dir="2700000" algn="ctr" rotWithShape="0">
                       <a:srgbClr val="000000">
@@ -23963,7 +23964,7 @@
             <a:effectLst/>
             <a:extLst>
               <a:ext uri="{91240B29-F687-4f45-9708-019B960494DF}">
-                <a14:hiddenLine xmlns="" xmlns:a14="http://schemas.microsoft.com/office/drawing/2010/main" w="9525" cap="flat">
+                <a14:hiddenLine xmlns:a14="http://schemas.microsoft.com/office/drawing/2010/main" xmlns="" w="9525" cap="flat">
                   <a:solidFill>
                     <a:srgbClr val="808080"/>
                   </a:solidFill>
@@ -23973,7 +23974,7 @@
                 </a14:hiddenLine>
               </a:ext>
               <a:ext uri="{AF507438-7753-43e0-B8FC-AC1667EBCBE1}">
-                <a14:hiddenEffects xmlns="" xmlns:a14="http://schemas.microsoft.com/office/drawing/2010/main">
+                <a14:hiddenEffects xmlns:a14="http://schemas.microsoft.com/office/drawing/2010/main" xmlns="">
                   <a:effectLst>
                     <a:outerShdw blurRad="63500" dist="38099" dir="2700000" algn="ctr" rotWithShape="0">
                       <a:srgbClr val="000000">
@@ -24136,7 +24137,7 @@
             <a:effectLst/>
             <a:extLst>
               <a:ext uri="{91240B29-F687-4f45-9708-019B960494DF}">
-                <a14:hiddenLine xmlns="" xmlns:a14="http://schemas.microsoft.com/office/drawing/2010/main" w="9525" cap="flat">
+                <a14:hiddenLine xmlns:a14="http://schemas.microsoft.com/office/drawing/2010/main" xmlns="" w="9525" cap="flat">
                   <a:solidFill>
                     <a:srgbClr val="808080"/>
                   </a:solidFill>
@@ -24146,7 +24147,7 @@
                 </a14:hiddenLine>
               </a:ext>
               <a:ext uri="{AF507438-7753-43e0-B8FC-AC1667EBCBE1}">
-                <a14:hiddenEffects xmlns="" xmlns:a14="http://schemas.microsoft.com/office/drawing/2010/main">
+                <a14:hiddenEffects xmlns:a14="http://schemas.microsoft.com/office/drawing/2010/main" xmlns="">
                   <a:effectLst>
                     <a:outerShdw blurRad="63500" dist="38099" dir="2700000" algn="ctr" rotWithShape="0">
                       <a:srgbClr val="000000">
@@ -24247,7 +24248,7 @@
             <a:effectLst/>
             <a:extLst>
               <a:ext uri="{91240B29-F687-4f45-9708-019B960494DF}">
-                <a14:hiddenLine xmlns="" xmlns:a14="http://schemas.microsoft.com/office/drawing/2010/main" w="9525" cap="flat">
+                <a14:hiddenLine xmlns:a14="http://schemas.microsoft.com/office/drawing/2010/main" xmlns="" w="9525" cap="flat">
                   <a:solidFill>
                     <a:srgbClr val="808080"/>
                   </a:solidFill>
@@ -24257,7 +24258,7 @@
                 </a14:hiddenLine>
               </a:ext>
               <a:ext uri="{AF507438-7753-43e0-B8FC-AC1667EBCBE1}">
-                <a14:hiddenEffects xmlns="" xmlns:a14="http://schemas.microsoft.com/office/drawing/2010/main">
+                <a14:hiddenEffects xmlns:a14="http://schemas.microsoft.com/office/drawing/2010/main" xmlns="">
                   <a:effectLst>
                     <a:outerShdw blurRad="63500" dist="38099" dir="2700000" algn="ctr" rotWithShape="0">
                       <a:srgbClr val="000000">
@@ -24430,7 +24431,7 @@
             <a:effectLst/>
             <a:extLst>
               <a:ext uri="{91240B29-F687-4f45-9708-019B960494DF}">
-                <a14:hiddenLine xmlns="" xmlns:a14="http://schemas.microsoft.com/office/drawing/2010/main" w="9525" cap="flat">
+                <a14:hiddenLine xmlns:a14="http://schemas.microsoft.com/office/drawing/2010/main" xmlns="" w="9525" cap="flat">
                   <a:solidFill>
                     <a:srgbClr val="808080"/>
                   </a:solidFill>
@@ -24440,7 +24441,7 @@
                 </a14:hiddenLine>
               </a:ext>
               <a:ext uri="{AF507438-7753-43e0-B8FC-AC1667EBCBE1}">
-                <a14:hiddenEffects xmlns="" xmlns:a14="http://schemas.microsoft.com/office/drawing/2010/main">
+                <a14:hiddenEffects xmlns:a14="http://schemas.microsoft.com/office/drawing/2010/main" xmlns="">
                   <a:effectLst>
                     <a:outerShdw blurRad="63500" dist="38099" dir="2700000" algn="ctr" rotWithShape="0">
                       <a:srgbClr val="000000">
@@ -24541,7 +24542,7 @@
             <a:effectLst/>
             <a:extLst>
               <a:ext uri="{91240B29-F687-4f45-9708-019B960494DF}">
-                <a14:hiddenLine xmlns="" xmlns:a14="http://schemas.microsoft.com/office/drawing/2010/main" w="9525" cap="flat">
+                <a14:hiddenLine xmlns:a14="http://schemas.microsoft.com/office/drawing/2010/main" xmlns="" w="9525" cap="flat">
                   <a:solidFill>
                     <a:srgbClr val="808080"/>
                   </a:solidFill>
@@ -24551,7 +24552,7 @@
                 </a14:hiddenLine>
               </a:ext>
               <a:ext uri="{AF507438-7753-43e0-B8FC-AC1667EBCBE1}">
-                <a14:hiddenEffects xmlns="" xmlns:a14="http://schemas.microsoft.com/office/drawing/2010/main">
+                <a14:hiddenEffects xmlns:a14="http://schemas.microsoft.com/office/drawing/2010/main" xmlns="">
                   <a:effectLst>
                     <a:outerShdw blurRad="63500" dist="38099" dir="2700000" algn="ctr" rotWithShape="0">
                       <a:srgbClr val="000000">
@@ -24868,7 +24869,7 @@
             <a:effectLst/>
             <a:extLst>
               <a:ext uri="{91240B29-F687-4f45-9708-019B960494DF}">
-                <a14:hiddenLine xmlns="" xmlns:a14="http://schemas.microsoft.com/office/drawing/2010/main" w="9525" cap="flat">
+                <a14:hiddenLine xmlns:a14="http://schemas.microsoft.com/office/drawing/2010/main" xmlns="" w="9525" cap="flat">
                   <a:solidFill>
                     <a:srgbClr val="808080"/>
                   </a:solidFill>
@@ -24878,7 +24879,7 @@
                 </a14:hiddenLine>
               </a:ext>
               <a:ext uri="{AF507438-7753-43e0-B8FC-AC1667EBCBE1}">
-                <a14:hiddenEffects xmlns="" xmlns:a14="http://schemas.microsoft.com/office/drawing/2010/main">
+                <a14:hiddenEffects xmlns:a14="http://schemas.microsoft.com/office/drawing/2010/main" xmlns="">
                   <a:effectLst>
                     <a:outerShdw blurRad="63500" dist="38099" dir="2700000" algn="ctr" rotWithShape="0">
                       <a:srgbClr val="000000">
@@ -25005,7 +25006,7 @@
             <a:effectLst/>
             <a:extLst>
               <a:ext uri="{91240B29-F687-4f45-9708-019B960494DF}">
-                <a14:hiddenLine xmlns="" xmlns:a14="http://schemas.microsoft.com/office/drawing/2010/main" w="9525" cap="flat">
+                <a14:hiddenLine xmlns:a14="http://schemas.microsoft.com/office/drawing/2010/main" xmlns="" w="9525" cap="flat">
                   <a:solidFill>
                     <a:srgbClr val="808080"/>
                   </a:solidFill>
@@ -25015,7 +25016,7 @@
                 </a14:hiddenLine>
               </a:ext>
               <a:ext uri="{AF507438-7753-43e0-B8FC-AC1667EBCBE1}">
-                <a14:hiddenEffects xmlns="" xmlns:a14="http://schemas.microsoft.com/office/drawing/2010/main">
+                <a14:hiddenEffects xmlns:a14="http://schemas.microsoft.com/office/drawing/2010/main" xmlns="">
                   <a:effectLst>
                     <a:outerShdw blurRad="63500" dist="38099" dir="2700000" algn="ctr" rotWithShape="0">
                       <a:srgbClr val="000000">
@@ -25216,7 +25217,7 @@
             <a:effectLst/>
             <a:extLst>
               <a:ext uri="{91240B29-F687-4f45-9708-019B960494DF}">
-                <a14:hiddenLine xmlns="" xmlns:a14="http://schemas.microsoft.com/office/drawing/2010/main" w="9525" cap="flat">
+                <a14:hiddenLine xmlns:a14="http://schemas.microsoft.com/office/drawing/2010/main" xmlns="" w="9525" cap="flat">
                   <a:solidFill>
                     <a:srgbClr val="808080"/>
                   </a:solidFill>
@@ -25226,7 +25227,7 @@
                 </a14:hiddenLine>
               </a:ext>
               <a:ext uri="{AF507438-7753-43e0-B8FC-AC1667EBCBE1}">
-                <a14:hiddenEffects xmlns="" xmlns:a14="http://schemas.microsoft.com/office/drawing/2010/main">
+                <a14:hiddenEffects xmlns:a14="http://schemas.microsoft.com/office/drawing/2010/main" xmlns="">
                   <a:effectLst>
                     <a:outerShdw blurRad="63500" dist="38099" dir="2700000" algn="ctr" rotWithShape="0">
                       <a:srgbClr val="000000">
@@ -25463,7 +25464,7 @@
             <a:effectLst/>
             <a:extLst>
               <a:ext uri="{91240B29-F687-4f45-9708-019B960494DF}">
-                <a14:hiddenLine xmlns="" xmlns:a14="http://schemas.microsoft.com/office/drawing/2010/main" w="9525" cap="flat">
+                <a14:hiddenLine xmlns:a14="http://schemas.microsoft.com/office/drawing/2010/main" xmlns="" w="9525" cap="flat">
                   <a:solidFill>
                     <a:srgbClr val="808080"/>
                   </a:solidFill>
@@ -25473,7 +25474,7 @@
                 </a14:hiddenLine>
               </a:ext>
               <a:ext uri="{AF507438-7753-43e0-B8FC-AC1667EBCBE1}">
-                <a14:hiddenEffects xmlns="" xmlns:a14="http://schemas.microsoft.com/office/drawing/2010/main">
+                <a14:hiddenEffects xmlns:a14="http://schemas.microsoft.com/office/drawing/2010/main" xmlns="">
                   <a:effectLst>
                     <a:outerShdw blurRad="63500" dist="38099" dir="2700000" algn="ctr" rotWithShape="0">
                       <a:srgbClr val="000000">
@@ -25710,7 +25711,7 @@
             <a:effectLst/>
             <a:extLst>
               <a:ext uri="{91240B29-F687-4f45-9708-019B960494DF}">
-                <a14:hiddenLine xmlns="" xmlns:a14="http://schemas.microsoft.com/office/drawing/2010/main" w="9525" cap="flat">
+                <a14:hiddenLine xmlns:a14="http://schemas.microsoft.com/office/drawing/2010/main" xmlns="" w="9525" cap="flat">
                   <a:solidFill>
                     <a:srgbClr val="808080"/>
                   </a:solidFill>
@@ -25720,7 +25721,7 @@
                 </a14:hiddenLine>
               </a:ext>
               <a:ext uri="{AF507438-7753-43e0-B8FC-AC1667EBCBE1}">
-                <a14:hiddenEffects xmlns="" xmlns:a14="http://schemas.microsoft.com/office/drawing/2010/main">
+                <a14:hiddenEffects xmlns:a14="http://schemas.microsoft.com/office/drawing/2010/main" xmlns="">
                   <a:effectLst>
                     <a:outerShdw blurRad="63500" dist="38099" dir="2700000" algn="ctr" rotWithShape="0">
                       <a:srgbClr val="000000">
@@ -25847,7 +25848,7 @@
             <a:effectLst/>
             <a:extLst>
               <a:ext uri="{91240B29-F687-4f45-9708-019B960494DF}">
-                <a14:hiddenLine xmlns="" xmlns:a14="http://schemas.microsoft.com/office/drawing/2010/main" w="9525" cap="flat">
+                <a14:hiddenLine xmlns:a14="http://schemas.microsoft.com/office/drawing/2010/main" xmlns="" w="9525" cap="flat">
                   <a:solidFill>
                     <a:srgbClr val="808080"/>
                   </a:solidFill>
@@ -25857,7 +25858,7 @@
                 </a14:hiddenLine>
               </a:ext>
               <a:ext uri="{AF507438-7753-43e0-B8FC-AC1667EBCBE1}">
-                <a14:hiddenEffects xmlns="" xmlns:a14="http://schemas.microsoft.com/office/drawing/2010/main">
+                <a14:hiddenEffects xmlns:a14="http://schemas.microsoft.com/office/drawing/2010/main" xmlns="">
                   <a:effectLst>
                     <a:outerShdw blurRad="63500" dist="38099" dir="2700000" algn="ctr" rotWithShape="0">
                       <a:srgbClr val="000000">
@@ -25958,7 +25959,7 @@
             <a:effectLst/>
             <a:extLst>
               <a:ext uri="{91240B29-F687-4f45-9708-019B960494DF}">
-                <a14:hiddenLine xmlns="" xmlns:a14="http://schemas.microsoft.com/office/drawing/2010/main" w="9525" cap="flat">
+                <a14:hiddenLine xmlns:a14="http://schemas.microsoft.com/office/drawing/2010/main" xmlns="" w="9525" cap="flat">
                   <a:solidFill>
                     <a:srgbClr val="808080"/>
                   </a:solidFill>
@@ -25968,7 +25969,7 @@
                 </a14:hiddenLine>
               </a:ext>
               <a:ext uri="{AF507438-7753-43e0-B8FC-AC1667EBCBE1}">
-                <a14:hiddenEffects xmlns="" xmlns:a14="http://schemas.microsoft.com/office/drawing/2010/main">
+                <a14:hiddenEffects xmlns:a14="http://schemas.microsoft.com/office/drawing/2010/main" xmlns="">
                   <a:effectLst>
                     <a:outerShdw blurRad="63500" dist="38099" dir="2700000" algn="ctr" rotWithShape="0">
                       <a:srgbClr val="000000">
@@ -26177,7 +26178,7 @@
             <a:effectLst/>
             <a:extLst>
               <a:ext uri="{91240B29-F687-4f45-9708-019B960494DF}">
-                <a14:hiddenLine xmlns="" xmlns:a14="http://schemas.microsoft.com/office/drawing/2010/main" w="9525" cap="flat">
+                <a14:hiddenLine xmlns:a14="http://schemas.microsoft.com/office/drawing/2010/main" xmlns="" w="9525" cap="flat">
                   <a:solidFill>
                     <a:srgbClr val="808080"/>
                   </a:solidFill>
@@ -26187,7 +26188,7 @@
                 </a14:hiddenLine>
               </a:ext>
               <a:ext uri="{AF507438-7753-43e0-B8FC-AC1667EBCBE1}">
-                <a14:hiddenEffects xmlns="" xmlns:a14="http://schemas.microsoft.com/office/drawing/2010/main">
+                <a14:hiddenEffects xmlns:a14="http://schemas.microsoft.com/office/drawing/2010/main" xmlns="">
                   <a:effectLst>
                     <a:outerShdw blurRad="63500" dist="38099" dir="2700000" algn="ctr" rotWithShape="0">
                       <a:srgbClr val="000000">
@@ -26398,7 +26399,7 @@
             <a:effectLst/>
             <a:extLst>
               <a:ext uri="{91240B29-F687-4f45-9708-019B960494DF}">
-                <a14:hiddenLine xmlns="" xmlns:a14="http://schemas.microsoft.com/office/drawing/2010/main" w="9525" cap="flat">
+                <a14:hiddenLine xmlns:a14="http://schemas.microsoft.com/office/drawing/2010/main" xmlns="" w="9525" cap="flat">
                   <a:solidFill>
                     <a:srgbClr val="808080"/>
                   </a:solidFill>
@@ -26408,7 +26409,7 @@
                 </a14:hiddenLine>
               </a:ext>
               <a:ext uri="{AF507438-7753-43e0-B8FC-AC1667EBCBE1}">
-                <a14:hiddenEffects xmlns="" xmlns:a14="http://schemas.microsoft.com/office/drawing/2010/main">
+                <a14:hiddenEffects xmlns:a14="http://schemas.microsoft.com/office/drawing/2010/main" xmlns="">
                   <a:effectLst>
                     <a:outerShdw blurRad="63500" dist="38099" dir="2700000" algn="ctr" rotWithShape="0">
                       <a:srgbClr val="000000">
@@ -26609,7 +26610,7 @@
             <a:effectLst/>
             <a:extLst>
               <a:ext uri="{91240B29-F687-4f45-9708-019B960494DF}">
-                <a14:hiddenLine xmlns="" xmlns:a14="http://schemas.microsoft.com/office/drawing/2010/main" w="9525" cap="flat">
+                <a14:hiddenLine xmlns:a14="http://schemas.microsoft.com/office/drawing/2010/main" xmlns="" w="9525" cap="flat">
                   <a:solidFill>
                     <a:srgbClr val="808080"/>
                   </a:solidFill>
@@ -26619,7 +26620,7 @@
                 </a14:hiddenLine>
               </a:ext>
               <a:ext uri="{AF507438-7753-43e0-B8FC-AC1667EBCBE1}">
-                <a14:hiddenEffects xmlns="" xmlns:a14="http://schemas.microsoft.com/office/drawing/2010/main">
+                <a14:hiddenEffects xmlns:a14="http://schemas.microsoft.com/office/drawing/2010/main" xmlns="">
                   <a:effectLst>
                     <a:outerShdw blurRad="63500" dist="38099" dir="2700000" algn="ctr" rotWithShape="0">
                       <a:srgbClr val="000000">
@@ -26822,7 +26823,7 @@
             <a:effectLst/>
             <a:extLst>
               <a:ext uri="{91240B29-F687-4f45-9708-019B960494DF}">
-                <a14:hiddenLine xmlns="" xmlns:a14="http://schemas.microsoft.com/office/drawing/2010/main" w="9525" cap="flat">
+                <a14:hiddenLine xmlns:a14="http://schemas.microsoft.com/office/drawing/2010/main" xmlns="" w="9525" cap="flat">
                   <a:solidFill>
                     <a:srgbClr val="808080"/>
                   </a:solidFill>
@@ -26832,7 +26833,7 @@
                 </a14:hiddenLine>
               </a:ext>
               <a:ext uri="{AF507438-7753-43e0-B8FC-AC1667EBCBE1}">
-                <a14:hiddenEffects xmlns="" xmlns:a14="http://schemas.microsoft.com/office/drawing/2010/main">
+                <a14:hiddenEffects xmlns:a14="http://schemas.microsoft.com/office/drawing/2010/main" xmlns="">
                   <a:effectLst>
                     <a:outerShdw blurRad="63500" dist="38099" dir="2700000" algn="ctr" rotWithShape="0">
                       <a:srgbClr val="000000">
@@ -27045,7 +27046,7 @@
             <a:effectLst/>
             <a:extLst>
               <a:ext uri="{91240B29-F687-4f45-9708-019B960494DF}">
-                <a14:hiddenLine xmlns="" xmlns:a14="http://schemas.microsoft.com/office/drawing/2010/main" w="9525" cap="flat">
+                <a14:hiddenLine xmlns:a14="http://schemas.microsoft.com/office/drawing/2010/main" xmlns="" w="9525" cap="flat">
                   <a:solidFill>
                     <a:srgbClr val="808080"/>
                   </a:solidFill>
@@ -27055,7 +27056,7 @@
                 </a14:hiddenLine>
               </a:ext>
               <a:ext uri="{AF507438-7753-43e0-B8FC-AC1667EBCBE1}">
-                <a14:hiddenEffects xmlns="" xmlns:a14="http://schemas.microsoft.com/office/drawing/2010/main">
+                <a14:hiddenEffects xmlns:a14="http://schemas.microsoft.com/office/drawing/2010/main" xmlns="">
                   <a:effectLst>
                     <a:outerShdw blurRad="63500" dist="38099" dir="2700000" algn="ctr" rotWithShape="0">
                       <a:srgbClr val="000000">
@@ -27238,7 +27239,7 @@
             <a:effectLst/>
             <a:extLst>
               <a:ext uri="{91240B29-F687-4f45-9708-019B960494DF}">
-                <a14:hiddenLine xmlns="" xmlns:a14="http://schemas.microsoft.com/office/drawing/2010/main" w="9525" cap="flat">
+                <a14:hiddenLine xmlns:a14="http://schemas.microsoft.com/office/drawing/2010/main" xmlns="" w="9525" cap="flat">
                   <a:solidFill>
                     <a:srgbClr val="808080"/>
                   </a:solidFill>
@@ -27248,7 +27249,7 @@
                 </a14:hiddenLine>
               </a:ext>
               <a:ext uri="{AF507438-7753-43e0-B8FC-AC1667EBCBE1}">
-                <a14:hiddenEffects xmlns="" xmlns:a14="http://schemas.microsoft.com/office/drawing/2010/main">
+                <a14:hiddenEffects xmlns:a14="http://schemas.microsoft.com/office/drawing/2010/main" xmlns="">
                   <a:effectLst>
                     <a:outerShdw blurRad="63500" dist="38099" dir="2700000" algn="ctr" rotWithShape="0">
                       <a:srgbClr val="000000">
@@ -27447,7 +27448,7 @@
             <a:effectLst/>
             <a:extLst>
               <a:ext uri="{91240B29-F687-4f45-9708-019B960494DF}">
-                <a14:hiddenLine xmlns="" xmlns:a14="http://schemas.microsoft.com/office/drawing/2010/main" w="9525" cap="flat">
+                <a14:hiddenLine xmlns:a14="http://schemas.microsoft.com/office/drawing/2010/main" xmlns="" w="9525" cap="flat">
                   <a:solidFill>
                     <a:srgbClr val="808080"/>
                   </a:solidFill>
@@ -27457,7 +27458,7 @@
                 </a14:hiddenLine>
               </a:ext>
               <a:ext uri="{AF507438-7753-43e0-B8FC-AC1667EBCBE1}">
-                <a14:hiddenEffects xmlns="" xmlns:a14="http://schemas.microsoft.com/office/drawing/2010/main">
+                <a14:hiddenEffects xmlns:a14="http://schemas.microsoft.com/office/drawing/2010/main" xmlns="">
                   <a:effectLst>
                     <a:outerShdw blurRad="63500" dist="38099" dir="2700000" algn="ctr" rotWithShape="0">
                       <a:srgbClr val="000000">
@@ -27670,7 +27671,7 @@
             <a:effectLst/>
             <a:extLst>
               <a:ext uri="{91240B29-F687-4f45-9708-019B960494DF}">
-                <a14:hiddenLine xmlns="" xmlns:a14="http://schemas.microsoft.com/office/drawing/2010/main" w="9525" cap="flat">
+                <a14:hiddenLine xmlns:a14="http://schemas.microsoft.com/office/drawing/2010/main" xmlns="" w="9525" cap="flat">
                   <a:solidFill>
                     <a:srgbClr val="808080"/>
                   </a:solidFill>
@@ -27680,7 +27681,7 @@
                 </a14:hiddenLine>
               </a:ext>
               <a:ext uri="{AF507438-7753-43e0-B8FC-AC1667EBCBE1}">
-                <a14:hiddenEffects xmlns="" xmlns:a14="http://schemas.microsoft.com/office/drawing/2010/main">
+                <a14:hiddenEffects xmlns:a14="http://schemas.microsoft.com/office/drawing/2010/main" xmlns="">
                   <a:effectLst>
                     <a:outerShdw blurRad="63500" dist="38099" dir="2700000" algn="ctr" rotWithShape="0">
                       <a:srgbClr val="000000">
@@ -27871,7 +27872,7 @@
             <a:effectLst/>
             <a:extLst>
               <a:ext uri="{91240B29-F687-4f45-9708-019B960494DF}">
-                <a14:hiddenLine xmlns="" xmlns:a14="http://schemas.microsoft.com/office/drawing/2010/main" w="9525" cap="flat">
+                <a14:hiddenLine xmlns:a14="http://schemas.microsoft.com/office/drawing/2010/main" xmlns="" w="9525" cap="flat">
                   <a:solidFill>
                     <a:srgbClr val="808080"/>
                   </a:solidFill>
@@ -27881,7 +27882,7 @@
                 </a14:hiddenLine>
               </a:ext>
               <a:ext uri="{AF507438-7753-43e0-B8FC-AC1667EBCBE1}">
-                <a14:hiddenEffects xmlns="" xmlns:a14="http://schemas.microsoft.com/office/drawing/2010/main">
+                <a14:hiddenEffects xmlns:a14="http://schemas.microsoft.com/office/drawing/2010/main" xmlns="">
                   <a:effectLst>
                     <a:outerShdw blurRad="63500" dist="38099" dir="2700000" algn="ctr" rotWithShape="0">
                       <a:srgbClr val="000000">
@@ -27976,7 +27977,7 @@
             <a:effectLst/>
             <a:extLst>
               <a:ext uri="{91240B29-F687-4f45-9708-019B960494DF}">
-                <a14:hiddenLine xmlns="" xmlns:a14="http://schemas.microsoft.com/office/drawing/2010/main" w="9525" cap="flat">
+                <a14:hiddenLine xmlns:a14="http://schemas.microsoft.com/office/drawing/2010/main" xmlns="" w="9525" cap="flat">
                   <a:solidFill>
                     <a:srgbClr val="808080"/>
                   </a:solidFill>
@@ -27986,7 +27987,7 @@
                 </a14:hiddenLine>
               </a:ext>
               <a:ext uri="{AF507438-7753-43e0-B8FC-AC1667EBCBE1}">
-                <a14:hiddenEffects xmlns="" xmlns:a14="http://schemas.microsoft.com/office/drawing/2010/main">
+                <a14:hiddenEffects xmlns:a14="http://schemas.microsoft.com/office/drawing/2010/main" xmlns="">
                   <a:effectLst>
                     <a:outerShdw blurRad="63500" dist="38099" dir="2700000" algn="ctr" rotWithShape="0">
                       <a:srgbClr val="000000">
@@ -28567,7 +28568,7 @@
             <a:effectLst/>
             <a:extLst>
               <a:ext uri="{91240B29-F687-4f45-9708-019B960494DF}">
-                <a14:hiddenLine xmlns:a14="http://schemas.microsoft.com/office/drawing/2010/main" xmlns="" w="9525" cap="flat">
+                <a14:hiddenLine xmlns="" xmlns:a14="http://schemas.microsoft.com/office/drawing/2010/main" w="9525" cap="flat">
                   <a:solidFill>
                     <a:srgbClr val="808080"/>
                   </a:solidFill>
@@ -28577,7 +28578,7 @@
                 </a14:hiddenLine>
               </a:ext>
               <a:ext uri="{AF507438-7753-43e0-B8FC-AC1667EBCBE1}">
-                <a14:hiddenEffects xmlns:a14="http://schemas.microsoft.com/office/drawing/2010/main" xmlns="">
+                <a14:hiddenEffects xmlns="" xmlns:a14="http://schemas.microsoft.com/office/drawing/2010/main">
                   <a:effectLst>
                     <a:outerShdw blurRad="63500" dist="38099" dir="2700000" algn="ctr" rotWithShape="0">
                       <a:srgbClr val="000000">
@@ -28709,7 +28710,7 @@
             <a:effectLst/>
             <a:extLst>
               <a:ext uri="{91240B29-F687-4f45-9708-019B960494DF}">
-                <a14:hiddenLine xmlns:a14="http://schemas.microsoft.com/office/drawing/2010/main" xmlns="" w="9525" cap="flat">
+                <a14:hiddenLine xmlns="" xmlns:a14="http://schemas.microsoft.com/office/drawing/2010/main" w="9525" cap="flat">
                   <a:solidFill>
                     <a:srgbClr val="808080"/>
                   </a:solidFill>
@@ -28719,7 +28720,7 @@
                 </a14:hiddenLine>
               </a:ext>
               <a:ext uri="{AF507438-7753-43e0-B8FC-AC1667EBCBE1}">
-                <a14:hiddenEffects xmlns:a14="http://schemas.microsoft.com/office/drawing/2010/main" xmlns="">
+                <a14:hiddenEffects xmlns="" xmlns:a14="http://schemas.microsoft.com/office/drawing/2010/main">
                   <a:effectLst>
                     <a:outerShdw blurRad="63500" dist="38099" dir="2700000" algn="ctr" rotWithShape="0">
                       <a:srgbClr val="000000">
@@ -28887,7 +28888,7 @@
             <a:effectLst/>
             <a:extLst>
               <a:ext uri="{91240B29-F687-4f45-9708-019B960494DF}">
-                <a14:hiddenLine xmlns:a14="http://schemas.microsoft.com/office/drawing/2010/main" xmlns="" w="9525" cap="flat">
+                <a14:hiddenLine xmlns="" xmlns:a14="http://schemas.microsoft.com/office/drawing/2010/main" w="9525" cap="flat">
                   <a:solidFill>
                     <a:srgbClr val="808080"/>
                   </a:solidFill>
@@ -28897,7 +28898,7 @@
                 </a14:hiddenLine>
               </a:ext>
               <a:ext uri="{AF507438-7753-43e0-B8FC-AC1667EBCBE1}">
-                <a14:hiddenEffects xmlns:a14="http://schemas.microsoft.com/office/drawing/2010/main" xmlns="">
+                <a14:hiddenEffects xmlns="" xmlns:a14="http://schemas.microsoft.com/office/drawing/2010/main">
                   <a:effectLst>
                     <a:outerShdw blurRad="63500" dist="38099" dir="2700000" algn="ctr" rotWithShape="0">
                       <a:srgbClr val="000000">
@@ -29003,7 +29004,7 @@
             <a:effectLst/>
             <a:extLst>
               <a:ext uri="{91240B29-F687-4f45-9708-019B960494DF}">
-                <a14:hiddenLine xmlns:a14="http://schemas.microsoft.com/office/drawing/2010/main" xmlns="" w="9525" cap="flat">
+                <a14:hiddenLine xmlns="" xmlns:a14="http://schemas.microsoft.com/office/drawing/2010/main" w="9525" cap="flat">
                   <a:solidFill>
                     <a:srgbClr val="808080"/>
                   </a:solidFill>
@@ -29013,7 +29014,7 @@
                 </a14:hiddenLine>
               </a:ext>
               <a:ext uri="{AF507438-7753-43e0-B8FC-AC1667EBCBE1}">
-                <a14:hiddenEffects xmlns:a14="http://schemas.microsoft.com/office/drawing/2010/main" xmlns="">
+                <a14:hiddenEffects xmlns="" xmlns:a14="http://schemas.microsoft.com/office/drawing/2010/main">
                   <a:effectLst>
                     <a:outerShdw blurRad="63500" dist="38099" dir="2700000" algn="ctr" rotWithShape="0">
                       <a:srgbClr val="000000">
@@ -29191,7 +29192,7 @@
             <a:effectLst/>
             <a:extLst>
               <a:ext uri="{91240B29-F687-4f45-9708-019B960494DF}">
-                <a14:hiddenLine xmlns:a14="http://schemas.microsoft.com/office/drawing/2010/main" xmlns="" w="9525" cap="flat">
+                <a14:hiddenLine xmlns="" xmlns:a14="http://schemas.microsoft.com/office/drawing/2010/main" w="9525" cap="flat">
                   <a:solidFill>
                     <a:srgbClr val="808080"/>
                   </a:solidFill>
@@ -29201,7 +29202,7 @@
                 </a14:hiddenLine>
               </a:ext>
               <a:ext uri="{AF507438-7753-43e0-B8FC-AC1667EBCBE1}">
-                <a14:hiddenEffects xmlns:a14="http://schemas.microsoft.com/office/drawing/2010/main" xmlns="">
+                <a14:hiddenEffects xmlns="" xmlns:a14="http://schemas.microsoft.com/office/drawing/2010/main">
                   <a:effectLst>
                     <a:outerShdw blurRad="63500" dist="38099" dir="2700000" algn="ctr" rotWithShape="0">
                       <a:srgbClr val="000000">
@@ -29307,7 +29308,7 @@
             <a:effectLst/>
             <a:extLst>
               <a:ext uri="{91240B29-F687-4f45-9708-019B960494DF}">
-                <a14:hiddenLine xmlns:a14="http://schemas.microsoft.com/office/drawing/2010/main" xmlns="" w="9525" cap="flat">
+                <a14:hiddenLine xmlns="" xmlns:a14="http://schemas.microsoft.com/office/drawing/2010/main" w="9525" cap="flat">
                   <a:solidFill>
                     <a:srgbClr val="808080"/>
                   </a:solidFill>
@@ -29317,7 +29318,7 @@
                 </a14:hiddenLine>
               </a:ext>
               <a:ext uri="{AF507438-7753-43e0-B8FC-AC1667EBCBE1}">
-                <a14:hiddenEffects xmlns:a14="http://schemas.microsoft.com/office/drawing/2010/main" xmlns="">
+                <a14:hiddenEffects xmlns="" xmlns:a14="http://schemas.microsoft.com/office/drawing/2010/main">
                   <a:effectLst>
                     <a:outerShdw blurRad="63500" dist="38099" dir="2700000" algn="ctr" rotWithShape="0">
                       <a:srgbClr val="000000">
@@ -29639,7 +29640,7 @@
             <a:effectLst/>
             <a:extLst>
               <a:ext uri="{91240B29-F687-4f45-9708-019B960494DF}">
-                <a14:hiddenLine xmlns:a14="http://schemas.microsoft.com/office/drawing/2010/main" xmlns="" w="9525" cap="flat">
+                <a14:hiddenLine xmlns="" xmlns:a14="http://schemas.microsoft.com/office/drawing/2010/main" w="9525" cap="flat">
                   <a:solidFill>
                     <a:srgbClr val="808080"/>
                   </a:solidFill>
@@ -29649,7 +29650,7 @@
                 </a14:hiddenLine>
               </a:ext>
               <a:ext uri="{AF507438-7753-43e0-B8FC-AC1667EBCBE1}">
-                <a14:hiddenEffects xmlns:a14="http://schemas.microsoft.com/office/drawing/2010/main" xmlns="">
+                <a14:hiddenEffects xmlns="" xmlns:a14="http://schemas.microsoft.com/office/drawing/2010/main">
                   <a:effectLst>
                     <a:outerShdw blurRad="63500" dist="38099" dir="2700000" algn="ctr" rotWithShape="0">
                       <a:srgbClr val="000000">
@@ -29781,7 +29782,7 @@
             <a:effectLst/>
             <a:extLst>
               <a:ext uri="{91240B29-F687-4f45-9708-019B960494DF}">
-                <a14:hiddenLine xmlns:a14="http://schemas.microsoft.com/office/drawing/2010/main" xmlns="" w="9525" cap="flat">
+                <a14:hiddenLine xmlns="" xmlns:a14="http://schemas.microsoft.com/office/drawing/2010/main" w="9525" cap="flat">
                   <a:solidFill>
                     <a:srgbClr val="808080"/>
                   </a:solidFill>
@@ -29791,7 +29792,7 @@
                 </a14:hiddenLine>
               </a:ext>
               <a:ext uri="{AF507438-7753-43e0-B8FC-AC1667EBCBE1}">
-                <a14:hiddenEffects xmlns:a14="http://schemas.microsoft.com/office/drawing/2010/main" xmlns="">
+                <a14:hiddenEffects xmlns="" xmlns:a14="http://schemas.microsoft.com/office/drawing/2010/main">
                   <a:effectLst>
                     <a:outerShdw blurRad="63500" dist="38099" dir="2700000" algn="ctr" rotWithShape="0">
                       <a:srgbClr val="000000">
@@ -29997,7 +29998,7 @@
             <a:effectLst/>
             <a:extLst>
               <a:ext uri="{91240B29-F687-4f45-9708-019B960494DF}">
-                <a14:hiddenLine xmlns:a14="http://schemas.microsoft.com/office/drawing/2010/main" xmlns="" w="9525" cap="flat">
+                <a14:hiddenLine xmlns="" xmlns:a14="http://schemas.microsoft.com/office/drawing/2010/main" w="9525" cap="flat">
                   <a:solidFill>
                     <a:srgbClr val="808080"/>
                   </a:solidFill>
@@ -30007,7 +30008,7 @@
                 </a14:hiddenLine>
               </a:ext>
               <a:ext uri="{AF507438-7753-43e0-B8FC-AC1667EBCBE1}">
-                <a14:hiddenEffects xmlns:a14="http://schemas.microsoft.com/office/drawing/2010/main" xmlns="">
+                <a14:hiddenEffects xmlns="" xmlns:a14="http://schemas.microsoft.com/office/drawing/2010/main">
                   <a:effectLst>
                     <a:outerShdw blurRad="63500" dist="38099" dir="2700000" algn="ctr" rotWithShape="0">
                       <a:srgbClr val="000000">
@@ -30249,7 +30250,7 @@
             <a:effectLst/>
             <a:extLst>
               <a:ext uri="{91240B29-F687-4f45-9708-019B960494DF}">
-                <a14:hiddenLine xmlns:a14="http://schemas.microsoft.com/office/drawing/2010/main" xmlns="" w="9525" cap="flat">
+                <a14:hiddenLine xmlns="" xmlns:a14="http://schemas.microsoft.com/office/drawing/2010/main" w="9525" cap="flat">
                   <a:solidFill>
                     <a:srgbClr val="808080"/>
                   </a:solidFill>
@@ -30259,7 +30260,7 @@
                 </a14:hiddenLine>
               </a:ext>
               <a:ext uri="{AF507438-7753-43e0-B8FC-AC1667EBCBE1}">
-                <a14:hiddenEffects xmlns:a14="http://schemas.microsoft.com/office/drawing/2010/main" xmlns="">
+                <a14:hiddenEffects xmlns="" xmlns:a14="http://schemas.microsoft.com/office/drawing/2010/main">
                   <a:effectLst>
                     <a:outerShdw blurRad="63500" dist="38099" dir="2700000" algn="ctr" rotWithShape="0">
                       <a:srgbClr val="000000">
@@ -30501,7 +30502,7 @@
             <a:effectLst/>
             <a:extLst>
               <a:ext uri="{91240B29-F687-4f45-9708-019B960494DF}">
-                <a14:hiddenLine xmlns:a14="http://schemas.microsoft.com/office/drawing/2010/main" xmlns="" w="9525" cap="flat">
+                <a14:hiddenLine xmlns="" xmlns:a14="http://schemas.microsoft.com/office/drawing/2010/main" w="9525" cap="flat">
                   <a:solidFill>
                     <a:srgbClr val="808080"/>
                   </a:solidFill>
@@ -30511,7 +30512,7 @@
                 </a14:hiddenLine>
               </a:ext>
               <a:ext uri="{AF507438-7753-43e0-B8FC-AC1667EBCBE1}">
-                <a14:hiddenEffects xmlns:a14="http://schemas.microsoft.com/office/drawing/2010/main" xmlns="">
+                <a14:hiddenEffects xmlns="" xmlns:a14="http://schemas.microsoft.com/office/drawing/2010/main">
                   <a:effectLst>
                     <a:outerShdw blurRad="63500" dist="38099" dir="2700000" algn="ctr" rotWithShape="0">
                       <a:srgbClr val="000000">
@@ -30643,7 +30644,7 @@
             <a:effectLst/>
             <a:extLst>
               <a:ext uri="{91240B29-F687-4f45-9708-019B960494DF}">
-                <a14:hiddenLine xmlns:a14="http://schemas.microsoft.com/office/drawing/2010/main" xmlns="" w="9525" cap="flat">
+                <a14:hiddenLine xmlns="" xmlns:a14="http://schemas.microsoft.com/office/drawing/2010/main" w="9525" cap="flat">
                   <a:solidFill>
                     <a:srgbClr val="808080"/>
                   </a:solidFill>
@@ -30653,7 +30654,7 @@
                 </a14:hiddenLine>
               </a:ext>
               <a:ext uri="{AF507438-7753-43e0-B8FC-AC1667EBCBE1}">
-                <a14:hiddenEffects xmlns:a14="http://schemas.microsoft.com/office/drawing/2010/main" xmlns="">
+                <a14:hiddenEffects xmlns="" xmlns:a14="http://schemas.microsoft.com/office/drawing/2010/main">
                   <a:effectLst>
                     <a:outerShdw blurRad="63500" dist="38099" dir="2700000" algn="ctr" rotWithShape="0">
                       <a:srgbClr val="000000">
@@ -30759,7 +30760,7 @@
             <a:effectLst/>
             <a:extLst>
               <a:ext uri="{91240B29-F687-4f45-9708-019B960494DF}">
-                <a14:hiddenLine xmlns:a14="http://schemas.microsoft.com/office/drawing/2010/main" xmlns="" w="9525" cap="flat">
+                <a14:hiddenLine xmlns="" xmlns:a14="http://schemas.microsoft.com/office/drawing/2010/main" w="9525" cap="flat">
                   <a:solidFill>
                     <a:srgbClr val="808080"/>
                   </a:solidFill>
@@ -30769,7 +30770,7 @@
                 </a14:hiddenLine>
               </a:ext>
               <a:ext uri="{AF507438-7753-43e0-B8FC-AC1667EBCBE1}">
-                <a14:hiddenEffects xmlns:a14="http://schemas.microsoft.com/office/drawing/2010/main" xmlns="">
+                <a14:hiddenEffects xmlns="" xmlns:a14="http://schemas.microsoft.com/office/drawing/2010/main">
                   <a:effectLst>
                     <a:outerShdw blurRad="63500" dist="38099" dir="2700000" algn="ctr" rotWithShape="0">
                       <a:srgbClr val="000000">
@@ -30983,7 +30984,7 @@
             <a:effectLst/>
             <a:extLst>
               <a:ext uri="{91240B29-F687-4f45-9708-019B960494DF}">
-                <a14:hiddenLine xmlns:a14="http://schemas.microsoft.com/office/drawing/2010/main" xmlns="" w="9525" cap="flat">
+                <a14:hiddenLine xmlns="" xmlns:a14="http://schemas.microsoft.com/office/drawing/2010/main" w="9525" cap="flat">
                   <a:solidFill>
                     <a:srgbClr val="808080"/>
                   </a:solidFill>
@@ -30993,7 +30994,7 @@
                 </a14:hiddenLine>
               </a:ext>
               <a:ext uri="{AF507438-7753-43e0-B8FC-AC1667EBCBE1}">
-                <a14:hiddenEffects xmlns:a14="http://schemas.microsoft.com/office/drawing/2010/main" xmlns="">
+                <a14:hiddenEffects xmlns="" xmlns:a14="http://schemas.microsoft.com/office/drawing/2010/main">
                   <a:effectLst>
                     <a:outerShdw blurRad="63500" dist="38099" dir="2700000" algn="ctr" rotWithShape="0">
                       <a:srgbClr val="000000">
@@ -31209,7 +31210,7 @@
             <a:effectLst/>
             <a:extLst>
               <a:ext uri="{91240B29-F687-4f45-9708-019B960494DF}">
-                <a14:hiddenLine xmlns:a14="http://schemas.microsoft.com/office/drawing/2010/main" xmlns="" w="9525" cap="flat">
+                <a14:hiddenLine xmlns="" xmlns:a14="http://schemas.microsoft.com/office/drawing/2010/main" w="9525" cap="flat">
                   <a:solidFill>
                     <a:srgbClr val="808080"/>
                   </a:solidFill>
@@ -31219,7 +31220,7 @@
                 </a14:hiddenLine>
               </a:ext>
               <a:ext uri="{AF507438-7753-43e0-B8FC-AC1667EBCBE1}">
-                <a14:hiddenEffects xmlns:a14="http://schemas.microsoft.com/office/drawing/2010/main" xmlns="">
+                <a14:hiddenEffects xmlns="" xmlns:a14="http://schemas.microsoft.com/office/drawing/2010/main">
                   <a:effectLst>
                     <a:outerShdw blurRad="63500" dist="38099" dir="2700000" algn="ctr" rotWithShape="0">
                       <a:srgbClr val="000000">
@@ -31425,7 +31426,7 @@
             <a:effectLst/>
             <a:extLst>
               <a:ext uri="{91240B29-F687-4f45-9708-019B960494DF}">
-                <a14:hiddenLine xmlns:a14="http://schemas.microsoft.com/office/drawing/2010/main" xmlns="" w="9525" cap="flat">
+                <a14:hiddenLine xmlns="" xmlns:a14="http://schemas.microsoft.com/office/drawing/2010/main" w="9525" cap="flat">
                   <a:solidFill>
                     <a:srgbClr val="808080"/>
                   </a:solidFill>
@@ -31435,7 +31436,7 @@
                 </a14:hiddenLine>
               </a:ext>
               <a:ext uri="{AF507438-7753-43e0-B8FC-AC1667EBCBE1}">
-                <a14:hiddenEffects xmlns:a14="http://schemas.microsoft.com/office/drawing/2010/main" xmlns="">
+                <a14:hiddenEffects xmlns="" xmlns:a14="http://schemas.microsoft.com/office/drawing/2010/main">
                   <a:effectLst>
                     <a:outerShdw blurRad="63500" dist="38099" dir="2700000" algn="ctr" rotWithShape="0">
                       <a:srgbClr val="000000">
@@ -31643,7 +31644,7 @@
             <a:effectLst/>
             <a:extLst>
               <a:ext uri="{91240B29-F687-4f45-9708-019B960494DF}">
-                <a14:hiddenLine xmlns:a14="http://schemas.microsoft.com/office/drawing/2010/main" xmlns="" w="9525" cap="flat">
+                <a14:hiddenLine xmlns="" xmlns:a14="http://schemas.microsoft.com/office/drawing/2010/main" w="9525" cap="flat">
                   <a:solidFill>
                     <a:srgbClr val="808080"/>
                   </a:solidFill>
@@ -31653,7 +31654,7 @@
                 </a14:hiddenLine>
               </a:ext>
               <a:ext uri="{AF507438-7753-43e0-B8FC-AC1667EBCBE1}">
-                <a14:hiddenEffects xmlns:a14="http://schemas.microsoft.com/office/drawing/2010/main" xmlns="">
+                <a14:hiddenEffects xmlns="" xmlns:a14="http://schemas.microsoft.com/office/drawing/2010/main">
                   <a:effectLst>
                     <a:outerShdw blurRad="63500" dist="38099" dir="2700000" algn="ctr" rotWithShape="0">
                       <a:srgbClr val="000000">
@@ -31871,7 +31872,7 @@
             <a:effectLst/>
             <a:extLst>
               <a:ext uri="{91240B29-F687-4f45-9708-019B960494DF}">
-                <a14:hiddenLine xmlns:a14="http://schemas.microsoft.com/office/drawing/2010/main" xmlns="" w="9525" cap="flat">
+                <a14:hiddenLine xmlns="" xmlns:a14="http://schemas.microsoft.com/office/drawing/2010/main" w="9525" cap="flat">
                   <a:solidFill>
                     <a:srgbClr val="808080"/>
                   </a:solidFill>
@@ -31881,7 +31882,7 @@
                 </a14:hiddenLine>
               </a:ext>
               <a:ext uri="{AF507438-7753-43e0-B8FC-AC1667EBCBE1}">
-                <a14:hiddenEffects xmlns:a14="http://schemas.microsoft.com/office/drawing/2010/main" xmlns="">
+                <a14:hiddenEffects xmlns="" xmlns:a14="http://schemas.microsoft.com/office/drawing/2010/main">
                   <a:effectLst>
                     <a:outerShdw blurRad="63500" dist="38099" dir="2700000" algn="ctr" rotWithShape="0">
                       <a:srgbClr val="000000">
@@ -32069,7 +32070,7 @@
             <a:effectLst/>
             <a:extLst>
               <a:ext uri="{91240B29-F687-4f45-9708-019B960494DF}">
-                <a14:hiddenLine xmlns:a14="http://schemas.microsoft.com/office/drawing/2010/main" xmlns="" w="9525" cap="flat">
+                <a14:hiddenLine xmlns="" xmlns:a14="http://schemas.microsoft.com/office/drawing/2010/main" w="9525" cap="flat">
                   <a:solidFill>
                     <a:srgbClr val="808080"/>
                   </a:solidFill>
@@ -32079,7 +32080,7 @@
                 </a14:hiddenLine>
               </a:ext>
               <a:ext uri="{AF507438-7753-43e0-B8FC-AC1667EBCBE1}">
-                <a14:hiddenEffects xmlns:a14="http://schemas.microsoft.com/office/drawing/2010/main" xmlns="">
+                <a14:hiddenEffects xmlns="" xmlns:a14="http://schemas.microsoft.com/office/drawing/2010/main">
                   <a:effectLst>
                     <a:outerShdw blurRad="63500" dist="38099" dir="2700000" algn="ctr" rotWithShape="0">
                       <a:srgbClr val="000000">
@@ -32283,7 +32284,7 @@
             <a:effectLst/>
             <a:extLst>
               <a:ext uri="{91240B29-F687-4f45-9708-019B960494DF}">
-                <a14:hiddenLine xmlns:a14="http://schemas.microsoft.com/office/drawing/2010/main" xmlns="" w="9525" cap="flat">
+                <a14:hiddenLine xmlns="" xmlns:a14="http://schemas.microsoft.com/office/drawing/2010/main" w="9525" cap="flat">
                   <a:solidFill>
                     <a:srgbClr val="808080"/>
                   </a:solidFill>
@@ -32293,7 +32294,7 @@
                 </a14:hiddenLine>
               </a:ext>
               <a:ext uri="{AF507438-7753-43e0-B8FC-AC1667EBCBE1}">
-                <a14:hiddenEffects xmlns:a14="http://schemas.microsoft.com/office/drawing/2010/main" xmlns="">
+                <a14:hiddenEffects xmlns="" xmlns:a14="http://schemas.microsoft.com/office/drawing/2010/main">
                   <a:effectLst>
                     <a:outerShdw blurRad="63500" dist="38099" dir="2700000" algn="ctr" rotWithShape="0">
                       <a:srgbClr val="000000">
@@ -32511,7 +32512,7 @@
             <a:effectLst/>
             <a:extLst>
               <a:ext uri="{91240B29-F687-4f45-9708-019B960494DF}">
-                <a14:hiddenLine xmlns:a14="http://schemas.microsoft.com/office/drawing/2010/main" xmlns="" w="9525" cap="flat">
+                <a14:hiddenLine xmlns="" xmlns:a14="http://schemas.microsoft.com/office/drawing/2010/main" w="9525" cap="flat">
                   <a:solidFill>
                     <a:srgbClr val="808080"/>
                   </a:solidFill>
@@ -32521,7 +32522,7 @@
                 </a14:hiddenLine>
               </a:ext>
               <a:ext uri="{AF507438-7753-43e0-B8FC-AC1667EBCBE1}">
-                <a14:hiddenEffects xmlns:a14="http://schemas.microsoft.com/office/drawing/2010/main" xmlns="">
+                <a14:hiddenEffects xmlns="" xmlns:a14="http://schemas.microsoft.com/office/drawing/2010/main">
                   <a:effectLst>
                     <a:outerShdw blurRad="63500" dist="38099" dir="2700000" algn="ctr" rotWithShape="0">
                       <a:srgbClr val="000000">
@@ -32717,7 +32718,7 @@
             <a:effectLst/>
             <a:extLst>
               <a:ext uri="{91240B29-F687-4f45-9708-019B960494DF}">
-                <a14:hiddenLine xmlns:a14="http://schemas.microsoft.com/office/drawing/2010/main" xmlns="" w="9525" cap="flat">
+                <a14:hiddenLine xmlns="" xmlns:a14="http://schemas.microsoft.com/office/drawing/2010/main" w="9525" cap="flat">
                   <a:solidFill>
                     <a:srgbClr val="808080"/>
                   </a:solidFill>
@@ -32727,7 +32728,7 @@
                 </a14:hiddenLine>
               </a:ext>
               <a:ext uri="{AF507438-7753-43e0-B8FC-AC1667EBCBE1}">
-                <a14:hiddenEffects xmlns:a14="http://schemas.microsoft.com/office/drawing/2010/main" xmlns="">
+                <a14:hiddenEffects xmlns="" xmlns:a14="http://schemas.microsoft.com/office/drawing/2010/main">
                   <a:effectLst>
                     <a:outerShdw blurRad="63500" dist="38099" dir="2700000" algn="ctr" rotWithShape="0">
                       <a:srgbClr val="000000">
@@ -32827,7 +32828,7 @@
             <a:effectLst/>
             <a:extLst>
               <a:ext uri="{91240B29-F687-4f45-9708-019B960494DF}">
-                <a14:hiddenLine xmlns:a14="http://schemas.microsoft.com/office/drawing/2010/main" xmlns="" w="9525" cap="flat">
+                <a14:hiddenLine xmlns="" xmlns:a14="http://schemas.microsoft.com/office/drawing/2010/main" w="9525" cap="flat">
                   <a:solidFill>
                     <a:srgbClr val="808080"/>
                   </a:solidFill>
@@ -32837,7 +32838,7 @@
                 </a14:hiddenLine>
               </a:ext>
               <a:ext uri="{AF507438-7753-43e0-B8FC-AC1667EBCBE1}">
-                <a14:hiddenEffects xmlns:a14="http://schemas.microsoft.com/office/drawing/2010/main" xmlns="">
+                <a14:hiddenEffects xmlns="" xmlns:a14="http://schemas.microsoft.com/office/drawing/2010/main">
                   <a:effectLst>
                     <a:outerShdw blurRad="63500" dist="38099" dir="2700000" algn="ctr" rotWithShape="0">
                       <a:srgbClr val="000000">
@@ -33479,7 +33480,7 @@
             <a:effectLst/>
             <a:extLst>
               <a:ext uri="{91240B29-F687-4f45-9708-019B960494DF}">
-                <a14:hiddenLine xmlns:a14="http://schemas.microsoft.com/office/drawing/2010/main" xmlns="" w="9525" cap="flat">
+                <a14:hiddenLine xmlns="" xmlns:a14="http://schemas.microsoft.com/office/drawing/2010/main" w="9525" cap="flat">
                   <a:solidFill>
                     <a:srgbClr val="808080"/>
                   </a:solidFill>
@@ -33489,7 +33490,7 @@
                 </a14:hiddenLine>
               </a:ext>
               <a:ext uri="{AF507438-7753-43e0-B8FC-AC1667EBCBE1}">
-                <a14:hiddenEffects xmlns:a14="http://schemas.microsoft.com/office/drawing/2010/main" xmlns="">
+                <a14:hiddenEffects xmlns="" xmlns:a14="http://schemas.microsoft.com/office/drawing/2010/main">
                   <a:effectLst>
                     <a:outerShdw blurRad="63500" dist="38099" dir="2700000" algn="ctr" rotWithShape="0">
                       <a:srgbClr val="000000">
@@ -33621,7 +33622,7 @@
             <a:effectLst/>
             <a:extLst>
               <a:ext uri="{91240B29-F687-4f45-9708-019B960494DF}">
-                <a14:hiddenLine xmlns:a14="http://schemas.microsoft.com/office/drawing/2010/main" xmlns="" w="9525" cap="flat">
+                <a14:hiddenLine xmlns="" xmlns:a14="http://schemas.microsoft.com/office/drawing/2010/main" w="9525" cap="flat">
                   <a:solidFill>
                     <a:srgbClr val="808080"/>
                   </a:solidFill>
@@ -33631,7 +33632,7 @@
                 </a14:hiddenLine>
               </a:ext>
               <a:ext uri="{AF507438-7753-43e0-B8FC-AC1667EBCBE1}">
-                <a14:hiddenEffects xmlns:a14="http://schemas.microsoft.com/office/drawing/2010/main" xmlns="">
+                <a14:hiddenEffects xmlns="" xmlns:a14="http://schemas.microsoft.com/office/drawing/2010/main">
                   <a:effectLst>
                     <a:outerShdw blurRad="63500" dist="38099" dir="2700000" algn="ctr" rotWithShape="0">
                       <a:srgbClr val="000000">
@@ -33799,7 +33800,7 @@
             <a:effectLst/>
             <a:extLst>
               <a:ext uri="{91240B29-F687-4f45-9708-019B960494DF}">
-                <a14:hiddenLine xmlns:a14="http://schemas.microsoft.com/office/drawing/2010/main" xmlns="" w="9525" cap="flat">
+                <a14:hiddenLine xmlns="" xmlns:a14="http://schemas.microsoft.com/office/drawing/2010/main" w="9525" cap="flat">
                   <a:solidFill>
                     <a:srgbClr val="808080"/>
                   </a:solidFill>
@@ -33809,7 +33810,7 @@
                 </a14:hiddenLine>
               </a:ext>
               <a:ext uri="{AF507438-7753-43e0-B8FC-AC1667EBCBE1}">
-                <a14:hiddenEffects xmlns:a14="http://schemas.microsoft.com/office/drawing/2010/main" xmlns="">
+                <a14:hiddenEffects xmlns="" xmlns:a14="http://schemas.microsoft.com/office/drawing/2010/main">
                   <a:effectLst>
                     <a:outerShdw blurRad="63500" dist="38099" dir="2700000" algn="ctr" rotWithShape="0">
                       <a:srgbClr val="000000">
@@ -33915,7 +33916,7 @@
             <a:effectLst/>
             <a:extLst>
               <a:ext uri="{91240B29-F687-4f45-9708-019B960494DF}">
-                <a14:hiddenLine xmlns:a14="http://schemas.microsoft.com/office/drawing/2010/main" xmlns="" w="9525" cap="flat">
+                <a14:hiddenLine xmlns="" xmlns:a14="http://schemas.microsoft.com/office/drawing/2010/main" w="9525" cap="flat">
                   <a:solidFill>
                     <a:srgbClr val="808080"/>
                   </a:solidFill>
@@ -33925,7 +33926,7 @@
                 </a14:hiddenLine>
               </a:ext>
               <a:ext uri="{AF507438-7753-43e0-B8FC-AC1667EBCBE1}">
-                <a14:hiddenEffects xmlns:a14="http://schemas.microsoft.com/office/drawing/2010/main" xmlns="">
+                <a14:hiddenEffects xmlns="" xmlns:a14="http://schemas.microsoft.com/office/drawing/2010/main">
                   <a:effectLst>
                     <a:outerShdw blurRad="63500" dist="38099" dir="2700000" algn="ctr" rotWithShape="0">
                       <a:srgbClr val="000000">
@@ -34103,7 +34104,7 @@
             <a:effectLst/>
             <a:extLst>
               <a:ext uri="{91240B29-F687-4f45-9708-019B960494DF}">
-                <a14:hiddenLine xmlns:a14="http://schemas.microsoft.com/office/drawing/2010/main" xmlns="" w="9525" cap="flat">
+                <a14:hiddenLine xmlns="" xmlns:a14="http://schemas.microsoft.com/office/drawing/2010/main" w="9525" cap="flat">
                   <a:solidFill>
                     <a:srgbClr val="808080"/>
                   </a:solidFill>
@@ -34113,7 +34114,7 @@
                 </a14:hiddenLine>
               </a:ext>
               <a:ext uri="{AF507438-7753-43e0-B8FC-AC1667EBCBE1}">
-                <a14:hiddenEffects xmlns:a14="http://schemas.microsoft.com/office/drawing/2010/main" xmlns="">
+                <a14:hiddenEffects xmlns="" xmlns:a14="http://schemas.microsoft.com/office/drawing/2010/main">
                   <a:effectLst>
                     <a:outerShdw blurRad="63500" dist="38099" dir="2700000" algn="ctr" rotWithShape="0">
                       <a:srgbClr val="000000">
@@ -34219,7 +34220,7 @@
             <a:effectLst/>
             <a:extLst>
               <a:ext uri="{91240B29-F687-4f45-9708-019B960494DF}">
-                <a14:hiddenLine xmlns:a14="http://schemas.microsoft.com/office/drawing/2010/main" xmlns="" w="9525" cap="flat">
+                <a14:hiddenLine xmlns="" xmlns:a14="http://schemas.microsoft.com/office/drawing/2010/main" w="9525" cap="flat">
                   <a:solidFill>
                     <a:srgbClr val="808080"/>
                   </a:solidFill>
@@ -34229,7 +34230,7 @@
                 </a14:hiddenLine>
               </a:ext>
               <a:ext uri="{AF507438-7753-43e0-B8FC-AC1667EBCBE1}">
-                <a14:hiddenEffects xmlns:a14="http://schemas.microsoft.com/office/drawing/2010/main" xmlns="">
+                <a14:hiddenEffects xmlns="" xmlns:a14="http://schemas.microsoft.com/office/drawing/2010/main">
                   <a:effectLst>
                     <a:outerShdw blurRad="63500" dist="38099" dir="2700000" algn="ctr" rotWithShape="0">
                       <a:srgbClr val="000000">
@@ -34551,7 +34552,7 @@
             <a:effectLst/>
             <a:extLst>
               <a:ext uri="{91240B29-F687-4f45-9708-019B960494DF}">
-                <a14:hiddenLine xmlns:a14="http://schemas.microsoft.com/office/drawing/2010/main" xmlns="" w="9525" cap="flat">
+                <a14:hiddenLine xmlns="" xmlns:a14="http://schemas.microsoft.com/office/drawing/2010/main" w="9525" cap="flat">
                   <a:solidFill>
                     <a:srgbClr val="808080"/>
                   </a:solidFill>
@@ -34561,7 +34562,7 @@
                 </a14:hiddenLine>
               </a:ext>
               <a:ext uri="{AF507438-7753-43e0-B8FC-AC1667EBCBE1}">
-                <a14:hiddenEffects xmlns:a14="http://schemas.microsoft.com/office/drawing/2010/main" xmlns="">
+                <a14:hiddenEffects xmlns="" xmlns:a14="http://schemas.microsoft.com/office/drawing/2010/main">
                   <a:effectLst>
                     <a:outerShdw blurRad="63500" dist="38099" dir="2700000" algn="ctr" rotWithShape="0">
                       <a:srgbClr val="000000">
@@ -34693,7 +34694,7 @@
             <a:effectLst/>
             <a:extLst>
               <a:ext uri="{91240B29-F687-4f45-9708-019B960494DF}">
-                <a14:hiddenLine xmlns:a14="http://schemas.microsoft.com/office/drawing/2010/main" xmlns="" w="9525" cap="flat">
+                <a14:hiddenLine xmlns="" xmlns:a14="http://schemas.microsoft.com/office/drawing/2010/main" w="9525" cap="flat">
                   <a:solidFill>
                     <a:srgbClr val="808080"/>
                   </a:solidFill>
@@ -34703,7 +34704,7 @@
                 </a14:hiddenLine>
               </a:ext>
               <a:ext uri="{AF507438-7753-43e0-B8FC-AC1667EBCBE1}">
-                <a14:hiddenEffects xmlns:a14="http://schemas.microsoft.com/office/drawing/2010/main" xmlns="">
+                <a14:hiddenEffects xmlns="" xmlns:a14="http://schemas.microsoft.com/office/drawing/2010/main">
                   <a:effectLst>
                     <a:outerShdw blurRad="63500" dist="38099" dir="2700000" algn="ctr" rotWithShape="0">
                       <a:srgbClr val="000000">
@@ -34909,7 +34910,7 @@
             <a:effectLst/>
             <a:extLst>
               <a:ext uri="{91240B29-F687-4f45-9708-019B960494DF}">
-                <a14:hiddenLine xmlns:a14="http://schemas.microsoft.com/office/drawing/2010/main" xmlns="" w="9525" cap="flat">
+                <a14:hiddenLine xmlns="" xmlns:a14="http://schemas.microsoft.com/office/drawing/2010/main" w="9525" cap="flat">
                   <a:solidFill>
                     <a:srgbClr val="808080"/>
                   </a:solidFill>
@@ -34919,7 +34920,7 @@
                 </a14:hiddenLine>
               </a:ext>
               <a:ext uri="{AF507438-7753-43e0-B8FC-AC1667EBCBE1}">
-                <a14:hiddenEffects xmlns:a14="http://schemas.microsoft.com/office/drawing/2010/main" xmlns="">
+                <a14:hiddenEffects xmlns="" xmlns:a14="http://schemas.microsoft.com/office/drawing/2010/main">
                   <a:effectLst>
                     <a:outerShdw blurRad="63500" dist="38099" dir="2700000" algn="ctr" rotWithShape="0">
                       <a:srgbClr val="000000">
@@ -35161,7 +35162,7 @@
             <a:effectLst/>
             <a:extLst>
               <a:ext uri="{91240B29-F687-4f45-9708-019B960494DF}">
-                <a14:hiddenLine xmlns:a14="http://schemas.microsoft.com/office/drawing/2010/main" xmlns="" w="9525" cap="flat">
+                <a14:hiddenLine xmlns="" xmlns:a14="http://schemas.microsoft.com/office/drawing/2010/main" w="9525" cap="flat">
                   <a:solidFill>
                     <a:srgbClr val="808080"/>
                   </a:solidFill>
@@ -35171,7 +35172,7 @@
                 </a14:hiddenLine>
               </a:ext>
               <a:ext uri="{AF507438-7753-43e0-B8FC-AC1667EBCBE1}">
-                <a14:hiddenEffects xmlns:a14="http://schemas.microsoft.com/office/drawing/2010/main" xmlns="">
+                <a14:hiddenEffects xmlns="" xmlns:a14="http://schemas.microsoft.com/office/drawing/2010/main">
                   <a:effectLst>
                     <a:outerShdw blurRad="63500" dist="38099" dir="2700000" algn="ctr" rotWithShape="0">
                       <a:srgbClr val="000000">
@@ -35413,7 +35414,7 @@
             <a:effectLst/>
             <a:extLst>
               <a:ext uri="{91240B29-F687-4f45-9708-019B960494DF}">
-                <a14:hiddenLine xmlns:a14="http://schemas.microsoft.com/office/drawing/2010/main" xmlns="" w="9525" cap="flat">
+                <a14:hiddenLine xmlns="" xmlns:a14="http://schemas.microsoft.com/office/drawing/2010/main" w="9525" cap="flat">
                   <a:solidFill>
                     <a:srgbClr val="808080"/>
                   </a:solidFill>
@@ -35423,7 +35424,7 @@
                 </a14:hiddenLine>
               </a:ext>
               <a:ext uri="{AF507438-7753-43e0-B8FC-AC1667EBCBE1}">
-                <a14:hiddenEffects xmlns:a14="http://schemas.microsoft.com/office/drawing/2010/main" xmlns="">
+                <a14:hiddenEffects xmlns="" xmlns:a14="http://schemas.microsoft.com/office/drawing/2010/main">
                   <a:effectLst>
                     <a:outerShdw blurRad="63500" dist="38099" dir="2700000" algn="ctr" rotWithShape="0">
                       <a:srgbClr val="000000">
@@ -35555,7 +35556,7 @@
             <a:effectLst/>
             <a:extLst>
               <a:ext uri="{91240B29-F687-4f45-9708-019B960494DF}">
-                <a14:hiddenLine xmlns:a14="http://schemas.microsoft.com/office/drawing/2010/main" xmlns="" w="9525" cap="flat">
+                <a14:hiddenLine xmlns="" xmlns:a14="http://schemas.microsoft.com/office/drawing/2010/main" w="9525" cap="flat">
                   <a:solidFill>
                     <a:srgbClr val="808080"/>
                   </a:solidFill>
@@ -35565,7 +35566,7 @@
                 </a14:hiddenLine>
               </a:ext>
               <a:ext uri="{AF507438-7753-43e0-B8FC-AC1667EBCBE1}">
-                <a14:hiddenEffects xmlns:a14="http://schemas.microsoft.com/office/drawing/2010/main" xmlns="">
+                <a14:hiddenEffects xmlns="" xmlns:a14="http://schemas.microsoft.com/office/drawing/2010/main">
                   <a:effectLst>
                     <a:outerShdw blurRad="63500" dist="38099" dir="2700000" algn="ctr" rotWithShape="0">
                       <a:srgbClr val="000000">
@@ -35671,7 +35672,7 @@
             <a:effectLst/>
             <a:extLst>
               <a:ext uri="{91240B29-F687-4f45-9708-019B960494DF}">
-                <a14:hiddenLine xmlns:a14="http://schemas.microsoft.com/office/drawing/2010/main" xmlns="" w="9525" cap="flat">
+                <a14:hiddenLine xmlns="" xmlns:a14="http://schemas.microsoft.com/office/drawing/2010/main" w="9525" cap="flat">
                   <a:solidFill>
                     <a:srgbClr val="808080"/>
                   </a:solidFill>
@@ -35681,7 +35682,7 @@
                 </a14:hiddenLine>
               </a:ext>
               <a:ext uri="{AF507438-7753-43e0-B8FC-AC1667EBCBE1}">
-                <a14:hiddenEffects xmlns:a14="http://schemas.microsoft.com/office/drawing/2010/main" xmlns="">
+                <a14:hiddenEffects xmlns="" xmlns:a14="http://schemas.microsoft.com/office/drawing/2010/main">
                   <a:effectLst>
                     <a:outerShdw blurRad="63500" dist="38099" dir="2700000" algn="ctr" rotWithShape="0">
                       <a:srgbClr val="000000">
@@ -35895,7 +35896,7 @@
             <a:effectLst/>
             <a:extLst>
               <a:ext uri="{91240B29-F687-4f45-9708-019B960494DF}">
-                <a14:hiddenLine xmlns:a14="http://schemas.microsoft.com/office/drawing/2010/main" xmlns="" w="9525" cap="flat">
+                <a14:hiddenLine xmlns="" xmlns:a14="http://schemas.microsoft.com/office/drawing/2010/main" w="9525" cap="flat">
                   <a:solidFill>
                     <a:srgbClr val="808080"/>
                   </a:solidFill>
@@ -35905,7 +35906,7 @@
                 </a14:hiddenLine>
               </a:ext>
               <a:ext uri="{AF507438-7753-43e0-B8FC-AC1667EBCBE1}">
-                <a14:hiddenEffects xmlns:a14="http://schemas.microsoft.com/office/drawing/2010/main" xmlns="">
+                <a14:hiddenEffects xmlns="" xmlns:a14="http://schemas.microsoft.com/office/drawing/2010/main">
                   <a:effectLst>
                     <a:outerShdw blurRad="63500" dist="38099" dir="2700000" algn="ctr" rotWithShape="0">
                       <a:srgbClr val="000000">
@@ -36121,7 +36122,7 @@
             <a:effectLst/>
             <a:extLst>
               <a:ext uri="{91240B29-F687-4f45-9708-019B960494DF}">
-                <a14:hiddenLine xmlns:a14="http://schemas.microsoft.com/office/drawing/2010/main" xmlns="" w="9525" cap="flat">
+                <a14:hiddenLine xmlns="" xmlns:a14="http://schemas.microsoft.com/office/drawing/2010/main" w="9525" cap="flat">
                   <a:solidFill>
                     <a:srgbClr val="808080"/>
                   </a:solidFill>
@@ -36131,7 +36132,7 @@
                 </a14:hiddenLine>
               </a:ext>
               <a:ext uri="{AF507438-7753-43e0-B8FC-AC1667EBCBE1}">
-                <a14:hiddenEffects xmlns:a14="http://schemas.microsoft.com/office/drawing/2010/main" xmlns="">
+                <a14:hiddenEffects xmlns="" xmlns:a14="http://schemas.microsoft.com/office/drawing/2010/main">
                   <a:effectLst>
                     <a:outerShdw blurRad="63500" dist="38099" dir="2700000" algn="ctr" rotWithShape="0">
                       <a:srgbClr val="000000">
@@ -36337,7 +36338,7 @@
             <a:effectLst/>
             <a:extLst>
               <a:ext uri="{91240B29-F687-4f45-9708-019B960494DF}">
-                <a14:hiddenLine xmlns:a14="http://schemas.microsoft.com/office/drawing/2010/main" xmlns="" w="9525" cap="flat">
+                <a14:hiddenLine xmlns="" xmlns:a14="http://schemas.microsoft.com/office/drawing/2010/main" w="9525" cap="flat">
                   <a:solidFill>
                     <a:srgbClr val="808080"/>
                   </a:solidFill>
@@ -36347,7 +36348,7 @@
                 </a14:hiddenLine>
               </a:ext>
               <a:ext uri="{AF507438-7753-43e0-B8FC-AC1667EBCBE1}">
-                <a14:hiddenEffects xmlns:a14="http://schemas.microsoft.com/office/drawing/2010/main" xmlns="">
+                <a14:hiddenEffects xmlns="" xmlns:a14="http://schemas.microsoft.com/office/drawing/2010/main">
                   <a:effectLst>
                     <a:outerShdw blurRad="63500" dist="38099" dir="2700000" algn="ctr" rotWithShape="0">
                       <a:srgbClr val="000000">
@@ -36555,7 +36556,7 @@
             <a:effectLst/>
             <a:extLst>
               <a:ext uri="{91240B29-F687-4f45-9708-019B960494DF}">
-                <a14:hiddenLine xmlns:a14="http://schemas.microsoft.com/office/drawing/2010/main" xmlns="" w="9525" cap="flat">
+                <a14:hiddenLine xmlns="" xmlns:a14="http://schemas.microsoft.com/office/drawing/2010/main" w="9525" cap="flat">
                   <a:solidFill>
                     <a:srgbClr val="808080"/>
                   </a:solidFill>
@@ -36565,7 +36566,7 @@
                 </a14:hiddenLine>
               </a:ext>
               <a:ext uri="{AF507438-7753-43e0-B8FC-AC1667EBCBE1}">
-                <a14:hiddenEffects xmlns:a14="http://schemas.microsoft.com/office/drawing/2010/main" xmlns="">
+                <a14:hiddenEffects xmlns="" xmlns:a14="http://schemas.microsoft.com/office/drawing/2010/main">
                   <a:effectLst>
                     <a:outerShdw blurRad="63500" dist="38099" dir="2700000" algn="ctr" rotWithShape="0">
                       <a:srgbClr val="000000">
@@ -36783,7 +36784,7 @@
             <a:effectLst/>
             <a:extLst>
               <a:ext uri="{91240B29-F687-4f45-9708-019B960494DF}">
-                <a14:hiddenLine xmlns:a14="http://schemas.microsoft.com/office/drawing/2010/main" xmlns="" w="9525" cap="flat">
+                <a14:hiddenLine xmlns="" xmlns:a14="http://schemas.microsoft.com/office/drawing/2010/main" w="9525" cap="flat">
                   <a:solidFill>
                     <a:srgbClr val="808080"/>
                   </a:solidFill>
@@ -36793,7 +36794,7 @@
                 </a14:hiddenLine>
               </a:ext>
               <a:ext uri="{AF507438-7753-43e0-B8FC-AC1667EBCBE1}">
-                <a14:hiddenEffects xmlns:a14="http://schemas.microsoft.com/office/drawing/2010/main" xmlns="">
+                <a14:hiddenEffects xmlns="" xmlns:a14="http://schemas.microsoft.com/office/drawing/2010/main">
                   <a:effectLst>
                     <a:outerShdw blurRad="63500" dist="38099" dir="2700000" algn="ctr" rotWithShape="0">
                       <a:srgbClr val="000000">
@@ -36981,7 +36982,7 @@
             <a:effectLst/>
             <a:extLst>
               <a:ext uri="{91240B29-F687-4f45-9708-019B960494DF}">
-                <a14:hiddenLine xmlns:a14="http://schemas.microsoft.com/office/drawing/2010/main" xmlns="" w="9525" cap="flat">
+                <a14:hiddenLine xmlns="" xmlns:a14="http://schemas.microsoft.com/office/drawing/2010/main" w="9525" cap="flat">
                   <a:solidFill>
                     <a:srgbClr val="808080"/>
                   </a:solidFill>
@@ -36991,7 +36992,7 @@
                 </a14:hiddenLine>
               </a:ext>
               <a:ext uri="{AF507438-7753-43e0-B8FC-AC1667EBCBE1}">
-                <a14:hiddenEffects xmlns:a14="http://schemas.microsoft.com/office/drawing/2010/main" xmlns="">
+                <a14:hiddenEffects xmlns="" xmlns:a14="http://schemas.microsoft.com/office/drawing/2010/main">
                   <a:effectLst>
                     <a:outerShdw blurRad="63500" dist="38099" dir="2700000" algn="ctr" rotWithShape="0">
                       <a:srgbClr val="000000">
@@ -37195,7 +37196,7 @@
             <a:effectLst/>
             <a:extLst>
               <a:ext uri="{91240B29-F687-4f45-9708-019B960494DF}">
-                <a14:hiddenLine xmlns:a14="http://schemas.microsoft.com/office/drawing/2010/main" xmlns="" w="9525" cap="flat">
+                <a14:hiddenLine xmlns="" xmlns:a14="http://schemas.microsoft.com/office/drawing/2010/main" w="9525" cap="flat">
                   <a:solidFill>
                     <a:srgbClr val="808080"/>
                   </a:solidFill>
@@ -37205,7 +37206,7 @@
                 </a14:hiddenLine>
               </a:ext>
               <a:ext uri="{AF507438-7753-43e0-B8FC-AC1667EBCBE1}">
-                <a14:hiddenEffects xmlns:a14="http://schemas.microsoft.com/office/drawing/2010/main" xmlns="">
+                <a14:hiddenEffects xmlns="" xmlns:a14="http://schemas.microsoft.com/office/drawing/2010/main">
                   <a:effectLst>
                     <a:outerShdw blurRad="63500" dist="38099" dir="2700000" algn="ctr" rotWithShape="0">
                       <a:srgbClr val="000000">
@@ -37423,7 +37424,7 @@
             <a:effectLst/>
             <a:extLst>
               <a:ext uri="{91240B29-F687-4f45-9708-019B960494DF}">
-                <a14:hiddenLine xmlns:a14="http://schemas.microsoft.com/office/drawing/2010/main" xmlns="" w="9525" cap="flat">
+                <a14:hiddenLine xmlns="" xmlns:a14="http://schemas.microsoft.com/office/drawing/2010/main" w="9525" cap="flat">
                   <a:solidFill>
                     <a:srgbClr val="808080"/>
                   </a:solidFill>
@@ -37433,7 +37434,7 @@
                 </a14:hiddenLine>
               </a:ext>
               <a:ext uri="{AF507438-7753-43e0-B8FC-AC1667EBCBE1}">
-                <a14:hiddenEffects xmlns:a14="http://schemas.microsoft.com/office/drawing/2010/main" xmlns="">
+                <a14:hiddenEffects xmlns="" xmlns:a14="http://schemas.microsoft.com/office/drawing/2010/main">
                   <a:effectLst>
                     <a:outerShdw blurRad="63500" dist="38099" dir="2700000" algn="ctr" rotWithShape="0">
                       <a:srgbClr val="000000">
@@ -37629,7 +37630,7 @@
             <a:effectLst/>
             <a:extLst>
               <a:ext uri="{91240B29-F687-4f45-9708-019B960494DF}">
-                <a14:hiddenLine xmlns:a14="http://schemas.microsoft.com/office/drawing/2010/main" xmlns="" w="9525" cap="flat">
+                <a14:hiddenLine xmlns="" xmlns:a14="http://schemas.microsoft.com/office/drawing/2010/main" w="9525" cap="flat">
                   <a:solidFill>
                     <a:srgbClr val="808080"/>
                   </a:solidFill>
@@ -37639,7 +37640,7 @@
                 </a14:hiddenLine>
               </a:ext>
               <a:ext uri="{AF507438-7753-43e0-B8FC-AC1667EBCBE1}">
-                <a14:hiddenEffects xmlns:a14="http://schemas.microsoft.com/office/drawing/2010/main" xmlns="">
+                <a14:hiddenEffects xmlns="" xmlns:a14="http://schemas.microsoft.com/office/drawing/2010/main">
                   <a:effectLst>
                     <a:outerShdw blurRad="63500" dist="38099" dir="2700000" algn="ctr" rotWithShape="0">
                       <a:srgbClr val="000000">
@@ -37737,7 +37738,7 @@
             <a:effectLst/>
             <a:extLst>
               <a:ext uri="{91240B29-F687-4f45-9708-019B960494DF}">
-                <a14:hiddenLine xmlns:a14="http://schemas.microsoft.com/office/drawing/2010/main" xmlns="" w="9525" cap="flat">
+                <a14:hiddenLine xmlns="" xmlns:a14="http://schemas.microsoft.com/office/drawing/2010/main" w="9525" cap="flat">
                   <a:solidFill>
                     <a:srgbClr val="808080"/>
                   </a:solidFill>
@@ -37747,7 +37748,7 @@
                 </a14:hiddenLine>
               </a:ext>
               <a:ext uri="{AF507438-7753-43e0-B8FC-AC1667EBCBE1}">
-                <a14:hiddenEffects xmlns:a14="http://schemas.microsoft.com/office/drawing/2010/main" xmlns="">
+                <a14:hiddenEffects xmlns="" xmlns:a14="http://schemas.microsoft.com/office/drawing/2010/main">
                   <a:effectLst>
                     <a:outerShdw blurRad="63500" dist="38099" dir="2700000" algn="ctr" rotWithShape="0">
                       <a:srgbClr val="000000">
@@ -38389,7 +38390,7 @@
             <a:effectLst/>
             <a:extLst>
               <a:ext uri="{91240B29-F687-4f45-9708-019B960494DF}">
-                <a14:hiddenLine xmlns:a14="http://schemas.microsoft.com/office/drawing/2010/main" xmlns="" w="9525" cap="flat">
+                <a14:hiddenLine xmlns="" xmlns:a14="http://schemas.microsoft.com/office/drawing/2010/main" w="9525" cap="flat">
                   <a:solidFill>
                     <a:srgbClr val="808080"/>
                   </a:solidFill>
@@ -38399,7 +38400,7 @@
                 </a14:hiddenLine>
               </a:ext>
               <a:ext uri="{AF507438-7753-43e0-B8FC-AC1667EBCBE1}">
-                <a14:hiddenEffects xmlns:a14="http://schemas.microsoft.com/office/drawing/2010/main" xmlns="">
+                <a14:hiddenEffects xmlns="" xmlns:a14="http://schemas.microsoft.com/office/drawing/2010/main">
                   <a:effectLst>
                     <a:outerShdw blurRad="63500" dist="38099" dir="2700000" algn="ctr" rotWithShape="0">
                       <a:srgbClr val="000000">
@@ -38531,7 +38532,7 @@
             <a:effectLst/>
             <a:extLst>
               <a:ext uri="{91240B29-F687-4f45-9708-019B960494DF}">
-                <a14:hiddenLine xmlns:a14="http://schemas.microsoft.com/office/drawing/2010/main" xmlns="" w="9525" cap="flat">
+                <a14:hiddenLine xmlns="" xmlns:a14="http://schemas.microsoft.com/office/drawing/2010/main" w="9525" cap="flat">
                   <a:solidFill>
                     <a:srgbClr val="808080"/>
                   </a:solidFill>
@@ -38541,7 +38542,7 @@
                 </a14:hiddenLine>
               </a:ext>
               <a:ext uri="{AF507438-7753-43e0-B8FC-AC1667EBCBE1}">
-                <a14:hiddenEffects xmlns:a14="http://schemas.microsoft.com/office/drawing/2010/main" xmlns="">
+                <a14:hiddenEffects xmlns="" xmlns:a14="http://schemas.microsoft.com/office/drawing/2010/main">
                   <a:effectLst>
                     <a:outerShdw blurRad="63500" dist="38099" dir="2700000" algn="ctr" rotWithShape="0">
                       <a:srgbClr val="000000">
@@ -38709,7 +38710,7 @@
             <a:effectLst/>
             <a:extLst>
               <a:ext uri="{91240B29-F687-4f45-9708-019B960494DF}">
-                <a14:hiddenLine xmlns:a14="http://schemas.microsoft.com/office/drawing/2010/main" xmlns="" w="9525" cap="flat">
+                <a14:hiddenLine xmlns="" xmlns:a14="http://schemas.microsoft.com/office/drawing/2010/main" w="9525" cap="flat">
                   <a:solidFill>
                     <a:srgbClr val="808080"/>
                   </a:solidFill>
@@ -38719,7 +38720,7 @@
                 </a14:hiddenLine>
               </a:ext>
               <a:ext uri="{AF507438-7753-43e0-B8FC-AC1667EBCBE1}">
-                <a14:hiddenEffects xmlns:a14="http://schemas.microsoft.com/office/drawing/2010/main" xmlns="">
+                <a14:hiddenEffects xmlns="" xmlns:a14="http://schemas.microsoft.com/office/drawing/2010/main">
                   <a:effectLst>
                     <a:outerShdw blurRad="63500" dist="38099" dir="2700000" algn="ctr" rotWithShape="0">
                       <a:srgbClr val="000000">
@@ -38825,7 +38826,7 @@
             <a:effectLst/>
             <a:extLst>
               <a:ext uri="{91240B29-F687-4f45-9708-019B960494DF}">
-                <a14:hiddenLine xmlns:a14="http://schemas.microsoft.com/office/drawing/2010/main" xmlns="" w="9525" cap="flat">
+                <a14:hiddenLine xmlns="" xmlns:a14="http://schemas.microsoft.com/office/drawing/2010/main" w="9525" cap="flat">
                   <a:solidFill>
                     <a:srgbClr val="808080"/>
                   </a:solidFill>
@@ -38835,7 +38836,7 @@
                 </a14:hiddenLine>
               </a:ext>
               <a:ext uri="{AF507438-7753-43e0-B8FC-AC1667EBCBE1}">
-                <a14:hiddenEffects xmlns:a14="http://schemas.microsoft.com/office/drawing/2010/main" xmlns="">
+                <a14:hiddenEffects xmlns="" xmlns:a14="http://schemas.microsoft.com/office/drawing/2010/main">
                   <a:effectLst>
                     <a:outerShdw blurRad="63500" dist="38099" dir="2700000" algn="ctr" rotWithShape="0">
                       <a:srgbClr val="000000">
@@ -39013,7 +39014,7 @@
             <a:effectLst/>
             <a:extLst>
               <a:ext uri="{91240B29-F687-4f45-9708-019B960494DF}">
-                <a14:hiddenLine xmlns:a14="http://schemas.microsoft.com/office/drawing/2010/main" xmlns="" w="9525" cap="flat">
+                <a14:hiddenLine xmlns="" xmlns:a14="http://schemas.microsoft.com/office/drawing/2010/main" w="9525" cap="flat">
                   <a:solidFill>
                     <a:srgbClr val="808080"/>
                   </a:solidFill>
@@ -39023,7 +39024,7 @@
                 </a14:hiddenLine>
               </a:ext>
               <a:ext uri="{AF507438-7753-43e0-B8FC-AC1667EBCBE1}">
-                <a14:hiddenEffects xmlns:a14="http://schemas.microsoft.com/office/drawing/2010/main" xmlns="">
+                <a14:hiddenEffects xmlns="" xmlns:a14="http://schemas.microsoft.com/office/drawing/2010/main">
                   <a:effectLst>
                     <a:outerShdw blurRad="63500" dist="38099" dir="2700000" algn="ctr" rotWithShape="0">
                       <a:srgbClr val="000000">
@@ -39129,7 +39130,7 @@
             <a:effectLst/>
             <a:extLst>
               <a:ext uri="{91240B29-F687-4f45-9708-019B960494DF}">
-                <a14:hiddenLine xmlns:a14="http://schemas.microsoft.com/office/drawing/2010/main" xmlns="" w="9525" cap="flat">
+                <a14:hiddenLine xmlns="" xmlns:a14="http://schemas.microsoft.com/office/drawing/2010/main" w="9525" cap="flat">
                   <a:solidFill>
                     <a:srgbClr val="808080"/>
                   </a:solidFill>
@@ -39139,7 +39140,7 @@
                 </a14:hiddenLine>
               </a:ext>
               <a:ext uri="{AF507438-7753-43e0-B8FC-AC1667EBCBE1}">
-                <a14:hiddenEffects xmlns:a14="http://schemas.microsoft.com/office/drawing/2010/main" xmlns="">
+                <a14:hiddenEffects xmlns="" xmlns:a14="http://schemas.microsoft.com/office/drawing/2010/main">
                   <a:effectLst>
                     <a:outerShdw blurRad="63500" dist="38099" dir="2700000" algn="ctr" rotWithShape="0">
                       <a:srgbClr val="000000">
@@ -39461,7 +39462,7 @@
             <a:effectLst/>
             <a:extLst>
               <a:ext uri="{91240B29-F687-4f45-9708-019B960494DF}">
-                <a14:hiddenLine xmlns:a14="http://schemas.microsoft.com/office/drawing/2010/main" xmlns="" w="9525" cap="flat">
+                <a14:hiddenLine xmlns="" xmlns:a14="http://schemas.microsoft.com/office/drawing/2010/main" w="9525" cap="flat">
                   <a:solidFill>
                     <a:srgbClr val="808080"/>
                   </a:solidFill>
@@ -39471,7 +39472,7 @@
                 </a14:hiddenLine>
               </a:ext>
               <a:ext uri="{AF507438-7753-43e0-B8FC-AC1667EBCBE1}">
-                <a14:hiddenEffects xmlns:a14="http://schemas.microsoft.com/office/drawing/2010/main" xmlns="">
+                <a14:hiddenEffects xmlns="" xmlns:a14="http://schemas.microsoft.com/office/drawing/2010/main">
                   <a:effectLst>
                     <a:outerShdw blurRad="63500" dist="38099" dir="2700000" algn="ctr" rotWithShape="0">
                       <a:srgbClr val="000000">
@@ -39603,7 +39604,7 @@
             <a:effectLst/>
             <a:extLst>
               <a:ext uri="{91240B29-F687-4f45-9708-019B960494DF}">
-                <a14:hiddenLine xmlns:a14="http://schemas.microsoft.com/office/drawing/2010/main" xmlns="" w="9525" cap="flat">
+                <a14:hiddenLine xmlns="" xmlns:a14="http://schemas.microsoft.com/office/drawing/2010/main" w="9525" cap="flat">
                   <a:solidFill>
                     <a:srgbClr val="808080"/>
                   </a:solidFill>
@@ -39613,7 +39614,7 @@
                 </a14:hiddenLine>
               </a:ext>
               <a:ext uri="{AF507438-7753-43e0-B8FC-AC1667EBCBE1}">
-                <a14:hiddenEffects xmlns:a14="http://schemas.microsoft.com/office/drawing/2010/main" xmlns="">
+                <a14:hiddenEffects xmlns="" xmlns:a14="http://schemas.microsoft.com/office/drawing/2010/main">
                   <a:effectLst>
                     <a:outerShdw blurRad="63500" dist="38099" dir="2700000" algn="ctr" rotWithShape="0">
                       <a:srgbClr val="000000">
@@ -39819,7 +39820,7 @@
             <a:effectLst/>
             <a:extLst>
               <a:ext uri="{91240B29-F687-4f45-9708-019B960494DF}">
-                <a14:hiddenLine xmlns:a14="http://schemas.microsoft.com/office/drawing/2010/main" xmlns="" w="9525" cap="flat">
+                <a14:hiddenLine xmlns="" xmlns:a14="http://schemas.microsoft.com/office/drawing/2010/main" w="9525" cap="flat">
                   <a:solidFill>
                     <a:srgbClr val="808080"/>
                   </a:solidFill>
@@ -39829,7 +39830,7 @@
                 </a14:hiddenLine>
               </a:ext>
               <a:ext uri="{AF507438-7753-43e0-B8FC-AC1667EBCBE1}">
-                <a14:hiddenEffects xmlns:a14="http://schemas.microsoft.com/office/drawing/2010/main" xmlns="">
+                <a14:hiddenEffects xmlns="" xmlns:a14="http://schemas.microsoft.com/office/drawing/2010/main">
                   <a:effectLst>
                     <a:outerShdw blurRad="63500" dist="38099" dir="2700000" algn="ctr" rotWithShape="0">
                       <a:srgbClr val="000000">
@@ -40071,7 +40072,7 @@
             <a:effectLst/>
             <a:extLst>
               <a:ext uri="{91240B29-F687-4f45-9708-019B960494DF}">
-                <a14:hiddenLine xmlns:a14="http://schemas.microsoft.com/office/drawing/2010/main" xmlns="" w="9525" cap="flat">
+                <a14:hiddenLine xmlns="" xmlns:a14="http://schemas.microsoft.com/office/drawing/2010/main" w="9525" cap="flat">
                   <a:solidFill>
                     <a:srgbClr val="808080"/>
                   </a:solidFill>
@@ -40081,7 +40082,7 @@
                 </a14:hiddenLine>
               </a:ext>
               <a:ext uri="{AF507438-7753-43e0-B8FC-AC1667EBCBE1}">
-                <a14:hiddenEffects xmlns:a14="http://schemas.microsoft.com/office/drawing/2010/main" xmlns="">
+                <a14:hiddenEffects xmlns="" xmlns:a14="http://schemas.microsoft.com/office/drawing/2010/main">
                   <a:effectLst>
                     <a:outerShdw blurRad="63500" dist="38099" dir="2700000" algn="ctr" rotWithShape="0">
                       <a:srgbClr val="000000">
@@ -40323,7 +40324,7 @@
             <a:effectLst/>
             <a:extLst>
               <a:ext uri="{91240B29-F687-4f45-9708-019B960494DF}">
-                <a14:hiddenLine xmlns:a14="http://schemas.microsoft.com/office/drawing/2010/main" xmlns="" w="9525" cap="flat">
+                <a14:hiddenLine xmlns="" xmlns:a14="http://schemas.microsoft.com/office/drawing/2010/main" w="9525" cap="flat">
                   <a:solidFill>
                     <a:srgbClr val="808080"/>
                   </a:solidFill>
@@ -40333,7 +40334,7 @@
                 </a14:hiddenLine>
               </a:ext>
               <a:ext uri="{AF507438-7753-43e0-B8FC-AC1667EBCBE1}">
-                <a14:hiddenEffects xmlns:a14="http://schemas.microsoft.com/office/drawing/2010/main" xmlns="">
+                <a14:hiddenEffects xmlns="" xmlns:a14="http://schemas.microsoft.com/office/drawing/2010/main">
                   <a:effectLst>
                     <a:outerShdw blurRad="63500" dist="38099" dir="2700000" algn="ctr" rotWithShape="0">
                       <a:srgbClr val="000000">
@@ -40465,7 +40466,7 @@
             <a:effectLst/>
             <a:extLst>
               <a:ext uri="{91240B29-F687-4f45-9708-019B960494DF}">
-                <a14:hiddenLine xmlns:a14="http://schemas.microsoft.com/office/drawing/2010/main" xmlns="" w="9525" cap="flat">
+                <a14:hiddenLine xmlns="" xmlns:a14="http://schemas.microsoft.com/office/drawing/2010/main" w="9525" cap="flat">
                   <a:solidFill>
                     <a:srgbClr val="808080"/>
                   </a:solidFill>
@@ -40475,7 +40476,7 @@
                 </a14:hiddenLine>
               </a:ext>
               <a:ext uri="{AF507438-7753-43e0-B8FC-AC1667EBCBE1}">
-                <a14:hiddenEffects xmlns:a14="http://schemas.microsoft.com/office/drawing/2010/main" xmlns="">
+                <a14:hiddenEffects xmlns="" xmlns:a14="http://schemas.microsoft.com/office/drawing/2010/main">
                   <a:effectLst>
                     <a:outerShdw blurRad="63500" dist="38099" dir="2700000" algn="ctr" rotWithShape="0">
                       <a:srgbClr val="000000">
@@ -40581,7 +40582,7 @@
             <a:effectLst/>
             <a:extLst>
               <a:ext uri="{91240B29-F687-4f45-9708-019B960494DF}">
-                <a14:hiddenLine xmlns:a14="http://schemas.microsoft.com/office/drawing/2010/main" xmlns="" w="9525" cap="flat">
+                <a14:hiddenLine xmlns="" xmlns:a14="http://schemas.microsoft.com/office/drawing/2010/main" w="9525" cap="flat">
                   <a:solidFill>
                     <a:srgbClr val="808080"/>
                   </a:solidFill>
@@ -40591,7 +40592,7 @@
                 </a14:hiddenLine>
               </a:ext>
               <a:ext uri="{AF507438-7753-43e0-B8FC-AC1667EBCBE1}">
-                <a14:hiddenEffects xmlns:a14="http://schemas.microsoft.com/office/drawing/2010/main" xmlns="">
+                <a14:hiddenEffects xmlns="" xmlns:a14="http://schemas.microsoft.com/office/drawing/2010/main">
                   <a:effectLst>
                     <a:outerShdw blurRad="63500" dist="38099" dir="2700000" algn="ctr" rotWithShape="0">
                       <a:srgbClr val="000000">
@@ -40805,7 +40806,7 @@
             <a:effectLst/>
             <a:extLst>
               <a:ext uri="{91240B29-F687-4f45-9708-019B960494DF}">
-                <a14:hiddenLine xmlns:a14="http://schemas.microsoft.com/office/drawing/2010/main" xmlns="" w="9525" cap="flat">
+                <a14:hiddenLine xmlns="" xmlns:a14="http://schemas.microsoft.com/office/drawing/2010/main" w="9525" cap="flat">
                   <a:solidFill>
                     <a:srgbClr val="808080"/>
                   </a:solidFill>
@@ -40815,7 +40816,7 @@
                 </a14:hiddenLine>
               </a:ext>
               <a:ext uri="{AF507438-7753-43e0-B8FC-AC1667EBCBE1}">
-                <a14:hiddenEffects xmlns:a14="http://schemas.microsoft.com/office/drawing/2010/main" xmlns="">
+                <a14:hiddenEffects xmlns="" xmlns:a14="http://schemas.microsoft.com/office/drawing/2010/main">
                   <a:effectLst>
                     <a:outerShdw blurRad="63500" dist="38099" dir="2700000" algn="ctr" rotWithShape="0">
                       <a:srgbClr val="000000">
@@ -41031,7 +41032,7 @@
             <a:effectLst/>
             <a:extLst>
               <a:ext uri="{91240B29-F687-4f45-9708-019B960494DF}">
-                <a14:hiddenLine xmlns:a14="http://schemas.microsoft.com/office/drawing/2010/main" xmlns="" w="9525" cap="flat">
+                <a14:hiddenLine xmlns="" xmlns:a14="http://schemas.microsoft.com/office/drawing/2010/main" w="9525" cap="flat">
                   <a:solidFill>
                     <a:srgbClr val="808080"/>
                   </a:solidFill>
@@ -41041,7 +41042,7 @@
                 </a14:hiddenLine>
               </a:ext>
               <a:ext uri="{AF507438-7753-43e0-B8FC-AC1667EBCBE1}">
-                <a14:hiddenEffects xmlns:a14="http://schemas.microsoft.com/office/drawing/2010/main" xmlns="">
+                <a14:hiddenEffects xmlns="" xmlns:a14="http://schemas.microsoft.com/office/drawing/2010/main">
                   <a:effectLst>
                     <a:outerShdw blurRad="63500" dist="38099" dir="2700000" algn="ctr" rotWithShape="0">
                       <a:srgbClr val="000000">
@@ -41247,7 +41248,7 @@
             <a:effectLst/>
             <a:extLst>
               <a:ext uri="{91240B29-F687-4f45-9708-019B960494DF}">
-                <a14:hiddenLine xmlns:a14="http://schemas.microsoft.com/office/drawing/2010/main" xmlns="" w="9525" cap="flat">
+                <a14:hiddenLine xmlns="" xmlns:a14="http://schemas.microsoft.com/office/drawing/2010/main" w="9525" cap="flat">
                   <a:solidFill>
                     <a:srgbClr val="808080"/>
                   </a:solidFill>
@@ -41257,7 +41258,7 @@
                 </a14:hiddenLine>
               </a:ext>
               <a:ext uri="{AF507438-7753-43e0-B8FC-AC1667EBCBE1}">
-                <a14:hiddenEffects xmlns:a14="http://schemas.microsoft.com/office/drawing/2010/main" xmlns="">
+                <a14:hiddenEffects xmlns="" xmlns:a14="http://schemas.microsoft.com/office/drawing/2010/main">
                   <a:effectLst>
                     <a:outerShdw blurRad="63500" dist="38099" dir="2700000" algn="ctr" rotWithShape="0">
                       <a:srgbClr val="000000">
@@ -41465,7 +41466,7 @@
             <a:effectLst/>
             <a:extLst>
               <a:ext uri="{91240B29-F687-4f45-9708-019B960494DF}">
-                <a14:hiddenLine xmlns:a14="http://schemas.microsoft.com/office/drawing/2010/main" xmlns="" w="9525" cap="flat">
+                <a14:hiddenLine xmlns="" xmlns:a14="http://schemas.microsoft.com/office/drawing/2010/main" w="9525" cap="flat">
                   <a:solidFill>
                     <a:srgbClr val="808080"/>
                   </a:solidFill>
@@ -41475,7 +41476,7 @@
                 </a14:hiddenLine>
               </a:ext>
               <a:ext uri="{AF507438-7753-43e0-B8FC-AC1667EBCBE1}">
-                <a14:hiddenEffects xmlns:a14="http://schemas.microsoft.com/office/drawing/2010/main" xmlns="">
+                <a14:hiddenEffects xmlns="" xmlns:a14="http://schemas.microsoft.com/office/drawing/2010/main">
                   <a:effectLst>
                     <a:outerShdw blurRad="63500" dist="38099" dir="2700000" algn="ctr" rotWithShape="0">
                       <a:srgbClr val="000000">
@@ -41693,7 +41694,7 @@
             <a:effectLst/>
             <a:extLst>
               <a:ext uri="{91240B29-F687-4f45-9708-019B960494DF}">
-                <a14:hiddenLine xmlns:a14="http://schemas.microsoft.com/office/drawing/2010/main" xmlns="" w="9525" cap="flat">
+                <a14:hiddenLine xmlns="" xmlns:a14="http://schemas.microsoft.com/office/drawing/2010/main" w="9525" cap="flat">
                   <a:solidFill>
                     <a:srgbClr val="808080"/>
                   </a:solidFill>
@@ -41703,7 +41704,7 @@
                 </a14:hiddenLine>
               </a:ext>
               <a:ext uri="{AF507438-7753-43e0-B8FC-AC1667EBCBE1}">
-                <a14:hiddenEffects xmlns:a14="http://schemas.microsoft.com/office/drawing/2010/main" xmlns="">
+                <a14:hiddenEffects xmlns="" xmlns:a14="http://schemas.microsoft.com/office/drawing/2010/main">
                   <a:effectLst>
                     <a:outerShdw blurRad="63500" dist="38099" dir="2700000" algn="ctr" rotWithShape="0">
                       <a:srgbClr val="000000">
@@ -41891,7 +41892,7 @@
             <a:effectLst/>
             <a:extLst>
               <a:ext uri="{91240B29-F687-4f45-9708-019B960494DF}">
-                <a14:hiddenLine xmlns:a14="http://schemas.microsoft.com/office/drawing/2010/main" xmlns="" w="9525" cap="flat">
+                <a14:hiddenLine xmlns="" xmlns:a14="http://schemas.microsoft.com/office/drawing/2010/main" w="9525" cap="flat">
                   <a:solidFill>
                     <a:srgbClr val="808080"/>
                   </a:solidFill>
@@ -41901,7 +41902,7 @@
                 </a14:hiddenLine>
               </a:ext>
               <a:ext uri="{AF507438-7753-43e0-B8FC-AC1667EBCBE1}">
-                <a14:hiddenEffects xmlns:a14="http://schemas.microsoft.com/office/drawing/2010/main" xmlns="">
+                <a14:hiddenEffects xmlns="" xmlns:a14="http://schemas.microsoft.com/office/drawing/2010/main">
                   <a:effectLst>
                     <a:outerShdw blurRad="63500" dist="38099" dir="2700000" algn="ctr" rotWithShape="0">
                       <a:srgbClr val="000000">
@@ -42105,7 +42106,7 @@
             <a:effectLst/>
             <a:extLst>
               <a:ext uri="{91240B29-F687-4f45-9708-019B960494DF}">
-                <a14:hiddenLine xmlns:a14="http://schemas.microsoft.com/office/drawing/2010/main" xmlns="" w="9525" cap="flat">
+                <a14:hiddenLine xmlns="" xmlns:a14="http://schemas.microsoft.com/office/drawing/2010/main" w="9525" cap="flat">
                   <a:solidFill>
                     <a:srgbClr val="808080"/>
                   </a:solidFill>
@@ -42115,7 +42116,7 @@
                 </a14:hiddenLine>
               </a:ext>
               <a:ext uri="{AF507438-7753-43e0-B8FC-AC1667EBCBE1}">
-                <a14:hiddenEffects xmlns:a14="http://schemas.microsoft.com/office/drawing/2010/main" xmlns="">
+                <a14:hiddenEffects xmlns="" xmlns:a14="http://schemas.microsoft.com/office/drawing/2010/main">
                   <a:effectLst>
                     <a:outerShdw blurRad="63500" dist="38099" dir="2700000" algn="ctr" rotWithShape="0">
                       <a:srgbClr val="000000">
@@ -42333,7 +42334,7 @@
             <a:effectLst/>
             <a:extLst>
               <a:ext uri="{91240B29-F687-4f45-9708-019B960494DF}">
-                <a14:hiddenLine xmlns:a14="http://schemas.microsoft.com/office/drawing/2010/main" xmlns="" w="9525" cap="flat">
+                <a14:hiddenLine xmlns="" xmlns:a14="http://schemas.microsoft.com/office/drawing/2010/main" w="9525" cap="flat">
                   <a:solidFill>
                     <a:srgbClr val="808080"/>
                   </a:solidFill>
@@ -42343,7 +42344,7 @@
                 </a14:hiddenLine>
               </a:ext>
               <a:ext uri="{AF507438-7753-43e0-B8FC-AC1667EBCBE1}">
-                <a14:hiddenEffects xmlns:a14="http://schemas.microsoft.com/office/drawing/2010/main" xmlns="">
+                <a14:hiddenEffects xmlns="" xmlns:a14="http://schemas.microsoft.com/office/drawing/2010/main">
                   <a:effectLst>
                     <a:outerShdw blurRad="63500" dist="38099" dir="2700000" algn="ctr" rotWithShape="0">
                       <a:srgbClr val="000000">
@@ -42539,7 +42540,7 @@
             <a:effectLst/>
             <a:extLst>
               <a:ext uri="{91240B29-F687-4f45-9708-019B960494DF}">
-                <a14:hiddenLine xmlns:a14="http://schemas.microsoft.com/office/drawing/2010/main" xmlns="" w="9525" cap="flat">
+                <a14:hiddenLine xmlns="" xmlns:a14="http://schemas.microsoft.com/office/drawing/2010/main" w="9525" cap="flat">
                   <a:solidFill>
                     <a:srgbClr val="808080"/>
                   </a:solidFill>
@@ -42549,7 +42550,7 @@
                 </a14:hiddenLine>
               </a:ext>
               <a:ext uri="{AF507438-7753-43e0-B8FC-AC1667EBCBE1}">
-                <a14:hiddenEffects xmlns:a14="http://schemas.microsoft.com/office/drawing/2010/main" xmlns="">
+                <a14:hiddenEffects xmlns="" xmlns:a14="http://schemas.microsoft.com/office/drawing/2010/main">
                   <a:effectLst>
                     <a:outerShdw blurRad="63500" dist="38099" dir="2700000" algn="ctr" rotWithShape="0">
                       <a:srgbClr val="000000">
@@ -42649,7 +42650,7 @@
             <a:effectLst/>
             <a:extLst>
               <a:ext uri="{91240B29-F687-4f45-9708-019B960494DF}">
-                <a14:hiddenLine xmlns:a14="http://schemas.microsoft.com/office/drawing/2010/main" xmlns="" w="9525" cap="flat">
+                <a14:hiddenLine xmlns="" xmlns:a14="http://schemas.microsoft.com/office/drawing/2010/main" w="9525" cap="flat">
                   <a:solidFill>
                     <a:srgbClr val="808080"/>
                   </a:solidFill>
@@ -42659,7 +42660,7 @@
                 </a14:hiddenLine>
               </a:ext>
               <a:ext uri="{AF507438-7753-43e0-B8FC-AC1667EBCBE1}">
-                <a14:hiddenEffects xmlns:a14="http://schemas.microsoft.com/office/drawing/2010/main" xmlns="">
+                <a14:hiddenEffects xmlns="" xmlns:a14="http://schemas.microsoft.com/office/drawing/2010/main">
                   <a:effectLst>
                     <a:outerShdw blurRad="63500" dist="38099" dir="2700000" algn="ctr" rotWithShape="0">
                       <a:srgbClr val="000000">
@@ -43365,14 +43366,14 @@
           </a:ln>
           <a:extLst>
             <a:ext uri="{909E8E84-426E-40dd-AFC4-6F175D3DCCD1}">
-              <a14:hiddenFill xmlns="" xmlns:a14="http://schemas.microsoft.com/office/drawing/2010/main">
+              <a14:hiddenFill xmlns:a14="http://schemas.microsoft.com/office/drawing/2010/main" xmlns="">
                 <a:solidFill>
                   <a:srgbClr val="FFFFFF"/>
                 </a:solidFill>
               </a14:hiddenFill>
             </a:ext>
             <a:ext uri="{91240B29-F687-4f45-9708-019B960494DF}">
-              <a14:hiddenLine xmlns="" xmlns:a14="http://schemas.microsoft.com/office/drawing/2010/main" w="9525">
+              <a14:hiddenLine xmlns:a14="http://schemas.microsoft.com/office/drawing/2010/main" xmlns="" w="9525">
                 <a:solidFill>
                   <a:srgbClr val="000000"/>
                 </a:solidFill>
@@ -43700,7 +43701,7 @@
             <a:effectLst/>
             <a:extLst>
               <a:ext uri="{91240B29-F687-4f45-9708-019B960494DF}">
-                <a14:hiddenLine xmlns="" xmlns:a14="http://schemas.microsoft.com/office/drawing/2010/main" w="9525" cap="flat">
+                <a14:hiddenLine xmlns:a14="http://schemas.microsoft.com/office/drawing/2010/main" xmlns="" w="9525" cap="flat">
                   <a:solidFill>
                     <a:srgbClr val="808080"/>
                   </a:solidFill>
@@ -43710,7 +43711,7 @@
                 </a14:hiddenLine>
               </a:ext>
               <a:ext uri="{AF507438-7753-43e0-B8FC-AC1667EBCBE1}">
-                <a14:hiddenEffects xmlns="" xmlns:a14="http://schemas.microsoft.com/office/drawing/2010/main">
+                <a14:hiddenEffects xmlns:a14="http://schemas.microsoft.com/office/drawing/2010/main" xmlns="">
                   <a:effectLst>
                     <a:outerShdw blurRad="63500" dist="38099" dir="2700000" algn="ctr" rotWithShape="0">
                       <a:srgbClr val="000000">
@@ -43837,7 +43838,7 @@
             <a:effectLst/>
             <a:extLst>
               <a:ext uri="{91240B29-F687-4f45-9708-019B960494DF}">
-                <a14:hiddenLine xmlns="" xmlns:a14="http://schemas.microsoft.com/office/drawing/2010/main" w="9525" cap="flat">
+                <a14:hiddenLine xmlns:a14="http://schemas.microsoft.com/office/drawing/2010/main" xmlns="" w="9525" cap="flat">
                   <a:solidFill>
                     <a:srgbClr val="808080"/>
                   </a:solidFill>
@@ -43847,7 +43848,7 @@
                 </a14:hiddenLine>
               </a:ext>
               <a:ext uri="{AF507438-7753-43e0-B8FC-AC1667EBCBE1}">
-                <a14:hiddenEffects xmlns="" xmlns:a14="http://schemas.microsoft.com/office/drawing/2010/main">
+                <a14:hiddenEffects xmlns:a14="http://schemas.microsoft.com/office/drawing/2010/main" xmlns="">
                   <a:effectLst>
                     <a:outerShdw blurRad="63500" dist="38099" dir="2700000" algn="ctr" rotWithShape="0">
                       <a:srgbClr val="000000">
@@ -44010,7 +44011,7 @@
             <a:effectLst/>
             <a:extLst>
               <a:ext uri="{91240B29-F687-4f45-9708-019B960494DF}">
-                <a14:hiddenLine xmlns="" xmlns:a14="http://schemas.microsoft.com/office/drawing/2010/main" w="9525" cap="flat">
+                <a14:hiddenLine xmlns:a14="http://schemas.microsoft.com/office/drawing/2010/main" xmlns="" w="9525" cap="flat">
                   <a:solidFill>
                     <a:srgbClr val="808080"/>
                   </a:solidFill>
@@ -44020,7 +44021,7 @@
                 </a14:hiddenLine>
               </a:ext>
               <a:ext uri="{AF507438-7753-43e0-B8FC-AC1667EBCBE1}">
-                <a14:hiddenEffects xmlns="" xmlns:a14="http://schemas.microsoft.com/office/drawing/2010/main">
+                <a14:hiddenEffects xmlns:a14="http://schemas.microsoft.com/office/drawing/2010/main" xmlns="">
                   <a:effectLst>
                     <a:outerShdw blurRad="63500" dist="38099" dir="2700000" algn="ctr" rotWithShape="0">
                       <a:srgbClr val="000000">
@@ -44121,7 +44122,7 @@
             <a:effectLst/>
             <a:extLst>
               <a:ext uri="{91240B29-F687-4f45-9708-019B960494DF}">
-                <a14:hiddenLine xmlns="" xmlns:a14="http://schemas.microsoft.com/office/drawing/2010/main" w="9525" cap="flat">
+                <a14:hiddenLine xmlns:a14="http://schemas.microsoft.com/office/drawing/2010/main" xmlns="" w="9525" cap="flat">
                   <a:solidFill>
                     <a:srgbClr val="808080"/>
                   </a:solidFill>
@@ -44131,7 +44132,7 @@
                 </a14:hiddenLine>
               </a:ext>
               <a:ext uri="{AF507438-7753-43e0-B8FC-AC1667EBCBE1}">
-                <a14:hiddenEffects xmlns="" xmlns:a14="http://schemas.microsoft.com/office/drawing/2010/main">
+                <a14:hiddenEffects xmlns:a14="http://schemas.microsoft.com/office/drawing/2010/main" xmlns="">
                   <a:effectLst>
                     <a:outerShdw blurRad="63500" dist="38099" dir="2700000" algn="ctr" rotWithShape="0">
                       <a:srgbClr val="000000">
@@ -44304,7 +44305,7 @@
             <a:effectLst/>
             <a:extLst>
               <a:ext uri="{91240B29-F687-4f45-9708-019B960494DF}">
-                <a14:hiddenLine xmlns="" xmlns:a14="http://schemas.microsoft.com/office/drawing/2010/main" w="9525" cap="flat">
+                <a14:hiddenLine xmlns:a14="http://schemas.microsoft.com/office/drawing/2010/main" xmlns="" w="9525" cap="flat">
                   <a:solidFill>
                     <a:srgbClr val="808080"/>
                   </a:solidFill>
@@ -44314,7 +44315,7 @@
                 </a14:hiddenLine>
               </a:ext>
               <a:ext uri="{AF507438-7753-43e0-B8FC-AC1667EBCBE1}">
-                <a14:hiddenEffects xmlns="" xmlns:a14="http://schemas.microsoft.com/office/drawing/2010/main">
+                <a14:hiddenEffects xmlns:a14="http://schemas.microsoft.com/office/drawing/2010/main" xmlns="">
                   <a:effectLst>
                     <a:outerShdw blurRad="63500" dist="38099" dir="2700000" algn="ctr" rotWithShape="0">
                       <a:srgbClr val="000000">
@@ -44415,7 +44416,7 @@
             <a:effectLst/>
             <a:extLst>
               <a:ext uri="{91240B29-F687-4f45-9708-019B960494DF}">
-                <a14:hiddenLine xmlns="" xmlns:a14="http://schemas.microsoft.com/office/drawing/2010/main" w="9525" cap="flat">
+                <a14:hiddenLine xmlns:a14="http://schemas.microsoft.com/office/drawing/2010/main" xmlns="" w="9525" cap="flat">
                   <a:solidFill>
                     <a:srgbClr val="808080"/>
                   </a:solidFill>
@@ -44425,7 +44426,7 @@
                 </a14:hiddenLine>
               </a:ext>
               <a:ext uri="{AF507438-7753-43e0-B8FC-AC1667EBCBE1}">
-                <a14:hiddenEffects xmlns="" xmlns:a14="http://schemas.microsoft.com/office/drawing/2010/main">
+                <a14:hiddenEffects xmlns:a14="http://schemas.microsoft.com/office/drawing/2010/main" xmlns="">
                   <a:effectLst>
                     <a:outerShdw blurRad="63500" dist="38099" dir="2700000" algn="ctr" rotWithShape="0">
                       <a:srgbClr val="000000">
@@ -44742,7 +44743,7 @@
             <a:effectLst/>
             <a:extLst>
               <a:ext uri="{91240B29-F687-4f45-9708-019B960494DF}">
-                <a14:hiddenLine xmlns="" xmlns:a14="http://schemas.microsoft.com/office/drawing/2010/main" w="9525" cap="flat">
+                <a14:hiddenLine xmlns:a14="http://schemas.microsoft.com/office/drawing/2010/main" xmlns="" w="9525" cap="flat">
                   <a:solidFill>
                     <a:srgbClr val="808080"/>
                   </a:solidFill>
@@ -44752,7 +44753,7 @@
                 </a14:hiddenLine>
               </a:ext>
               <a:ext uri="{AF507438-7753-43e0-B8FC-AC1667EBCBE1}">
-                <a14:hiddenEffects xmlns="" xmlns:a14="http://schemas.microsoft.com/office/drawing/2010/main">
+                <a14:hiddenEffects xmlns:a14="http://schemas.microsoft.com/office/drawing/2010/main" xmlns="">
                   <a:effectLst>
                     <a:outerShdw blurRad="63500" dist="38099" dir="2700000" algn="ctr" rotWithShape="0">
                       <a:srgbClr val="000000">
@@ -44879,7 +44880,7 @@
             <a:effectLst/>
             <a:extLst>
               <a:ext uri="{91240B29-F687-4f45-9708-019B960494DF}">
-                <a14:hiddenLine xmlns="" xmlns:a14="http://schemas.microsoft.com/office/drawing/2010/main" w="9525" cap="flat">
+                <a14:hiddenLine xmlns:a14="http://schemas.microsoft.com/office/drawing/2010/main" xmlns="" w="9525" cap="flat">
                   <a:solidFill>
                     <a:srgbClr val="808080"/>
                   </a:solidFill>
@@ -44889,7 +44890,7 @@
                 </a14:hiddenLine>
               </a:ext>
               <a:ext uri="{AF507438-7753-43e0-B8FC-AC1667EBCBE1}">
-                <a14:hiddenEffects xmlns="" xmlns:a14="http://schemas.microsoft.com/office/drawing/2010/main">
+                <a14:hiddenEffects xmlns:a14="http://schemas.microsoft.com/office/drawing/2010/main" xmlns="">
                   <a:effectLst>
                     <a:outerShdw blurRad="63500" dist="38099" dir="2700000" algn="ctr" rotWithShape="0">
                       <a:srgbClr val="000000">
@@ -45090,7 +45091,7 @@
             <a:effectLst/>
             <a:extLst>
               <a:ext uri="{91240B29-F687-4f45-9708-019B960494DF}">
-                <a14:hiddenLine xmlns="" xmlns:a14="http://schemas.microsoft.com/office/drawing/2010/main" w="9525" cap="flat">
+                <a14:hiddenLine xmlns:a14="http://schemas.microsoft.com/office/drawing/2010/main" xmlns="" w="9525" cap="flat">
                   <a:solidFill>
                     <a:srgbClr val="808080"/>
                   </a:solidFill>
@@ -45100,7 +45101,7 @@
                 </a14:hiddenLine>
               </a:ext>
               <a:ext uri="{AF507438-7753-43e0-B8FC-AC1667EBCBE1}">
-                <a14:hiddenEffects xmlns="" xmlns:a14="http://schemas.microsoft.com/office/drawing/2010/main">
+                <a14:hiddenEffects xmlns:a14="http://schemas.microsoft.com/office/drawing/2010/main" xmlns="">
                   <a:effectLst>
                     <a:outerShdw blurRad="63500" dist="38099" dir="2700000" algn="ctr" rotWithShape="0">
                       <a:srgbClr val="000000">
@@ -45337,7 +45338,7 @@
             <a:effectLst/>
             <a:extLst>
               <a:ext uri="{91240B29-F687-4f45-9708-019B960494DF}">
-                <a14:hiddenLine xmlns="" xmlns:a14="http://schemas.microsoft.com/office/drawing/2010/main" w="9525" cap="flat">
+                <a14:hiddenLine xmlns:a14="http://schemas.microsoft.com/office/drawing/2010/main" xmlns="" w="9525" cap="flat">
                   <a:solidFill>
                     <a:srgbClr val="808080"/>
                   </a:solidFill>
@@ -45347,7 +45348,7 @@
                 </a14:hiddenLine>
               </a:ext>
               <a:ext uri="{AF507438-7753-43e0-B8FC-AC1667EBCBE1}">
-                <a14:hiddenEffects xmlns="" xmlns:a14="http://schemas.microsoft.com/office/drawing/2010/main">
+                <a14:hiddenEffects xmlns:a14="http://schemas.microsoft.com/office/drawing/2010/main" xmlns="">
                   <a:effectLst>
                     <a:outerShdw blurRad="63500" dist="38099" dir="2700000" algn="ctr" rotWithShape="0">
                       <a:srgbClr val="000000">
@@ -45584,7 +45585,7 @@
             <a:effectLst/>
             <a:extLst>
               <a:ext uri="{91240B29-F687-4f45-9708-019B960494DF}">
-                <a14:hiddenLine xmlns="" xmlns:a14="http://schemas.microsoft.com/office/drawing/2010/main" w="9525" cap="flat">
+                <a14:hiddenLine xmlns:a14="http://schemas.microsoft.com/office/drawing/2010/main" xmlns="" w="9525" cap="flat">
                   <a:solidFill>
                     <a:srgbClr val="808080"/>
                   </a:solidFill>
@@ -45594,7 +45595,7 @@
                 </a14:hiddenLine>
               </a:ext>
               <a:ext uri="{AF507438-7753-43e0-B8FC-AC1667EBCBE1}">
-                <a14:hiddenEffects xmlns="" xmlns:a14="http://schemas.microsoft.com/office/drawing/2010/main">
+                <a14:hiddenEffects xmlns:a14="http://schemas.microsoft.com/office/drawing/2010/main" xmlns="">
                   <a:effectLst>
                     <a:outerShdw blurRad="63500" dist="38099" dir="2700000" algn="ctr" rotWithShape="0">
                       <a:srgbClr val="000000">
@@ -45721,7 +45722,7 @@
             <a:effectLst/>
             <a:extLst>
               <a:ext uri="{91240B29-F687-4f45-9708-019B960494DF}">
-                <a14:hiddenLine xmlns="" xmlns:a14="http://schemas.microsoft.com/office/drawing/2010/main" w="9525" cap="flat">
+                <a14:hiddenLine xmlns:a14="http://schemas.microsoft.com/office/drawing/2010/main" xmlns="" w="9525" cap="flat">
                   <a:solidFill>
                     <a:srgbClr val="808080"/>
                   </a:solidFill>
@@ -45731,7 +45732,7 @@
                 </a14:hiddenLine>
               </a:ext>
               <a:ext uri="{AF507438-7753-43e0-B8FC-AC1667EBCBE1}">
-                <a14:hiddenEffects xmlns="" xmlns:a14="http://schemas.microsoft.com/office/drawing/2010/main">
+                <a14:hiddenEffects xmlns:a14="http://schemas.microsoft.com/office/drawing/2010/main" xmlns="">
                   <a:effectLst>
                     <a:outerShdw blurRad="63500" dist="38099" dir="2700000" algn="ctr" rotWithShape="0">
                       <a:srgbClr val="000000">
@@ -45832,7 +45833,7 @@
             <a:effectLst/>
             <a:extLst>
               <a:ext uri="{91240B29-F687-4f45-9708-019B960494DF}">
-                <a14:hiddenLine xmlns="" xmlns:a14="http://schemas.microsoft.com/office/drawing/2010/main" w="9525" cap="flat">
+                <a14:hiddenLine xmlns:a14="http://schemas.microsoft.com/office/drawing/2010/main" xmlns="" w="9525" cap="flat">
                   <a:solidFill>
                     <a:srgbClr val="808080"/>
                   </a:solidFill>
@@ -45842,7 +45843,7 @@
                 </a14:hiddenLine>
               </a:ext>
               <a:ext uri="{AF507438-7753-43e0-B8FC-AC1667EBCBE1}">
-                <a14:hiddenEffects xmlns="" xmlns:a14="http://schemas.microsoft.com/office/drawing/2010/main">
+                <a14:hiddenEffects xmlns:a14="http://schemas.microsoft.com/office/drawing/2010/main" xmlns="">
                   <a:effectLst>
                     <a:outerShdw blurRad="63500" dist="38099" dir="2700000" algn="ctr" rotWithShape="0">
                       <a:srgbClr val="000000">
@@ -46051,7 +46052,7 @@
             <a:effectLst/>
             <a:extLst>
               <a:ext uri="{91240B29-F687-4f45-9708-019B960494DF}">
-                <a14:hiddenLine xmlns="" xmlns:a14="http://schemas.microsoft.com/office/drawing/2010/main" w="9525" cap="flat">
+                <a14:hiddenLine xmlns:a14="http://schemas.microsoft.com/office/drawing/2010/main" xmlns="" w="9525" cap="flat">
                   <a:solidFill>
                     <a:srgbClr val="808080"/>
                   </a:solidFill>
@@ -46061,7 +46062,7 @@
                 </a14:hiddenLine>
               </a:ext>
               <a:ext uri="{AF507438-7753-43e0-B8FC-AC1667EBCBE1}">
-                <a14:hiddenEffects xmlns="" xmlns:a14="http://schemas.microsoft.com/office/drawing/2010/main">
+                <a14:hiddenEffects xmlns:a14="http://schemas.microsoft.com/office/drawing/2010/main" xmlns="">
                   <a:effectLst>
                     <a:outerShdw blurRad="63500" dist="38099" dir="2700000" algn="ctr" rotWithShape="0">
                       <a:srgbClr val="000000">
@@ -46272,7 +46273,7 @@
             <a:effectLst/>
             <a:extLst>
               <a:ext uri="{91240B29-F687-4f45-9708-019B960494DF}">
-                <a14:hiddenLine xmlns="" xmlns:a14="http://schemas.microsoft.com/office/drawing/2010/main" w="9525" cap="flat">
+                <a14:hiddenLine xmlns:a14="http://schemas.microsoft.com/office/drawing/2010/main" xmlns="" w="9525" cap="flat">
                   <a:solidFill>
                     <a:srgbClr val="808080"/>
                   </a:solidFill>
@@ -46282,7 +46283,7 @@
                 </a14:hiddenLine>
               </a:ext>
               <a:ext uri="{AF507438-7753-43e0-B8FC-AC1667EBCBE1}">
-                <a14:hiddenEffects xmlns="" xmlns:a14="http://schemas.microsoft.com/office/drawing/2010/main">
+                <a14:hiddenEffects xmlns:a14="http://schemas.microsoft.com/office/drawing/2010/main" xmlns="">
                   <a:effectLst>
                     <a:outerShdw blurRad="63500" dist="38099" dir="2700000" algn="ctr" rotWithShape="0">
                       <a:srgbClr val="000000">
@@ -46483,7 +46484,7 @@
             <a:effectLst/>
             <a:extLst>
               <a:ext uri="{91240B29-F687-4f45-9708-019B960494DF}">
-                <a14:hiddenLine xmlns="" xmlns:a14="http://schemas.microsoft.com/office/drawing/2010/main" w="9525" cap="flat">
+                <a14:hiddenLine xmlns:a14="http://schemas.microsoft.com/office/drawing/2010/main" xmlns="" w="9525" cap="flat">
                   <a:solidFill>
                     <a:srgbClr val="808080"/>
                   </a:solidFill>
@@ -46493,7 +46494,7 @@
                 </a14:hiddenLine>
               </a:ext>
               <a:ext uri="{AF507438-7753-43e0-B8FC-AC1667EBCBE1}">
-                <a14:hiddenEffects xmlns="" xmlns:a14="http://schemas.microsoft.com/office/drawing/2010/main">
+                <a14:hiddenEffects xmlns:a14="http://schemas.microsoft.com/office/drawing/2010/main" xmlns="">
                   <a:effectLst>
                     <a:outerShdw blurRad="63500" dist="38099" dir="2700000" algn="ctr" rotWithShape="0">
                       <a:srgbClr val="000000">
@@ -46696,7 +46697,7 @@
             <a:effectLst/>
             <a:extLst>
               <a:ext uri="{91240B29-F687-4f45-9708-019B960494DF}">
-                <a14:hiddenLine xmlns="" xmlns:a14="http://schemas.microsoft.com/office/drawing/2010/main" w="9525" cap="flat">
+                <a14:hiddenLine xmlns:a14="http://schemas.microsoft.com/office/drawing/2010/main" xmlns="" w="9525" cap="flat">
                   <a:solidFill>
                     <a:srgbClr val="808080"/>
                   </a:solidFill>
@@ -46706,7 +46707,7 @@
                 </a14:hiddenLine>
               </a:ext>
               <a:ext uri="{AF507438-7753-43e0-B8FC-AC1667EBCBE1}">
-                <a14:hiddenEffects xmlns="" xmlns:a14="http://schemas.microsoft.com/office/drawing/2010/main">
+                <a14:hiddenEffects xmlns:a14="http://schemas.microsoft.com/office/drawing/2010/main" xmlns="">
                   <a:effectLst>
                     <a:outerShdw blurRad="63500" dist="38099" dir="2700000" algn="ctr" rotWithShape="0">
                       <a:srgbClr val="000000">
@@ -46919,7 +46920,7 @@
             <a:effectLst/>
             <a:extLst>
               <a:ext uri="{91240B29-F687-4f45-9708-019B960494DF}">
-                <a14:hiddenLine xmlns="" xmlns:a14="http://schemas.microsoft.com/office/drawing/2010/main" w="9525" cap="flat">
+                <a14:hiddenLine xmlns:a14="http://schemas.microsoft.com/office/drawing/2010/main" xmlns="" w="9525" cap="flat">
                   <a:solidFill>
                     <a:srgbClr val="808080"/>
                   </a:solidFill>
@@ -46929,7 +46930,7 @@
                 </a14:hiddenLine>
               </a:ext>
               <a:ext uri="{AF507438-7753-43e0-B8FC-AC1667EBCBE1}">
-                <a14:hiddenEffects xmlns="" xmlns:a14="http://schemas.microsoft.com/office/drawing/2010/main">
+                <a14:hiddenEffects xmlns:a14="http://schemas.microsoft.com/office/drawing/2010/main" xmlns="">
                   <a:effectLst>
                     <a:outerShdw blurRad="63500" dist="38099" dir="2700000" algn="ctr" rotWithShape="0">
                       <a:srgbClr val="000000">
@@ -47112,7 +47113,7 @@
             <a:effectLst/>
             <a:extLst>
               <a:ext uri="{91240B29-F687-4f45-9708-019B960494DF}">
-                <a14:hiddenLine xmlns="" xmlns:a14="http://schemas.microsoft.com/office/drawing/2010/main" w="9525" cap="flat">
+                <a14:hiddenLine xmlns:a14="http://schemas.microsoft.com/office/drawing/2010/main" xmlns="" w="9525" cap="flat">
                   <a:solidFill>
                     <a:srgbClr val="808080"/>
                   </a:solidFill>
@@ -47122,7 +47123,7 @@
                 </a14:hiddenLine>
               </a:ext>
               <a:ext uri="{AF507438-7753-43e0-B8FC-AC1667EBCBE1}">
-                <a14:hiddenEffects xmlns="" xmlns:a14="http://schemas.microsoft.com/office/drawing/2010/main">
+                <a14:hiddenEffects xmlns:a14="http://schemas.microsoft.com/office/drawing/2010/main" xmlns="">
                   <a:effectLst>
                     <a:outerShdw blurRad="63500" dist="38099" dir="2700000" algn="ctr" rotWithShape="0">
                       <a:srgbClr val="000000">
@@ -47321,7 +47322,7 @@
             <a:effectLst/>
             <a:extLst>
               <a:ext uri="{91240B29-F687-4f45-9708-019B960494DF}">
-                <a14:hiddenLine xmlns="" xmlns:a14="http://schemas.microsoft.com/office/drawing/2010/main" w="9525" cap="flat">
+                <a14:hiddenLine xmlns:a14="http://schemas.microsoft.com/office/drawing/2010/main" xmlns="" w="9525" cap="flat">
                   <a:solidFill>
                     <a:srgbClr val="808080"/>
                   </a:solidFill>
@@ -47331,7 +47332,7 @@
                 </a14:hiddenLine>
               </a:ext>
               <a:ext uri="{AF507438-7753-43e0-B8FC-AC1667EBCBE1}">
-                <a14:hiddenEffects xmlns="" xmlns:a14="http://schemas.microsoft.com/office/drawing/2010/main">
+                <a14:hiddenEffects xmlns:a14="http://schemas.microsoft.com/office/drawing/2010/main" xmlns="">
                   <a:effectLst>
                     <a:outerShdw blurRad="63500" dist="38099" dir="2700000" algn="ctr" rotWithShape="0">
                       <a:srgbClr val="000000">
@@ -47544,7 +47545,7 @@
             <a:effectLst/>
             <a:extLst>
               <a:ext uri="{91240B29-F687-4f45-9708-019B960494DF}">
-                <a14:hiddenLine xmlns="" xmlns:a14="http://schemas.microsoft.com/office/drawing/2010/main" w="9525" cap="flat">
+                <a14:hiddenLine xmlns:a14="http://schemas.microsoft.com/office/drawing/2010/main" xmlns="" w="9525" cap="flat">
                   <a:solidFill>
                     <a:srgbClr val="808080"/>
                   </a:solidFill>
@@ -47554,7 +47555,7 @@
                 </a14:hiddenLine>
               </a:ext>
               <a:ext uri="{AF507438-7753-43e0-B8FC-AC1667EBCBE1}">
-                <a14:hiddenEffects xmlns="" xmlns:a14="http://schemas.microsoft.com/office/drawing/2010/main">
+                <a14:hiddenEffects xmlns:a14="http://schemas.microsoft.com/office/drawing/2010/main" xmlns="">
                   <a:effectLst>
                     <a:outerShdw blurRad="63500" dist="38099" dir="2700000" algn="ctr" rotWithShape="0">
                       <a:srgbClr val="000000">
@@ -47745,7 +47746,7 @@
             <a:effectLst/>
             <a:extLst>
               <a:ext uri="{91240B29-F687-4f45-9708-019B960494DF}">
-                <a14:hiddenLine xmlns="" xmlns:a14="http://schemas.microsoft.com/office/drawing/2010/main" w="9525" cap="flat">
+                <a14:hiddenLine xmlns:a14="http://schemas.microsoft.com/office/drawing/2010/main" xmlns="" w="9525" cap="flat">
                   <a:solidFill>
                     <a:srgbClr val="808080"/>
                   </a:solidFill>
@@ -47755,7 +47756,7 @@
                 </a14:hiddenLine>
               </a:ext>
               <a:ext uri="{AF507438-7753-43e0-B8FC-AC1667EBCBE1}">
-                <a14:hiddenEffects xmlns="" xmlns:a14="http://schemas.microsoft.com/office/drawing/2010/main">
+                <a14:hiddenEffects xmlns:a14="http://schemas.microsoft.com/office/drawing/2010/main" xmlns="">
                   <a:effectLst>
                     <a:outerShdw blurRad="63500" dist="38099" dir="2700000" algn="ctr" rotWithShape="0">
                       <a:srgbClr val="000000">
@@ -47850,7 +47851,7 @@
             <a:effectLst/>
             <a:extLst>
               <a:ext uri="{91240B29-F687-4f45-9708-019B960494DF}">
-                <a14:hiddenLine xmlns="" xmlns:a14="http://schemas.microsoft.com/office/drawing/2010/main" w="9525" cap="flat">
+                <a14:hiddenLine xmlns:a14="http://schemas.microsoft.com/office/drawing/2010/main" xmlns="" w="9525" cap="flat">
                   <a:solidFill>
                     <a:srgbClr val="808080"/>
                   </a:solidFill>
@@ -47860,7 +47861,7 @@
                 </a14:hiddenLine>
               </a:ext>
               <a:ext uri="{AF507438-7753-43e0-B8FC-AC1667EBCBE1}">
-                <a14:hiddenEffects xmlns="" xmlns:a14="http://schemas.microsoft.com/office/drawing/2010/main">
+                <a14:hiddenEffects xmlns:a14="http://schemas.microsoft.com/office/drawing/2010/main" xmlns="">
                   <a:effectLst>
                     <a:outerShdw blurRad="63500" dist="38099" dir="2700000" algn="ctr" rotWithShape="0">
                       <a:srgbClr val="000000">
@@ -49972,6 +49973,397 @@
       </p:grpSpPr>
       <p:sp>
         <p:nvSpPr>
+          <p:cNvPr id="3" name="Title 2">
+            <a:extLst>
+              <a:ext uri="{FF2B5EF4-FFF2-40B4-BE49-F238E27FC236}">
+                <a16:creationId xmlns:a16="http://schemas.microsoft.com/office/drawing/2014/main" id="{D41A9AD1-2973-4DDA-8F49-E54A512D132C}"/>
+              </a:ext>
+            </a:extLst>
+          </p:cNvPr>
+          <p:cNvSpPr>
+            <a:spLocks noGrp="1"/>
+          </p:cNvSpPr>
+          <p:nvPr>
+            <p:ph type="title"/>
+          </p:nvPr>
+        </p:nvSpPr>
+        <p:spPr/>
+        <p:txBody>
+          <a:bodyPr/>
+          <a:lstStyle/>
+          <a:p>
+            <a:r>
+              <a:rPr lang="en-US" dirty="0"/>
+              <a:t>AIO “switches gears” with more AIO slots than OS tags</a:t>
+            </a:r>
+          </a:p>
+        </p:txBody>
+      </p:sp>
+      <p:pic>
+        <p:nvPicPr>
+          <p:cNvPr id="4" name="Picture 3">
+            <a:extLst>
+              <a:ext uri="{FF2B5EF4-FFF2-40B4-BE49-F238E27FC236}">
+                <a16:creationId xmlns:a16="http://schemas.microsoft.com/office/drawing/2014/main" id="{C51ED0CD-D793-43B4-9D2D-D40626E17544}"/>
+              </a:ext>
+            </a:extLst>
+          </p:cNvPr>
+          <p:cNvPicPr>
+            <a:picLocks noChangeAspect="1"/>
+          </p:cNvPicPr>
+          <p:nvPr/>
+        </p:nvPicPr>
+        <p:blipFill>
+          <a:blip r:embed="rId2"/>
+          <a:stretch>
+            <a:fillRect/>
+          </a:stretch>
+        </p:blipFill>
+        <p:spPr>
+          <a:xfrm>
+            <a:off x="386142" y="894229"/>
+            <a:ext cx="7901068" cy="3973606"/>
+          </a:xfrm>
+          <a:prstGeom prst="rect">
+            <a:avLst/>
+          </a:prstGeom>
+        </p:spPr>
+      </p:pic>
+      <p:sp>
+        <p:nvSpPr>
+          <p:cNvPr id="5" name="Speech Bubble: Rectangle with Corners Rounded 4">
+            <a:extLst>
+              <a:ext uri="{FF2B5EF4-FFF2-40B4-BE49-F238E27FC236}">
+                <a16:creationId xmlns:a16="http://schemas.microsoft.com/office/drawing/2014/main" id="{DBF9AAA1-DEF7-4346-A099-067A4DCD85F6}"/>
+              </a:ext>
+            </a:extLst>
+          </p:cNvPr>
+          <p:cNvSpPr/>
+          <p:nvPr/>
+        </p:nvSpPr>
+        <p:spPr>
+          <a:xfrm>
+            <a:off x="1237129" y="3045759"/>
+            <a:ext cx="1035423" cy="941293"/>
+          </a:xfrm>
+          <a:prstGeom prst="wedgeRoundRectCallout">
+            <a:avLst>
+              <a:gd name="adj1" fmla="val 87098"/>
+              <a:gd name="adj2" fmla="val 47847"/>
+              <a:gd name="adj3" fmla="val 16667"/>
+            </a:avLst>
+          </a:prstGeom>
+          <a:solidFill>
+            <a:schemeClr val="bg1"/>
+          </a:solidFill>
+          <a:ln w="12700">
+            <a:solidFill>
+              <a:schemeClr val="tx1"/>
+            </a:solidFill>
+          </a:ln>
+        </p:spPr>
+        <p:style>
+          <a:lnRef idx="2">
+            <a:schemeClr val="accent1">
+              <a:shade val="50000"/>
+            </a:schemeClr>
+          </a:lnRef>
+          <a:fillRef idx="1">
+            <a:schemeClr val="accent1"/>
+          </a:fillRef>
+          <a:effectRef idx="0">
+            <a:schemeClr val="accent1"/>
+          </a:effectRef>
+          <a:fontRef idx="minor">
+            <a:schemeClr val="lt1"/>
+          </a:fontRef>
+        </p:style>
+        <p:txBody>
+          <a:bodyPr lIns="0" tIns="0" rIns="0" bIns="0" rtlCol="0" anchor="ctr"/>
+          <a:lstStyle/>
+          <a:p>
+            <a:pPr algn="ctr"/>
+            <a:r>
+              <a:rPr lang="en-US" sz="1400" dirty="0">
+                <a:solidFill>
+                  <a:schemeClr val="tx1"/>
+                </a:solidFill>
+                <a:latin typeface="+mj-lt"/>
+              </a:rPr>
+              <a:t>AIO slots 1:1 with OS tags</a:t>
+            </a:r>
+          </a:p>
+        </p:txBody>
+      </p:sp>
+      <p:sp>
+        <p:nvSpPr>
+          <p:cNvPr id="6" name="Speech Bubble: Rectangle with Corners Rounded 5">
+            <a:extLst>
+              <a:ext uri="{FF2B5EF4-FFF2-40B4-BE49-F238E27FC236}">
+                <a16:creationId xmlns:a16="http://schemas.microsoft.com/office/drawing/2014/main" id="{E04C0BD2-600A-4332-BC25-CDEC512DC8CC}"/>
+              </a:ext>
+            </a:extLst>
+          </p:cNvPr>
+          <p:cNvSpPr/>
+          <p:nvPr/>
+        </p:nvSpPr>
+        <p:spPr>
+          <a:xfrm>
+            <a:off x="4166289" y="1746862"/>
+            <a:ext cx="1035423" cy="941293"/>
+          </a:xfrm>
+          <a:prstGeom prst="wedgeRoundRectCallout">
+            <a:avLst>
+              <a:gd name="adj1" fmla="val -128618"/>
+              <a:gd name="adj2" fmla="val 68929"/>
+              <a:gd name="adj3" fmla="val 16667"/>
+            </a:avLst>
+          </a:prstGeom>
+          <a:solidFill>
+            <a:schemeClr val="bg1"/>
+          </a:solidFill>
+          <a:ln w="12700">
+            <a:solidFill>
+              <a:schemeClr val="tx1"/>
+            </a:solidFill>
+          </a:ln>
+        </p:spPr>
+        <p:style>
+          <a:lnRef idx="2">
+            <a:schemeClr val="accent1">
+              <a:shade val="50000"/>
+            </a:schemeClr>
+          </a:lnRef>
+          <a:fillRef idx="1">
+            <a:schemeClr val="accent1"/>
+          </a:fillRef>
+          <a:effectRef idx="0">
+            <a:schemeClr val="accent1"/>
+          </a:effectRef>
+          <a:fontRef idx="minor">
+            <a:schemeClr val="lt1"/>
+          </a:fontRef>
+        </p:style>
+        <p:txBody>
+          <a:bodyPr lIns="0" tIns="0" rIns="0" bIns="0" rtlCol="0" anchor="ctr"/>
+          <a:lstStyle/>
+          <a:p>
+            <a:pPr algn="ctr"/>
+            <a:r>
+              <a:rPr lang="en-US" sz="1400" dirty="0">
+                <a:solidFill>
+                  <a:schemeClr val="tx1"/>
+                </a:solidFill>
+                <a:latin typeface="+mj-lt"/>
+              </a:rPr>
+              <a:t>More AIO slots than OS tags</a:t>
+            </a:r>
+          </a:p>
+        </p:txBody>
+      </p:sp>
+      <p:sp>
+        <p:nvSpPr>
+          <p:cNvPr id="7" name="Speech Bubble: Rectangle with Corners Rounded 6">
+            <a:extLst>
+              <a:ext uri="{FF2B5EF4-FFF2-40B4-BE49-F238E27FC236}">
+                <a16:creationId xmlns:a16="http://schemas.microsoft.com/office/drawing/2014/main" id="{E94B3F48-DC2F-40D7-8F25-9D4D8E733ECA}"/>
+              </a:ext>
+            </a:extLst>
+          </p:cNvPr>
+          <p:cNvSpPr/>
+          <p:nvPr/>
+        </p:nvSpPr>
+        <p:spPr>
+          <a:xfrm>
+            <a:off x="5709036" y="1746861"/>
+            <a:ext cx="1269987" cy="1070298"/>
+          </a:xfrm>
+          <a:prstGeom prst="wedgeRoundRectCallout">
+            <a:avLst>
+              <a:gd name="adj1" fmla="val 40615"/>
+              <a:gd name="adj2" fmla="val 76107"/>
+              <a:gd name="adj3" fmla="val 16667"/>
+            </a:avLst>
+          </a:prstGeom>
+          <a:solidFill>
+            <a:schemeClr val="bg1"/>
+          </a:solidFill>
+          <a:ln w="12700">
+            <a:solidFill>
+              <a:schemeClr val="tx1"/>
+            </a:solidFill>
+          </a:ln>
+        </p:spPr>
+        <p:style>
+          <a:lnRef idx="2">
+            <a:schemeClr val="accent1">
+              <a:shade val="50000"/>
+            </a:schemeClr>
+          </a:lnRef>
+          <a:fillRef idx="1">
+            <a:schemeClr val="accent1"/>
+          </a:fillRef>
+          <a:effectRef idx="0">
+            <a:schemeClr val="accent1"/>
+          </a:effectRef>
+          <a:fontRef idx="minor">
+            <a:schemeClr val="lt1"/>
+          </a:fontRef>
+        </p:style>
+        <p:txBody>
+          <a:bodyPr lIns="0" tIns="0" rIns="0" bIns="0" rtlCol="0" anchor="ctr"/>
+          <a:lstStyle/>
+          <a:p>
+            <a:pPr algn="ctr"/>
+            <a:r>
+              <a:rPr lang="en-US" sz="1400" dirty="0">
+                <a:solidFill>
+                  <a:schemeClr val="tx1"/>
+                </a:solidFill>
+                <a:latin typeface="+mj-lt"/>
+              </a:rPr>
+              <a:t>Some outliers in physical I/O service time range</a:t>
+            </a:r>
+          </a:p>
+        </p:txBody>
+      </p:sp>
+      <p:sp>
+        <p:nvSpPr>
+          <p:cNvPr id="8" name="Speech Bubble: Rectangle with Corners Rounded 7">
+            <a:extLst>
+              <a:ext uri="{FF2B5EF4-FFF2-40B4-BE49-F238E27FC236}">
+                <a16:creationId xmlns:a16="http://schemas.microsoft.com/office/drawing/2014/main" id="{A2F6C509-7439-44A5-8EFF-20211A6F6A98}"/>
+              </a:ext>
+            </a:extLst>
+          </p:cNvPr>
+          <p:cNvSpPr/>
+          <p:nvPr/>
+        </p:nvSpPr>
+        <p:spPr>
+          <a:xfrm>
+            <a:off x="1302668" y="1531709"/>
+            <a:ext cx="1035423" cy="773913"/>
+          </a:xfrm>
+          <a:prstGeom prst="wedgeRoundRectCallout">
+            <a:avLst>
+              <a:gd name="adj1" fmla="val 118785"/>
+              <a:gd name="adj2" fmla="val 49429"/>
+              <a:gd name="adj3" fmla="val 16667"/>
+            </a:avLst>
+          </a:prstGeom>
+          <a:solidFill>
+            <a:schemeClr val="bg1"/>
+          </a:solidFill>
+          <a:ln w="12700">
+            <a:solidFill>
+              <a:schemeClr val="tx1"/>
+            </a:solidFill>
+          </a:ln>
+        </p:spPr>
+        <p:style>
+          <a:lnRef idx="2">
+            <a:schemeClr val="accent1">
+              <a:shade val="50000"/>
+            </a:schemeClr>
+          </a:lnRef>
+          <a:fillRef idx="1">
+            <a:schemeClr val="accent1"/>
+          </a:fillRef>
+          <a:effectRef idx="0">
+            <a:schemeClr val="accent1"/>
+          </a:effectRef>
+          <a:fontRef idx="minor">
+            <a:schemeClr val="lt1"/>
+          </a:fontRef>
+        </p:style>
+        <p:txBody>
+          <a:bodyPr lIns="0" tIns="0" rIns="0" bIns="0" rtlCol="0" anchor="ctr"/>
+          <a:lstStyle/>
+          <a:p>
+            <a:pPr algn="ctr"/>
+            <a:r>
+              <a:rPr lang="en-US" sz="1400" dirty="0">
+                <a:solidFill>
+                  <a:schemeClr val="tx1"/>
+                </a:solidFill>
+                <a:latin typeface="+mj-lt"/>
+              </a:rPr>
+              <a:t>Most I/</a:t>
+            </a:r>
+            <a:r>
+              <a:rPr lang="en-US" sz="1400" dirty="0" err="1">
+                <a:solidFill>
+                  <a:schemeClr val="tx1"/>
+                </a:solidFill>
+                <a:latin typeface="+mj-lt"/>
+              </a:rPr>
+              <a:t>Os</a:t>
+            </a:r>
+            <a:r>
+              <a:rPr lang="en-US" sz="1400" dirty="0">
+                <a:solidFill>
+                  <a:schemeClr val="tx1"/>
+                </a:solidFill>
+                <a:latin typeface="+mj-lt"/>
+              </a:rPr>
+              <a:t> submit </a:t>
+            </a:r>
+            <a:r>
+              <a:rPr lang="en-US" sz="1400" i="1" dirty="0">
+                <a:solidFill>
+                  <a:schemeClr val="tx1"/>
+                </a:solidFill>
+                <a:latin typeface="+mj-lt"/>
+              </a:rPr>
+              <a:t>faster</a:t>
+            </a:r>
+          </a:p>
+        </p:txBody>
+      </p:sp>
+    </p:spTree>
+    <p:extLst>
+      <p:ext uri="{BB962C8B-B14F-4D97-AF65-F5344CB8AC3E}">
+        <p14:creationId xmlns:p14="http://schemas.microsoft.com/office/powerpoint/2010/main" val="2504721891"/>
+      </p:ext>
+    </p:extLst>
+  </p:cSld>
+  <p:clrMapOvr>
+    <a:masterClrMapping/>
+  </p:clrMapOvr>
+  <mc:AlternateContent xmlns:mc="http://schemas.openxmlformats.org/markup-compatibility/2006" xmlns:p14="http://schemas.microsoft.com/office/powerpoint/2010/main">
+    <mc:Choice Requires="p14">
+      <p:transition spd="med" p14:dur="700">
+        <p:fade/>
+      </p:transition>
+    </mc:Choice>
+    <mc:Fallback xmlns="">
+      <p:transition spd="med">
+        <p:fade/>
+      </p:transition>
+    </mc:Fallback>
+  </mc:AlternateContent>
+</p:sld>
+</file>
+
+<file path=ppt/slides/slide7.xml><?xml version="1.0" encoding="utf-8"?>
+<p:sld xmlns:a="http://schemas.openxmlformats.org/drawingml/2006/main" xmlns:r="http://schemas.openxmlformats.org/officeDocument/2006/relationships" xmlns:p="http://schemas.openxmlformats.org/presentationml/2006/main">
+  <p:cSld>
+    <p:spTree>
+      <p:nvGrpSpPr>
+        <p:cNvPr id="1" name=""/>
+        <p:cNvGrpSpPr/>
+        <p:nvPr/>
+      </p:nvGrpSpPr>
+      <p:grpSpPr>
+        <a:xfrm>
+          <a:off x="0" y="0"/>
+          <a:ext cx="0" cy="0"/>
+          <a:chOff x="0" y="0"/>
+          <a:chExt cx="0" cy="0"/>
+        </a:xfrm>
+      </p:grpSpPr>
+      <p:sp>
+        <p:nvSpPr>
           <p:cNvPr id="2" name="Content Placeholder 1"/>
           <p:cNvSpPr>
             <a:spLocks noGrp="1"/>
@@ -49983,7 +50375,7 @@
         <p:spPr>
           <a:xfrm>
             <a:off x="264160" y="967575"/>
-            <a:ext cx="8584006" cy="2760243"/>
+            <a:ext cx="8584006" cy="3074175"/>
           </a:xfrm>
         </p:spPr>
         <p:txBody>
@@ -50036,8 +50428,13 @@
             </a:pPr>
             <a:r>
               <a:rPr lang="en-US" b="1" dirty="0"/>
-              <a:t>Maybe tests exhibiting “slow” AIO submit times should be marked “invalid” because the queue depth generated by ivy is NOT reaching the storage.</a:t>
+              <a:t>We should think about if / when a test should be marked “invalid” because the queue depth generated by ivy is NOT reaching the storage.   </a:t>
             </a:r>
+            <a:r>
+              <a:rPr lang="en-US" dirty="0"/>
+              <a:t>For some tests, this is OK.  For other tests, for example, queue depth scalability tests, we may want to at least label points if not invalidate them when the ivy-driven queue depth does not reach the HBA/storage.</a:t>
+            </a:r>
+            <a:endParaRPr lang="en-US" b="1" dirty="0"/>
           </a:p>
         </p:txBody>
       </p:sp>
@@ -50083,7 +50480,7 @@
 </p:sld>
 </file>
 
-<file path=ppt/slides/slide7.xml><?xml version="1.0" encoding="utf-8"?>
+<file path=ppt/slides/slide8.xml><?xml version="1.0" encoding="utf-8"?>
 <p:sld xmlns:a="http://schemas.openxmlformats.org/drawingml/2006/main" xmlns:r="http://schemas.openxmlformats.org/officeDocument/2006/relationships" xmlns:p="http://schemas.openxmlformats.org/presentationml/2006/main">
   <p:cSld>
     <p:spTree>

</xml_diff>